<commit_message>
Improvements of IaC presentation
</commit_message>
<xml_diff>
--- a/05-infrastructure-as-code/05-infrastructure-as-code.pptx
+++ b/05-infrastructure-as-code/05-infrastructure-as-code.pptx
@@ -5,15 +5,16 @@
     <p:sldMasterId id="2147483648" r:id="rId1"/>
   </p:sldMasterIdLst>
   <p:notesMasterIdLst>
-    <p:notesMasterId r:id="rId8"/>
+    <p:notesMasterId r:id="rId9"/>
   </p:notesMasterIdLst>
   <p:sldIdLst>
     <p:sldId id="2580" r:id="rId2"/>
-    <p:sldId id="2587" r:id="rId3"/>
-    <p:sldId id="2589" r:id="rId4"/>
-    <p:sldId id="2590" r:id="rId5"/>
-    <p:sldId id="2585" r:id="rId6"/>
-    <p:sldId id="2568" r:id="rId7"/>
+    <p:sldId id="2592" r:id="rId3"/>
+    <p:sldId id="2593" r:id="rId4"/>
+    <p:sldId id="2594" r:id="rId5"/>
+    <p:sldId id="2590" r:id="rId6"/>
+    <p:sldId id="2585" r:id="rId7"/>
+    <p:sldId id="2568" r:id="rId8"/>
   </p:sldIdLst>
   <p:sldSz cx="12192000" cy="6858000"/>
   <p:notesSz cx="6858000" cy="9144000"/>
@@ -202,7 +203,7 @@
           <a:p>
             <a:fld id="{926F5171-4620-824D-BBEE-9B12D10DDA40}" type="datetimeFigureOut">
               <a:rPr lang="en-US" smtClean="0"/>
-              <a:t>8/3/21</a:t>
+              <a:t>8/4/21</a:t>
             </a:fld>
             <a:endParaRPr lang="en-US"/>
           </a:p>
@@ -582,7 +583,7 @@
                 <a:tabLst/>
                 <a:defRPr/>
               </a:pPr>
-              <a:t>5</a:t>
+              <a:t>6</a:t>
             </a:fld>
             <a:endParaRPr kumimoji="0" lang="en-US" sz="1200" b="0" i="0" u="none" strike="noStrike" kern="1200" cap="none" spc="0" normalizeH="0" baseline="0" noProof="0" dirty="0">
               <a:ln>
@@ -726,7 +727,7 @@
                 <a:tabLst/>
                 <a:defRPr/>
               </a:pPr>
-              <a:t>6</a:t>
+              <a:t>7</a:t>
             </a:fld>
             <a:endParaRPr kumimoji="0" lang="en-US" sz="1200" b="0" i="0" u="none" strike="noStrike" kern="1200" cap="none" spc="0" normalizeH="0" baseline="0" noProof="0" dirty="0">
               <a:ln>
@@ -1106,7 +1107,7 @@
           <a:p>
             <a:fld id="{5940F215-8337-114F-9F3D-71B1107C1CD3}" type="datetimeFigureOut">
               <a:rPr lang="en-US" smtClean="0"/>
-              <a:t>8/3/21</a:t>
+              <a:t>8/4/21</a:t>
             </a:fld>
             <a:endParaRPr lang="en-US"/>
           </a:p>
@@ -1330,7 +1331,7 @@
           <a:p>
             <a:fld id="{5940F215-8337-114F-9F3D-71B1107C1CD3}" type="datetimeFigureOut">
               <a:rPr lang="en-US" smtClean="0"/>
-              <a:t>8/3/21</a:t>
+              <a:t>8/4/21</a:t>
             </a:fld>
             <a:endParaRPr lang="en-US"/>
           </a:p>
@@ -1564,7 +1565,7 @@
           <a:p>
             <a:fld id="{5940F215-8337-114F-9F3D-71B1107C1CD3}" type="datetimeFigureOut">
               <a:rPr lang="en-US" smtClean="0"/>
-              <a:t>8/3/21</a:t>
+              <a:t>8/4/21</a:t>
             </a:fld>
             <a:endParaRPr lang="en-US"/>
           </a:p>
@@ -1958,7 +1959,7 @@
           <a:p>
             <a:fld id="{5940F215-8337-114F-9F3D-71B1107C1CD3}" type="datetimeFigureOut">
               <a:rPr lang="en-US" smtClean="0"/>
-              <a:t>8/3/21</a:t>
+              <a:t>8/4/21</a:t>
             </a:fld>
             <a:endParaRPr lang="en-US"/>
           </a:p>
@@ -2390,7 +2391,7 @@
           <a:p>
             <a:fld id="{5940F215-8337-114F-9F3D-71B1107C1CD3}" type="datetimeFigureOut">
               <a:rPr lang="en-US" smtClean="0"/>
-              <a:t>8/3/21</a:t>
+              <a:t>8/4/21</a:t>
             </a:fld>
             <a:endParaRPr lang="en-US"/>
           </a:p>
@@ -2682,7 +2683,7 @@
           <a:p>
             <a:fld id="{5940F215-8337-114F-9F3D-71B1107C1CD3}" type="datetimeFigureOut">
               <a:rPr lang="en-US" smtClean="0"/>
-              <a:t>8/3/21</a:t>
+              <a:t>8/4/21</a:t>
             </a:fld>
             <a:endParaRPr lang="en-US"/>
           </a:p>
@@ -3121,7 +3122,7 @@
           <a:p>
             <a:fld id="{5940F215-8337-114F-9F3D-71B1107C1CD3}" type="datetimeFigureOut">
               <a:rPr lang="en-US" smtClean="0"/>
-              <a:t>8/3/21</a:t>
+              <a:t>8/4/21</a:t>
             </a:fld>
             <a:endParaRPr lang="en-US"/>
           </a:p>
@@ -3287,7 +3288,7 @@
           <a:p>
             <a:fld id="{5940F215-8337-114F-9F3D-71B1107C1CD3}" type="datetimeFigureOut">
               <a:rPr lang="en-US" smtClean="0"/>
-              <a:t>8/3/21</a:t>
+              <a:t>8/4/21</a:t>
             </a:fld>
             <a:endParaRPr lang="en-US"/>
           </a:p>
@@ -3424,7 +3425,7 @@
           <a:p>
             <a:fld id="{5940F215-8337-114F-9F3D-71B1107C1CD3}" type="datetimeFigureOut">
               <a:rPr lang="en-US" smtClean="0"/>
-              <a:t>8/3/21</a:t>
+              <a:t>8/4/21</a:t>
             </a:fld>
             <a:endParaRPr lang="en-US"/>
           </a:p>
@@ -3761,7 +3762,7 @@
           <a:p>
             <a:fld id="{5940F215-8337-114F-9F3D-71B1107C1CD3}" type="datetimeFigureOut">
               <a:rPr lang="en-US" smtClean="0"/>
-              <a:t>8/3/21</a:t>
+              <a:t>8/4/21</a:t>
             </a:fld>
             <a:endParaRPr lang="en-US"/>
           </a:p>
@@ -4587,14 +4588,17 @@
         </p:nvSpPr>
         <p:spPr>
           <a:xfrm>
-            <a:off x="0" y="3744082"/>
-            <a:ext cx="12192000" cy="3113918"/>
+            <a:off x="0" y="4886892"/>
+            <a:ext cx="12192000" cy="1971107"/>
           </a:xfrm>
           <a:prstGeom prst="rect">
             <a:avLst/>
           </a:prstGeom>
           <a:solidFill>
-            <a:schemeClr val="accent6"/>
+            <a:schemeClr val="accent6">
+              <a:lumMod val="60000"/>
+              <a:lumOff val="40000"/>
+            </a:schemeClr>
           </a:solidFill>
         </p:spPr>
         <p:style>
@@ -4660,42 +4664,6 @@
           </a:p>
         </p:txBody>
       </p:sp>
-      <p:pic>
-        <p:nvPicPr>
-          <p:cNvPr id="7" name="Picture 6">
-            <a:extLst>
-              <a:ext uri="{FF2B5EF4-FFF2-40B4-BE49-F238E27FC236}">
-                <a16:creationId xmlns:a16="http://schemas.microsoft.com/office/drawing/2014/main" id="{5AE380D3-7B21-DF4B-9E32-4C83B121A967}"/>
-              </a:ext>
-            </a:extLst>
-          </p:cNvPr>
-          <p:cNvPicPr>
-            <a:picLocks noChangeAspect="1"/>
-          </p:cNvPicPr>
-          <p:nvPr/>
-        </p:nvPicPr>
-        <p:blipFill>
-          <a:blip r:embed="rId2" cstate="print">
-            <a:extLst>
-              <a:ext uri="{28A0092B-C50C-407E-A947-70E740481C1C}">
-                <a14:useLocalDpi xmlns:a14="http://schemas.microsoft.com/office/drawing/2010/main" val="0"/>
-              </a:ext>
-            </a:extLst>
-          </a:blip>
-          <a:stretch>
-            <a:fillRect/>
-          </a:stretch>
-        </p:blipFill>
-        <p:spPr>
-          <a:xfrm>
-            <a:off x="194467" y="2065107"/>
-            <a:ext cx="4699847" cy="3871288"/>
-          </a:xfrm>
-          <a:prstGeom prst="rect">
-            <a:avLst/>
-          </a:prstGeom>
-        </p:spPr>
-      </p:pic>
       <p:sp>
         <p:nvSpPr>
           <p:cNvPr id="8" name="TextBox 7">
@@ -4710,8 +4678,8 @@
         </p:nvSpPr>
         <p:spPr>
           <a:xfrm>
-            <a:off x="6640187" y="1666590"/>
-            <a:ext cx="5357345" cy="4154984"/>
+            <a:off x="6782669" y="1792135"/>
+            <a:ext cx="4878135" cy="3816429"/>
           </a:xfrm>
           <a:prstGeom prst="rect">
             <a:avLst/>
@@ -4726,7 +4694,7 @@
           </a:bodyPr>
           <a:lstStyle/>
           <a:p>
-            <a:endParaRPr lang="en-GB" sz="1200" dirty="0">
+            <a:endParaRPr lang="en-GB" sz="1100" dirty="0">
               <a:solidFill>
                 <a:srgbClr val="569CD6"/>
               </a:solidFill>
@@ -4735,7 +4703,7 @@
           </a:p>
           <a:p>
             <a:r>
-              <a:rPr lang="en-GB" sz="1200" dirty="0">
+              <a:rPr lang="en-GB" sz="1100" dirty="0">
                 <a:solidFill>
                   <a:srgbClr val="569CD6"/>
                 </a:solidFill>
@@ -4744,7 +4712,7 @@
               <a:t>Resources</a:t>
             </a:r>
             <a:r>
-              <a:rPr lang="en-GB" sz="1200" dirty="0">
+              <a:rPr lang="en-GB" sz="1100" dirty="0">
                 <a:solidFill>
                   <a:srgbClr val="D4D4D4"/>
                 </a:solidFill>
@@ -4755,7 +4723,7 @@
           </a:p>
           <a:p>
             <a:r>
-              <a:rPr lang="en-GB" sz="1200" dirty="0">
+              <a:rPr lang="en-GB" sz="1100" dirty="0">
                 <a:solidFill>
                   <a:srgbClr val="569CD6"/>
                 </a:solidFill>
@@ -4764,7 +4732,7 @@
               <a:t>  </a:t>
             </a:r>
             <a:r>
-              <a:rPr lang="en-GB" sz="1200" dirty="0" err="1">
+              <a:rPr lang="en-GB" sz="1100" dirty="0" err="1">
                 <a:solidFill>
                   <a:srgbClr val="569CD6"/>
                 </a:solidFill>
@@ -4773,7 +4741,7 @@
               <a:t>ElasticLoadBalancer</a:t>
             </a:r>
             <a:r>
-              <a:rPr lang="en-GB" sz="1200" dirty="0">
+              <a:rPr lang="en-GB" sz="1100" dirty="0">
                 <a:solidFill>
                   <a:srgbClr val="D4D4D4"/>
                 </a:solidFill>
@@ -4784,7 +4752,7 @@
           </a:p>
           <a:p>
             <a:r>
-              <a:rPr lang="en-GB" sz="1200" dirty="0">
+              <a:rPr lang="en-GB" sz="1100" dirty="0">
                 <a:solidFill>
                   <a:srgbClr val="569CD6"/>
                 </a:solidFill>
@@ -4793,7 +4761,7 @@
               <a:t>    Type</a:t>
             </a:r>
             <a:r>
-              <a:rPr lang="en-GB" sz="1200" dirty="0">
+              <a:rPr lang="en-GB" sz="1100" dirty="0">
                 <a:solidFill>
                   <a:srgbClr val="D4D4D4"/>
                 </a:solidFill>
@@ -4802,7 +4770,7 @@
               <a:t>: </a:t>
             </a:r>
             <a:r>
-              <a:rPr lang="en-GB" sz="1200" dirty="0">
+              <a:rPr lang="en-GB" sz="1100" dirty="0">
                 <a:solidFill>
                   <a:srgbClr val="CE9178"/>
                 </a:solidFill>
@@ -4811,7 +4779,7 @@
               <a:t>AWS::</a:t>
             </a:r>
             <a:r>
-              <a:rPr lang="en-GB" sz="1200" dirty="0" err="1">
+              <a:rPr lang="en-GB" sz="1100" dirty="0" err="1">
                 <a:solidFill>
                   <a:srgbClr val="CE9178"/>
                 </a:solidFill>
@@ -4820,7 +4788,7 @@
               <a:t>ElasticLoadBalancing</a:t>
             </a:r>
             <a:r>
-              <a:rPr lang="en-GB" sz="1200" dirty="0">
+              <a:rPr lang="en-GB" sz="1100" dirty="0">
                 <a:solidFill>
                   <a:srgbClr val="CE9178"/>
                 </a:solidFill>
@@ -4829,7 +4797,7 @@
               <a:t>::</a:t>
             </a:r>
             <a:r>
-              <a:rPr lang="en-GB" sz="1200" dirty="0" err="1">
+              <a:rPr lang="en-GB" sz="1100" dirty="0" err="1">
                 <a:solidFill>
                   <a:srgbClr val="CE9178"/>
                 </a:solidFill>
@@ -4837,7 +4805,7 @@
               </a:rPr>
               <a:t>LoadBalancer</a:t>
             </a:r>
-            <a:endParaRPr lang="en-GB" sz="1200" dirty="0">
+            <a:endParaRPr lang="en-GB" sz="1100" dirty="0">
               <a:solidFill>
                 <a:srgbClr val="D4D4D4"/>
               </a:solidFill>
@@ -4846,7 +4814,7 @@
           </a:p>
           <a:p>
             <a:r>
-              <a:rPr lang="en-GB" sz="1200" dirty="0">
+              <a:rPr lang="en-GB" sz="1100" dirty="0">
                 <a:solidFill>
                   <a:srgbClr val="569CD6"/>
                 </a:solidFill>
@@ -4855,7 +4823,7 @@
               <a:t>    Properties</a:t>
             </a:r>
             <a:r>
-              <a:rPr lang="en-GB" sz="1200" dirty="0">
+              <a:rPr lang="en-GB" sz="1100" dirty="0">
                 <a:solidFill>
                   <a:srgbClr val="D4D4D4"/>
                 </a:solidFill>
@@ -4866,7 +4834,7 @@
           </a:p>
           <a:p>
             <a:r>
-              <a:rPr lang="en-GB" sz="1200" dirty="0">
+              <a:rPr lang="en-GB" sz="1100" dirty="0">
                 <a:solidFill>
                   <a:srgbClr val="569CD6"/>
                 </a:solidFill>
@@ -4875,7 +4843,7 @@
               <a:t>      </a:t>
             </a:r>
             <a:r>
-              <a:rPr lang="en-GB" sz="1200" dirty="0" err="1">
+              <a:rPr lang="en-GB" sz="1100" dirty="0" err="1">
                 <a:solidFill>
                   <a:srgbClr val="569CD6"/>
                 </a:solidFill>
@@ -4884,7 +4852,7 @@
               <a:t>SecurityGroups</a:t>
             </a:r>
             <a:r>
-              <a:rPr lang="en-GB" sz="1200" dirty="0">
+              <a:rPr lang="en-GB" sz="1100" dirty="0">
                 <a:solidFill>
                   <a:srgbClr val="D4D4D4"/>
                 </a:solidFill>
@@ -4895,7 +4863,7 @@
           </a:p>
           <a:p>
             <a:r>
-              <a:rPr lang="en-GB" sz="1200" dirty="0">
+              <a:rPr lang="en-GB" sz="1100" dirty="0">
                 <a:solidFill>
                   <a:srgbClr val="D4D4D4"/>
                 </a:solidFill>
@@ -4904,7 +4872,7 @@
               <a:t>        - </a:t>
             </a:r>
             <a:r>
-              <a:rPr lang="en-GB" sz="1200" dirty="0">
+              <a:rPr lang="en-GB" sz="1100" dirty="0">
                 <a:solidFill>
                   <a:srgbClr val="569CD6"/>
                 </a:solidFill>
@@ -4913,7 +4881,7 @@
               <a:t>!Ref</a:t>
             </a:r>
             <a:r>
-              <a:rPr lang="en-GB" sz="1200" dirty="0">
+              <a:rPr lang="en-GB" sz="1100" dirty="0">
                 <a:solidFill>
                   <a:srgbClr val="D4D4D4"/>
                 </a:solidFill>
@@ -4922,7 +4890,7 @@
               <a:t> </a:t>
             </a:r>
             <a:r>
-              <a:rPr lang="en-GB" sz="1200" dirty="0" err="1">
+              <a:rPr lang="en-GB" sz="1100" dirty="0" err="1">
                 <a:solidFill>
                   <a:srgbClr val="CE9178"/>
                 </a:solidFill>
@@ -4930,7 +4898,7 @@
               </a:rPr>
               <a:t>LoadBalancerSecurityGroup</a:t>
             </a:r>
-            <a:endParaRPr lang="en-GB" sz="1200" dirty="0">
+            <a:endParaRPr lang="en-GB" sz="1100" dirty="0">
               <a:solidFill>
                 <a:srgbClr val="D4D4D4"/>
               </a:solidFill>
@@ -4939,7 +4907,7 @@
           </a:p>
           <a:p>
             <a:r>
-              <a:rPr lang="en-GB" sz="1200" dirty="0">
+              <a:rPr lang="en-GB" sz="1100" dirty="0">
                 <a:solidFill>
                   <a:srgbClr val="569CD6"/>
                 </a:solidFill>
@@ -4948,7 +4916,7 @@
               <a:t>      Subnets</a:t>
             </a:r>
             <a:r>
-              <a:rPr lang="en-GB" sz="1200" dirty="0">
+              <a:rPr lang="en-GB" sz="1100" dirty="0">
                 <a:solidFill>
                   <a:srgbClr val="D4D4D4"/>
                 </a:solidFill>
@@ -4959,7 +4927,7 @@
           </a:p>
           <a:p>
             <a:r>
-              <a:rPr lang="en-GB" sz="1200" dirty="0">
+              <a:rPr lang="en-GB" sz="1100" dirty="0">
                 <a:solidFill>
                   <a:srgbClr val="D4D4D4"/>
                 </a:solidFill>
@@ -4968,7 +4936,7 @@
               <a:t>        - </a:t>
             </a:r>
             <a:r>
-              <a:rPr lang="en-GB" sz="1200" dirty="0">
+              <a:rPr lang="en-GB" sz="1100" dirty="0">
                 <a:solidFill>
                   <a:srgbClr val="569CD6"/>
                 </a:solidFill>
@@ -4977,7 +4945,7 @@
               <a:t>!</a:t>
             </a:r>
             <a:r>
-              <a:rPr lang="en-GB" sz="1200" dirty="0" err="1">
+              <a:rPr lang="en-GB" sz="1100" dirty="0" err="1">
                 <a:solidFill>
                   <a:srgbClr val="569CD6"/>
                 </a:solidFill>
@@ -4986,7 +4954,7 @@
               <a:t>ImportValue</a:t>
             </a:r>
             <a:r>
-              <a:rPr lang="en-GB" sz="1200" dirty="0">
+              <a:rPr lang="en-GB" sz="1100" dirty="0">
                 <a:solidFill>
                   <a:srgbClr val="569CD6"/>
                 </a:solidFill>
@@ -4995,7 +4963,7 @@
               <a:t>:</a:t>
             </a:r>
             <a:r>
-              <a:rPr lang="en-GB" sz="1200" dirty="0">
+              <a:rPr lang="en-GB" sz="1100" dirty="0">
                 <a:solidFill>
                   <a:srgbClr val="D4D4D4"/>
                 </a:solidFill>
@@ -5004,7 +4972,7 @@
               <a:t> </a:t>
             </a:r>
             <a:r>
-              <a:rPr lang="en-GB" sz="1200" dirty="0">
+              <a:rPr lang="en-GB" sz="1100" dirty="0">
                 <a:solidFill>
                   <a:srgbClr val="CE9178"/>
                 </a:solidFill>
@@ -5012,7 +4980,7 @@
               </a:rPr>
               <a:t>PublicSubnet1A</a:t>
             </a:r>
-            <a:endParaRPr lang="en-GB" sz="1200" dirty="0">
+            <a:endParaRPr lang="en-GB" sz="1100" dirty="0">
               <a:solidFill>
                 <a:srgbClr val="D4D4D4"/>
               </a:solidFill>
@@ -5021,7 +4989,7 @@
           </a:p>
           <a:p>
             <a:r>
-              <a:rPr lang="en-GB" sz="1200" dirty="0">
+              <a:rPr lang="en-GB" sz="1100" dirty="0">
                 <a:solidFill>
                   <a:srgbClr val="D4D4D4"/>
                 </a:solidFill>
@@ -5030,7 +4998,7 @@
               <a:t>        - </a:t>
             </a:r>
             <a:r>
-              <a:rPr lang="en-GB" sz="1200" dirty="0">
+              <a:rPr lang="en-GB" sz="1100" dirty="0">
                 <a:solidFill>
                   <a:srgbClr val="569CD6"/>
                 </a:solidFill>
@@ -5039,7 +5007,7 @@
               <a:t>!</a:t>
             </a:r>
             <a:r>
-              <a:rPr lang="en-GB" sz="1200" dirty="0" err="1">
+              <a:rPr lang="en-GB" sz="1100" dirty="0" err="1">
                 <a:solidFill>
                   <a:srgbClr val="569CD6"/>
                 </a:solidFill>
@@ -5048,7 +5016,7 @@
               <a:t>ImportValue</a:t>
             </a:r>
             <a:r>
-              <a:rPr lang="en-GB" sz="1200" dirty="0">
+              <a:rPr lang="en-GB" sz="1100" dirty="0">
                 <a:solidFill>
                   <a:srgbClr val="569CD6"/>
                 </a:solidFill>
@@ -5057,7 +5025,7 @@
               <a:t>:</a:t>
             </a:r>
             <a:r>
-              <a:rPr lang="en-GB" sz="1200" dirty="0">
+              <a:rPr lang="en-GB" sz="1100" dirty="0">
                 <a:solidFill>
                   <a:srgbClr val="D4D4D4"/>
                 </a:solidFill>
@@ -5066,7 +5034,7 @@
               <a:t> </a:t>
             </a:r>
             <a:r>
-              <a:rPr lang="en-GB" sz="1200" dirty="0">
+              <a:rPr lang="en-GB" sz="1100" dirty="0">
                 <a:solidFill>
                   <a:srgbClr val="CE9178"/>
                 </a:solidFill>
@@ -5074,7 +5042,7 @@
               </a:rPr>
               <a:t>PublicSubnet1B</a:t>
             </a:r>
-            <a:endParaRPr lang="en-GB" sz="1200" dirty="0">
+            <a:endParaRPr lang="en-GB" sz="1100" dirty="0">
               <a:solidFill>
                 <a:srgbClr val="D4D4D4"/>
               </a:solidFill>
@@ -5083,7 +5051,7 @@
           </a:p>
           <a:p>
             <a:r>
-              <a:rPr lang="en-GB" sz="1200" dirty="0">
+              <a:rPr lang="en-GB" sz="1100" dirty="0">
                 <a:solidFill>
                   <a:srgbClr val="569CD6"/>
                 </a:solidFill>
@@ -5092,7 +5060,7 @@
               <a:t>      Listeners</a:t>
             </a:r>
             <a:r>
-              <a:rPr lang="en-GB" sz="1200" dirty="0">
+              <a:rPr lang="en-GB" sz="1100" dirty="0">
                 <a:solidFill>
                   <a:srgbClr val="D4D4D4"/>
                 </a:solidFill>
@@ -5103,7 +5071,7 @@
           </a:p>
           <a:p>
             <a:r>
-              <a:rPr lang="en-GB" sz="1200" dirty="0">
+              <a:rPr lang="en-GB" sz="1100" dirty="0">
                 <a:solidFill>
                   <a:srgbClr val="569CD6"/>
                 </a:solidFill>
@@ -5112,7 +5080,7 @@
               <a:t>        </a:t>
             </a:r>
             <a:r>
-              <a:rPr lang="en-GB" sz="1200" dirty="0" err="1">
+              <a:rPr lang="en-GB" sz="1100" dirty="0" err="1">
                 <a:solidFill>
                   <a:srgbClr val="569CD6"/>
                 </a:solidFill>
@@ -5121,7 +5089,7 @@
               <a:t>LoadBalancerPort</a:t>
             </a:r>
             <a:r>
-              <a:rPr lang="en-GB" sz="1200" dirty="0">
+              <a:rPr lang="en-GB" sz="1100" dirty="0">
                 <a:solidFill>
                   <a:srgbClr val="D4D4D4"/>
                 </a:solidFill>
@@ -5130,7 +5098,7 @@
               <a:t>: </a:t>
             </a:r>
             <a:r>
-              <a:rPr lang="en-GB" sz="1200" dirty="0">
+              <a:rPr lang="en-GB" sz="1100" dirty="0">
                 <a:solidFill>
                   <a:srgbClr val="B5CEA8"/>
                 </a:solidFill>
@@ -5138,7 +5106,7 @@
               </a:rPr>
               <a:t>443</a:t>
             </a:r>
-            <a:endParaRPr lang="en-GB" sz="1200" dirty="0">
+            <a:endParaRPr lang="en-GB" sz="1100" dirty="0">
               <a:solidFill>
                 <a:srgbClr val="D4D4D4"/>
               </a:solidFill>
@@ -5147,7 +5115,7 @@
           </a:p>
           <a:p>
             <a:r>
-              <a:rPr lang="en-GB" sz="1200" dirty="0">
+              <a:rPr lang="en-GB" sz="1100" dirty="0">
                 <a:solidFill>
                   <a:srgbClr val="569CD6"/>
                 </a:solidFill>
@@ -5156,7 +5124,7 @@
               <a:t>        </a:t>
             </a:r>
             <a:r>
-              <a:rPr lang="en-GB" sz="1200" dirty="0" err="1">
+              <a:rPr lang="en-GB" sz="1100" dirty="0" err="1">
                 <a:solidFill>
                   <a:srgbClr val="569CD6"/>
                 </a:solidFill>
@@ -5165,7 +5133,7 @@
               <a:t>InstancePort</a:t>
             </a:r>
             <a:r>
-              <a:rPr lang="en-GB" sz="1200" dirty="0">
+              <a:rPr lang="en-GB" sz="1100" dirty="0">
                 <a:solidFill>
                   <a:srgbClr val="D4D4D4"/>
                 </a:solidFill>
@@ -5174,7 +5142,7 @@
               <a:t>: </a:t>
             </a:r>
             <a:r>
-              <a:rPr lang="en-GB" sz="1200" dirty="0">
+              <a:rPr lang="en-GB" sz="1100" dirty="0">
                 <a:solidFill>
                   <a:srgbClr val="B5CEA8"/>
                 </a:solidFill>
@@ -5182,7 +5150,7 @@
               </a:rPr>
               <a:t>8080</a:t>
             </a:r>
-            <a:endParaRPr lang="en-GB" sz="1200" dirty="0">
+            <a:endParaRPr lang="en-GB" sz="1100" dirty="0">
               <a:solidFill>
                 <a:srgbClr val="D4D4D4"/>
               </a:solidFill>
@@ -5191,7 +5159,7 @@
           </a:p>
           <a:p>
             <a:r>
-              <a:rPr lang="en-GB" sz="1200" dirty="0">
+              <a:rPr lang="en-GB" sz="1100" dirty="0">
                 <a:solidFill>
                   <a:srgbClr val="569CD6"/>
                 </a:solidFill>
@@ -5200,7 +5168,7 @@
               <a:t>        Protocol</a:t>
             </a:r>
             <a:r>
-              <a:rPr lang="en-GB" sz="1200" dirty="0">
+              <a:rPr lang="en-GB" sz="1100" dirty="0">
                 <a:solidFill>
                   <a:srgbClr val="D4D4D4"/>
                 </a:solidFill>
@@ -5209,7 +5177,7 @@
               <a:t>: </a:t>
             </a:r>
             <a:r>
-              <a:rPr lang="en-GB" sz="1200" dirty="0">
+              <a:rPr lang="en-GB" sz="1100" dirty="0">
                 <a:solidFill>
                   <a:srgbClr val="CE9178"/>
                 </a:solidFill>
@@ -5217,7 +5185,7 @@
               </a:rPr>
               <a:t>HTTPS</a:t>
             </a:r>
-            <a:endParaRPr lang="en-GB" sz="1200" dirty="0">
+            <a:endParaRPr lang="en-GB" sz="1100" dirty="0">
               <a:solidFill>
                 <a:srgbClr val="D4D4D4"/>
               </a:solidFill>
@@ -5226,7 +5194,7 @@
           </a:p>
           <a:p>
             <a:r>
-              <a:rPr lang="en-GB" sz="1200" dirty="0">
+              <a:rPr lang="en-GB" sz="1100" dirty="0">
                 <a:solidFill>
                   <a:srgbClr val="569CD6"/>
                 </a:solidFill>
@@ -5235,7 +5203,7 @@
               <a:t>        </a:t>
             </a:r>
             <a:r>
-              <a:rPr lang="en-GB" sz="1200" dirty="0" err="1">
+              <a:rPr lang="en-GB" sz="1100" dirty="0" err="1">
                 <a:solidFill>
                   <a:srgbClr val="569CD6"/>
                 </a:solidFill>
@@ -5244,7 +5212,7 @@
               <a:t>SSLCertificateId</a:t>
             </a:r>
             <a:r>
-              <a:rPr lang="en-GB" sz="1200" dirty="0">
+              <a:rPr lang="en-GB" sz="1100" dirty="0">
                 <a:solidFill>
                   <a:srgbClr val="D4D4D4"/>
                 </a:solidFill>
@@ -5253,7 +5221,7 @@
               <a:t>: </a:t>
             </a:r>
             <a:r>
-              <a:rPr lang="en-GB" sz="1200" dirty="0">
+              <a:rPr lang="en-GB" sz="1100" dirty="0">
                 <a:solidFill>
                   <a:srgbClr val="569CD6"/>
                 </a:solidFill>
@@ -5262,7 +5230,7 @@
               <a:t>!</a:t>
             </a:r>
             <a:r>
-              <a:rPr lang="en-GB" sz="1200" dirty="0" err="1">
+              <a:rPr lang="en-GB" sz="1100" dirty="0" err="1">
                 <a:solidFill>
                   <a:srgbClr val="569CD6"/>
                 </a:solidFill>
@@ -5271,7 +5239,7 @@
               <a:t>ImportValue</a:t>
             </a:r>
             <a:r>
-              <a:rPr lang="en-GB" sz="1200" dirty="0">
+              <a:rPr lang="en-GB" sz="1100" dirty="0">
                 <a:solidFill>
                   <a:srgbClr val="D4D4D4"/>
                 </a:solidFill>
@@ -5280,7 +5248,7 @@
               <a:t> </a:t>
             </a:r>
             <a:r>
-              <a:rPr lang="en-GB" sz="1200" dirty="0" err="1">
+              <a:rPr lang="en-GB" sz="1100" dirty="0" err="1">
                 <a:solidFill>
                   <a:srgbClr val="CE9178"/>
                 </a:solidFill>
@@ -5288,7 +5256,7 @@
               </a:rPr>
               <a:t>CertificateId</a:t>
             </a:r>
-            <a:endParaRPr lang="en-GB" sz="1200" dirty="0">
+            <a:endParaRPr lang="en-GB" sz="1100" dirty="0">
               <a:solidFill>
                 <a:srgbClr val="D4D4D4"/>
               </a:solidFill>
@@ -5297,7 +5265,7 @@
           </a:p>
           <a:p>
             <a:r>
-              <a:rPr lang="en-GB" sz="1200" dirty="0">
+              <a:rPr lang="en-GB" sz="1100" dirty="0">
                 <a:solidFill>
                   <a:srgbClr val="569CD6"/>
                 </a:solidFill>
@@ -5306,7 +5274,7 @@
               <a:t>      </a:t>
             </a:r>
             <a:r>
-              <a:rPr lang="en-GB" sz="1200" dirty="0" err="1">
+              <a:rPr lang="en-GB" sz="1100" dirty="0" err="1">
                 <a:solidFill>
                   <a:srgbClr val="569CD6"/>
                 </a:solidFill>
@@ -5315,7 +5283,7 @@
               <a:t>HealthCheck</a:t>
             </a:r>
             <a:r>
-              <a:rPr lang="en-GB" sz="1200" dirty="0">
+              <a:rPr lang="en-GB" sz="1100" dirty="0">
                 <a:solidFill>
                   <a:srgbClr val="D4D4D4"/>
                 </a:solidFill>
@@ -5326,7 +5294,7 @@
           </a:p>
           <a:p>
             <a:r>
-              <a:rPr lang="en-GB" sz="1200" dirty="0">
+              <a:rPr lang="en-GB" sz="1100" dirty="0">
                 <a:solidFill>
                   <a:srgbClr val="569CD6"/>
                 </a:solidFill>
@@ -5335,7 +5303,7 @@
               <a:t>        Target</a:t>
             </a:r>
             <a:r>
-              <a:rPr lang="en-GB" sz="1200" dirty="0">
+              <a:rPr lang="en-GB" sz="1100" dirty="0">
                 <a:solidFill>
                   <a:srgbClr val="D4D4D4"/>
                 </a:solidFill>
@@ -5344,7 +5312,7 @@
               <a:t>: </a:t>
             </a:r>
             <a:r>
-              <a:rPr lang="en-GB" sz="1200" dirty="0">
+              <a:rPr lang="en-GB" sz="1100" dirty="0">
                 <a:solidFill>
                   <a:srgbClr val="CE9178"/>
                 </a:solidFill>
@@ -5352,7 +5320,7 @@
               </a:rPr>
               <a:t>'HTTP:80/'</a:t>
             </a:r>
-            <a:endParaRPr lang="en-GB" sz="1200" dirty="0">
+            <a:endParaRPr lang="en-GB" sz="1100" dirty="0">
               <a:solidFill>
                 <a:srgbClr val="D4D4D4"/>
               </a:solidFill>
@@ -5361,7 +5329,7 @@
           </a:p>
           <a:p>
             <a:r>
-              <a:rPr lang="en-GB" sz="1200" dirty="0">
+              <a:rPr lang="en-GB" sz="1100" dirty="0">
                 <a:solidFill>
                   <a:srgbClr val="569CD6"/>
                 </a:solidFill>
@@ -5370,7 +5338,7 @@
               <a:t>        </a:t>
             </a:r>
             <a:r>
-              <a:rPr lang="en-GB" sz="1200" dirty="0" err="1">
+              <a:rPr lang="en-GB" sz="1100" dirty="0" err="1">
                 <a:solidFill>
                   <a:srgbClr val="569CD6"/>
                 </a:solidFill>
@@ -5379,7 +5347,7 @@
               <a:t>HealtyThreshold</a:t>
             </a:r>
             <a:r>
-              <a:rPr lang="en-GB" sz="1200" dirty="0">
+              <a:rPr lang="en-GB" sz="1100" dirty="0">
                 <a:solidFill>
                   <a:srgbClr val="D4D4D4"/>
                 </a:solidFill>
@@ -5388,7 +5356,7 @@
               <a:t>: </a:t>
             </a:r>
             <a:r>
-              <a:rPr lang="en-GB" sz="1200" dirty="0">
+              <a:rPr lang="en-GB" sz="1100" dirty="0">
                 <a:solidFill>
                   <a:srgbClr val="B5CEA8"/>
                 </a:solidFill>
@@ -5396,7 +5364,7 @@
               </a:rPr>
               <a:t>2</a:t>
             </a:r>
-            <a:endParaRPr lang="en-GB" sz="1200" dirty="0">
+            <a:endParaRPr lang="en-GB" sz="1100" dirty="0">
               <a:solidFill>
                 <a:srgbClr val="D4D4D4"/>
               </a:solidFill>
@@ -5405,7 +5373,7 @@
           </a:p>
           <a:p>
             <a:r>
-              <a:rPr lang="en-GB" sz="1200" dirty="0">
+              <a:rPr lang="en-GB" sz="1100" dirty="0">
                 <a:solidFill>
                   <a:srgbClr val="569CD6"/>
                 </a:solidFill>
@@ -5414,7 +5382,7 @@
               <a:t>        </a:t>
             </a:r>
             <a:r>
-              <a:rPr lang="en-GB" sz="1200" dirty="0" err="1">
+              <a:rPr lang="en-GB" sz="1100" dirty="0" err="1">
                 <a:solidFill>
                   <a:srgbClr val="569CD6"/>
                 </a:solidFill>
@@ -5423,7 +5391,7 @@
               <a:t>UnhealtyThreshold</a:t>
             </a:r>
             <a:r>
-              <a:rPr lang="en-GB" sz="1200" dirty="0">
+              <a:rPr lang="en-GB" sz="1100" dirty="0">
                 <a:solidFill>
                   <a:srgbClr val="D4D4D4"/>
                 </a:solidFill>
@@ -5432,7 +5400,7 @@
               <a:t>: </a:t>
             </a:r>
             <a:r>
-              <a:rPr lang="en-GB" sz="1200" dirty="0">
+              <a:rPr lang="en-GB" sz="1100" dirty="0">
                 <a:solidFill>
                   <a:srgbClr val="B5CEA8"/>
                 </a:solidFill>
@@ -5440,7 +5408,7 @@
               </a:rPr>
               <a:t>3</a:t>
             </a:r>
-            <a:endParaRPr lang="en-GB" sz="1200" dirty="0">
+            <a:endParaRPr lang="en-GB" sz="1100" dirty="0">
               <a:solidFill>
                 <a:srgbClr val="D4D4D4"/>
               </a:solidFill>
@@ -5449,7 +5417,7 @@
           </a:p>
           <a:p>
             <a:r>
-              <a:rPr lang="en-GB" sz="1200" dirty="0">
+              <a:rPr lang="en-GB" sz="1100" dirty="0">
                 <a:solidFill>
                   <a:srgbClr val="569CD6"/>
                 </a:solidFill>
@@ -5458,7 +5426,7 @@
               <a:t>        Interval</a:t>
             </a:r>
             <a:r>
-              <a:rPr lang="en-GB" sz="1200" dirty="0">
+              <a:rPr lang="en-GB" sz="1100" dirty="0">
                 <a:solidFill>
                   <a:srgbClr val="D4D4D4"/>
                 </a:solidFill>
@@ -5467,7 +5435,7 @@
               <a:t>: </a:t>
             </a:r>
             <a:r>
-              <a:rPr lang="en-GB" sz="1200" dirty="0">
+              <a:rPr lang="en-GB" sz="1100" dirty="0">
                 <a:solidFill>
                   <a:srgbClr val="B5CEA8"/>
                 </a:solidFill>
@@ -5475,7 +5443,7 @@
               </a:rPr>
               <a:t>20</a:t>
             </a:r>
-            <a:endParaRPr lang="en-GB" sz="1200" dirty="0">
+            <a:endParaRPr lang="en-GB" sz="1100" dirty="0">
               <a:solidFill>
                 <a:srgbClr val="D4D4D4"/>
               </a:solidFill>
@@ -5484,7 +5452,7 @@
           </a:p>
           <a:p>
             <a:r>
-              <a:rPr lang="en-GB" sz="1200" dirty="0">
+              <a:rPr lang="en-GB" sz="1100" dirty="0">
                 <a:solidFill>
                   <a:srgbClr val="569CD6"/>
                 </a:solidFill>
@@ -5493,7 +5461,7 @@
               <a:t>        Timeout</a:t>
             </a:r>
             <a:r>
-              <a:rPr lang="en-GB" sz="1200" dirty="0">
+              <a:rPr lang="en-GB" sz="1100" dirty="0">
                 <a:solidFill>
                   <a:srgbClr val="D4D4D4"/>
                 </a:solidFill>
@@ -5502,7 +5470,7 @@
               <a:t>: </a:t>
             </a:r>
             <a:r>
-              <a:rPr lang="en-GB" sz="1200" dirty="0">
+              <a:rPr lang="en-GB" sz="1100" dirty="0">
                 <a:solidFill>
                   <a:srgbClr val="B5CEA8"/>
                 </a:solidFill>
@@ -5510,7 +5478,7 @@
               </a:rPr>
               <a:t>10</a:t>
             </a:r>
-            <a:endParaRPr lang="en-GB" sz="1200" dirty="0">
+            <a:endParaRPr lang="en-GB" sz="1100" dirty="0">
               <a:solidFill>
                 <a:srgbClr val="D4D4D4"/>
               </a:solidFill>
@@ -5518,16 +5486,16 @@
             </a:endParaRPr>
           </a:p>
           <a:p>
-            <a:endParaRPr lang="en-SE" sz="1200" dirty="0"/>
+            <a:endParaRPr lang="en-SE" sz="1100" dirty="0"/>
           </a:p>
         </p:txBody>
       </p:sp>
       <p:sp>
         <p:nvSpPr>
-          <p:cNvPr id="11" name="Right Arrow 10">
+          <p:cNvPr id="9" name="Right Arrow 8">
             <a:extLst>
               <a:ext uri="{FF2B5EF4-FFF2-40B4-BE49-F238E27FC236}">
-                <a16:creationId xmlns:a16="http://schemas.microsoft.com/office/drawing/2014/main" id="{6C7D8881-7BE0-8C48-B8E3-09A32617C62B}"/>
+                <a16:creationId xmlns:a16="http://schemas.microsoft.com/office/drawing/2014/main" id="{D03949E8-1D79-E64B-84AD-E720B6CA741E}"/>
               </a:ext>
             </a:extLst>
           </p:cNvPr>
@@ -5535,13 +5503,21 @@
           <p:nvPr/>
         </p:nvSpPr>
         <p:spPr>
-          <a:xfrm>
-            <a:off x="5186974" y="3429000"/>
-            <a:ext cx="1178011" cy="650789"/>
+          <a:xfrm rot="16200000">
+            <a:off x="1420707" y="3577930"/>
+            <a:ext cx="993333" cy="546576"/>
           </a:xfrm>
           <a:prstGeom prst="rightArrow">
             <a:avLst/>
           </a:prstGeom>
+          <a:solidFill>
+            <a:srgbClr val="C00000"/>
+          </a:solidFill>
+          <a:ln>
+            <a:solidFill>
+              <a:schemeClr val="tx1"/>
+            </a:solidFill>
+          </a:ln>
         </p:spPr>
         <p:style>
           <a:lnRef idx="2">
@@ -5560,18 +5536,296 @@
           </a:fontRef>
         </p:style>
         <p:txBody>
-          <a:bodyPr rtlCol="0" anchor="ctr"/>
+          <a:bodyPr lIns="0" tIns="0" rIns="0" bIns="0" rtlCol="0" anchor="ctr"/>
           <a:lstStyle/>
           <a:p>
             <a:pPr algn="ctr"/>
-            <a:endParaRPr lang="en-US"/>
+            <a:r>
+              <a:rPr lang="en-US" sz="1600" dirty="0">
+                <a:solidFill>
+                  <a:schemeClr val="bg1"/>
+                </a:solidFill>
+              </a:rPr>
+              <a:t>Manual</a:t>
+            </a:r>
+          </a:p>
+        </p:txBody>
+      </p:sp>
+      <p:pic>
+        <p:nvPicPr>
+          <p:cNvPr id="7" name="Picture 6">
+            <a:extLst>
+              <a:ext uri="{FF2B5EF4-FFF2-40B4-BE49-F238E27FC236}">
+                <a16:creationId xmlns:a16="http://schemas.microsoft.com/office/drawing/2014/main" id="{8B7047E7-AE66-8F41-82FB-F4A997F9BA84}"/>
+              </a:ext>
+            </a:extLst>
+          </p:cNvPr>
+          <p:cNvPicPr>
+            <a:picLocks noChangeAspect="1"/>
+          </p:cNvPicPr>
+          <p:nvPr/>
+        </p:nvPicPr>
+        <p:blipFill>
+          <a:blip r:embed="rId2"/>
+          <a:stretch>
+            <a:fillRect/>
+          </a:stretch>
+        </p:blipFill>
+        <p:spPr>
+          <a:xfrm>
+            <a:off x="4114164" y="1677774"/>
+            <a:ext cx="2157131" cy="960213"/>
+          </a:xfrm>
+          <a:prstGeom prst="rect">
+            <a:avLst/>
+          </a:prstGeom>
+          <a:ln w="88900" cap="sq" cmpd="thickThin">
+            <a:noFill/>
+            <a:prstDash val="solid"/>
+            <a:miter lim="800000"/>
+          </a:ln>
+          <a:effectLst>
+            <a:innerShdw blurRad="76200">
+              <a:srgbClr val="000000"/>
+            </a:innerShdw>
+          </a:effectLst>
+        </p:spPr>
+      </p:pic>
+      <p:pic>
+        <p:nvPicPr>
+          <p:cNvPr id="11" name="Picture 10">
+            <a:extLst>
+              <a:ext uri="{FF2B5EF4-FFF2-40B4-BE49-F238E27FC236}">
+                <a16:creationId xmlns:a16="http://schemas.microsoft.com/office/drawing/2014/main" id="{AF3B08B7-0A18-CB46-8455-9BFBCBDCC159}"/>
+              </a:ext>
+            </a:extLst>
+          </p:cNvPr>
+          <p:cNvPicPr>
+            <a:picLocks noChangeAspect="1"/>
+          </p:cNvPicPr>
+          <p:nvPr/>
+        </p:nvPicPr>
+        <p:blipFill>
+          <a:blip r:embed="rId3" cstate="print">
+            <a:extLst>
+              <a:ext uri="{28A0092B-C50C-407E-A947-70E740481C1C}">
+                <a14:useLocalDpi xmlns:a14="http://schemas.microsoft.com/office/drawing/2010/main" val="0"/>
+              </a:ext>
+            </a:extLst>
+          </a:blip>
+          <a:stretch>
+            <a:fillRect/>
+          </a:stretch>
+        </p:blipFill>
+        <p:spPr>
+          <a:xfrm>
+            <a:off x="263453" y="3904669"/>
+            <a:ext cx="3390465" cy="2792743"/>
+          </a:xfrm>
+          <a:prstGeom prst="rect">
+            <a:avLst/>
+          </a:prstGeom>
+        </p:spPr>
+      </p:pic>
+      <p:pic>
+        <p:nvPicPr>
+          <p:cNvPr id="12" name="Picture 11">
+            <a:extLst>
+              <a:ext uri="{FF2B5EF4-FFF2-40B4-BE49-F238E27FC236}">
+                <a16:creationId xmlns:a16="http://schemas.microsoft.com/office/drawing/2014/main" id="{7B3E9458-6E78-D743-9558-5B2D148FA0DD}"/>
+              </a:ext>
+            </a:extLst>
+          </p:cNvPr>
+          <p:cNvPicPr>
+            <a:picLocks noChangeAspect="1"/>
+          </p:cNvPicPr>
+          <p:nvPr/>
+        </p:nvPicPr>
+        <p:blipFill>
+          <a:blip r:embed="rId4"/>
+          <a:stretch>
+            <a:fillRect/>
+          </a:stretch>
+        </p:blipFill>
+        <p:spPr>
+          <a:xfrm>
+            <a:off x="558251" y="1224056"/>
+            <a:ext cx="2800868" cy="2054123"/>
+          </a:xfrm>
+          <a:prstGeom prst="rect">
+            <a:avLst/>
+          </a:prstGeom>
+        </p:spPr>
+      </p:pic>
+      <p:sp>
+        <p:nvSpPr>
+          <p:cNvPr id="13" name="Right Arrow 12">
+            <a:extLst>
+              <a:ext uri="{FF2B5EF4-FFF2-40B4-BE49-F238E27FC236}">
+                <a16:creationId xmlns:a16="http://schemas.microsoft.com/office/drawing/2014/main" id="{8091DECE-AEFA-4F4D-A280-D6140799D25C}"/>
+              </a:ext>
+            </a:extLst>
+          </p:cNvPr>
+          <p:cNvSpPr/>
+          <p:nvPr/>
+        </p:nvSpPr>
+        <p:spPr>
+          <a:xfrm rot="18888771">
+            <a:off x="3154183" y="3182067"/>
+            <a:ext cx="2038384" cy="723595"/>
+          </a:xfrm>
+          <a:prstGeom prst="rightArrow">
+            <a:avLst/>
+          </a:prstGeom>
+          <a:solidFill>
+            <a:schemeClr val="accent4"/>
+          </a:solidFill>
+          <a:ln>
+            <a:solidFill>
+              <a:schemeClr val="tx1"/>
+            </a:solidFill>
+          </a:ln>
+        </p:spPr>
+        <p:style>
+          <a:lnRef idx="2">
+            <a:schemeClr val="accent1">
+              <a:shade val="50000"/>
+            </a:schemeClr>
+          </a:lnRef>
+          <a:fillRef idx="1">
+            <a:schemeClr val="accent1"/>
+          </a:fillRef>
+          <a:effectRef idx="0">
+            <a:schemeClr val="accent1"/>
+          </a:effectRef>
+          <a:fontRef idx="minor">
+            <a:schemeClr val="lt1"/>
+          </a:fontRef>
+        </p:style>
+        <p:txBody>
+          <a:bodyPr lIns="0" tIns="0" rIns="0" bIns="0" rtlCol="0" anchor="ctr"/>
+          <a:lstStyle/>
+          <a:p>
+            <a:pPr algn="ctr"/>
+            <a:r>
+              <a:rPr lang="en-US" sz="1400" dirty="0">
+                <a:solidFill>
+                  <a:schemeClr val="tx1"/>
+                </a:solidFill>
+              </a:rPr>
+              <a:t>Automate manual steps</a:t>
+            </a:r>
+          </a:p>
+        </p:txBody>
+      </p:sp>
+      <p:sp>
+        <p:nvSpPr>
+          <p:cNvPr id="14" name="Right Arrow 13">
+            <a:extLst>
+              <a:ext uri="{FF2B5EF4-FFF2-40B4-BE49-F238E27FC236}">
+                <a16:creationId xmlns:a16="http://schemas.microsoft.com/office/drawing/2014/main" id="{5887E652-1C7F-5440-AAC5-9CDC18EA8A4C}"/>
+              </a:ext>
+            </a:extLst>
+          </p:cNvPr>
+          <p:cNvSpPr/>
+          <p:nvPr/>
+        </p:nvSpPr>
+        <p:spPr>
+          <a:xfrm>
+            <a:off x="3951482" y="4600811"/>
+            <a:ext cx="2606764" cy="809143"/>
+          </a:xfrm>
+          <a:prstGeom prst="rightArrow">
+            <a:avLst/>
+          </a:prstGeom>
+          <a:solidFill>
+            <a:schemeClr val="accent6"/>
+          </a:solidFill>
+          <a:ln>
+            <a:solidFill>
+              <a:schemeClr val="tx1"/>
+            </a:solidFill>
+          </a:ln>
+        </p:spPr>
+        <p:style>
+          <a:lnRef idx="2">
+            <a:schemeClr val="accent1">
+              <a:shade val="50000"/>
+            </a:schemeClr>
+          </a:lnRef>
+          <a:fillRef idx="1">
+            <a:schemeClr val="accent1"/>
+          </a:fillRef>
+          <a:effectRef idx="0">
+            <a:schemeClr val="accent1"/>
+          </a:effectRef>
+          <a:fontRef idx="minor">
+            <a:schemeClr val="lt1"/>
+          </a:fontRef>
+        </p:style>
+        <p:txBody>
+          <a:bodyPr lIns="0" tIns="0" rIns="0" bIns="0" rtlCol="0" anchor="ctr"/>
+          <a:lstStyle/>
+          <a:p>
+            <a:pPr algn="ctr"/>
+            <a:r>
+              <a:rPr lang="en-US" dirty="0">
+                <a:solidFill>
+                  <a:schemeClr val="tx1"/>
+                </a:solidFill>
+              </a:rPr>
+              <a:t>Infrastructure as Code</a:t>
+            </a:r>
+          </a:p>
+        </p:txBody>
+      </p:sp>
+      <p:sp>
+        <p:nvSpPr>
+          <p:cNvPr id="3" name="TextBox 2">
+            <a:extLst>
+              <a:ext uri="{FF2B5EF4-FFF2-40B4-BE49-F238E27FC236}">
+                <a16:creationId xmlns:a16="http://schemas.microsoft.com/office/drawing/2014/main" id="{7B73804B-AAF5-AE44-AC3F-EC4596619D8B}"/>
+              </a:ext>
+            </a:extLst>
+          </p:cNvPr>
+          <p:cNvSpPr txBox="1"/>
+          <p:nvPr/>
+        </p:nvSpPr>
+        <p:spPr>
+          <a:xfrm>
+            <a:off x="9776955" y="5346954"/>
+            <a:ext cx="1883849" cy="261610"/>
+          </a:xfrm>
+          <a:prstGeom prst="rect">
+            <a:avLst/>
+          </a:prstGeom>
+          <a:noFill/>
+        </p:spPr>
+        <p:txBody>
+          <a:bodyPr wrap="none" rtlCol="0">
+            <a:spAutoFit/>
+          </a:bodyPr>
+          <a:lstStyle/>
+          <a:p>
+            <a:pPr algn="r"/>
+            <a:r>
+              <a:rPr lang="en-US" sz="1050" dirty="0">
+                <a:solidFill>
+                  <a:schemeClr val="bg1"/>
+                </a:solidFill>
+                <a:latin typeface="Menlo" panose="020B0609030804020204" pitchFamily="49" charset="0"/>
+                <a:ea typeface="Menlo" panose="020B0609030804020204" pitchFamily="49" charset="0"/>
+                <a:cs typeface="Menlo" panose="020B0609030804020204" pitchFamily="49" charset="0"/>
+              </a:rPr>
+              <a:t>[AWS CloudFormation]</a:t>
+            </a:r>
           </a:p>
         </p:txBody>
       </p:sp>
     </p:spTree>
     <p:extLst>
       <p:ext uri="{BB962C8B-B14F-4D97-AF65-F5344CB8AC3E}">
-        <p14:creationId xmlns:p14="http://schemas.microsoft.com/office/powerpoint/2010/main" val="195977422"/>
+        <p14:creationId xmlns:p14="http://schemas.microsoft.com/office/powerpoint/2010/main" val="1282316758"/>
       </p:ext>
     </p:extLst>
   </p:cSld>
@@ -5634,10 +5888,2444 @@
       </p:grpSpPr>
       <p:sp>
         <p:nvSpPr>
-          <p:cNvPr id="10" name="Rectangle 9">
+          <p:cNvPr id="2" name="Title 1">
             <a:extLst>
               <a:ext uri="{FF2B5EF4-FFF2-40B4-BE49-F238E27FC236}">
-                <a16:creationId xmlns:a16="http://schemas.microsoft.com/office/drawing/2014/main" id="{E09012B2-8D02-7C49-9B5A-50D9EE52334D}"/>
+                <a16:creationId xmlns:a16="http://schemas.microsoft.com/office/drawing/2014/main" id="{006B299C-04F3-8747-A305-AAE66FFD36D4}"/>
+              </a:ext>
+            </a:extLst>
+          </p:cNvPr>
+          <p:cNvSpPr>
+            <a:spLocks noGrp="1"/>
+          </p:cNvSpPr>
+          <p:nvPr>
+            <p:ph type="title"/>
+          </p:nvPr>
+        </p:nvSpPr>
+        <p:spPr/>
+        <p:txBody>
+          <a:bodyPr>
+            <a:noAutofit/>
+          </a:bodyPr>
+          <a:lstStyle/>
+          <a:p>
+            <a:r>
+              <a:rPr lang="en-US" sz="3200" dirty="0"/>
+              <a:t>Infrastructure as Code (</a:t>
+            </a:r>
+            <a:r>
+              <a:rPr lang="en-US" sz="3200" dirty="0" err="1"/>
+              <a:t>IaC</a:t>
+            </a:r>
+            <a:r>
+              <a:rPr lang="en-US" sz="3200" dirty="0"/>
+              <a:t>) - Tools</a:t>
+            </a:r>
+          </a:p>
+        </p:txBody>
+      </p:sp>
+      <p:sp>
+        <p:nvSpPr>
+          <p:cNvPr id="8" name="TextBox 7">
+            <a:extLst>
+              <a:ext uri="{FF2B5EF4-FFF2-40B4-BE49-F238E27FC236}">
+                <a16:creationId xmlns:a16="http://schemas.microsoft.com/office/drawing/2014/main" id="{96833E7D-6DC1-7041-A2C7-83EB10D16A32}"/>
+              </a:ext>
+            </a:extLst>
+          </p:cNvPr>
+          <p:cNvSpPr txBox="1"/>
+          <p:nvPr/>
+        </p:nvSpPr>
+        <p:spPr>
+          <a:xfrm>
+            <a:off x="6782669" y="1792135"/>
+            <a:ext cx="4878135" cy="3816429"/>
+          </a:xfrm>
+          <a:prstGeom prst="rect">
+            <a:avLst/>
+          </a:prstGeom>
+          <a:solidFill>
+            <a:srgbClr val="000000"/>
+          </a:solidFill>
+        </p:spPr>
+        <p:txBody>
+          <a:bodyPr wrap="square" rtlCol="0">
+            <a:spAutoFit/>
+          </a:bodyPr>
+          <a:lstStyle/>
+          <a:p>
+            <a:endParaRPr lang="en-GB" sz="1100" dirty="0">
+              <a:solidFill>
+                <a:srgbClr val="569CD6"/>
+              </a:solidFill>
+              <a:latin typeface="Menlo" panose="020B0609030804020204" pitchFamily="49" charset="0"/>
+            </a:endParaRPr>
+          </a:p>
+          <a:p>
+            <a:r>
+              <a:rPr lang="en-GB" sz="1100" dirty="0">
+                <a:solidFill>
+                  <a:srgbClr val="569CD6"/>
+                </a:solidFill>
+                <a:latin typeface="Menlo" panose="020B0609030804020204" pitchFamily="49" charset="0"/>
+              </a:rPr>
+              <a:t>Resources</a:t>
+            </a:r>
+            <a:r>
+              <a:rPr lang="en-GB" sz="1100" dirty="0">
+                <a:solidFill>
+                  <a:srgbClr val="D4D4D4"/>
+                </a:solidFill>
+                <a:latin typeface="Menlo" panose="020B0609030804020204" pitchFamily="49" charset="0"/>
+              </a:rPr>
+              <a:t>:</a:t>
+            </a:r>
+          </a:p>
+          <a:p>
+            <a:r>
+              <a:rPr lang="en-GB" sz="1100" dirty="0">
+                <a:solidFill>
+                  <a:srgbClr val="569CD6"/>
+                </a:solidFill>
+                <a:latin typeface="Menlo" panose="020B0609030804020204" pitchFamily="49" charset="0"/>
+              </a:rPr>
+              <a:t>  </a:t>
+            </a:r>
+            <a:r>
+              <a:rPr lang="en-GB" sz="1100" dirty="0" err="1">
+                <a:solidFill>
+                  <a:srgbClr val="569CD6"/>
+                </a:solidFill>
+                <a:latin typeface="Menlo" panose="020B0609030804020204" pitchFamily="49" charset="0"/>
+              </a:rPr>
+              <a:t>ElasticLoadBalancer</a:t>
+            </a:r>
+            <a:r>
+              <a:rPr lang="en-GB" sz="1100" dirty="0">
+                <a:solidFill>
+                  <a:srgbClr val="D4D4D4"/>
+                </a:solidFill>
+                <a:latin typeface="Menlo" panose="020B0609030804020204" pitchFamily="49" charset="0"/>
+              </a:rPr>
+              <a:t>:</a:t>
+            </a:r>
+          </a:p>
+          <a:p>
+            <a:r>
+              <a:rPr lang="en-GB" sz="1100" dirty="0">
+                <a:solidFill>
+                  <a:srgbClr val="569CD6"/>
+                </a:solidFill>
+                <a:latin typeface="Menlo" panose="020B0609030804020204" pitchFamily="49" charset="0"/>
+              </a:rPr>
+              <a:t>    Type</a:t>
+            </a:r>
+            <a:r>
+              <a:rPr lang="en-GB" sz="1100" dirty="0">
+                <a:solidFill>
+                  <a:srgbClr val="D4D4D4"/>
+                </a:solidFill>
+                <a:latin typeface="Menlo" panose="020B0609030804020204" pitchFamily="49" charset="0"/>
+              </a:rPr>
+              <a:t>: </a:t>
+            </a:r>
+            <a:r>
+              <a:rPr lang="en-GB" sz="1100" dirty="0">
+                <a:solidFill>
+                  <a:srgbClr val="CE9178"/>
+                </a:solidFill>
+                <a:latin typeface="Menlo" panose="020B0609030804020204" pitchFamily="49" charset="0"/>
+              </a:rPr>
+              <a:t>AWS::</a:t>
+            </a:r>
+            <a:r>
+              <a:rPr lang="en-GB" sz="1100" dirty="0" err="1">
+                <a:solidFill>
+                  <a:srgbClr val="CE9178"/>
+                </a:solidFill>
+                <a:latin typeface="Menlo" panose="020B0609030804020204" pitchFamily="49" charset="0"/>
+              </a:rPr>
+              <a:t>ElasticLoadBalancing</a:t>
+            </a:r>
+            <a:r>
+              <a:rPr lang="en-GB" sz="1100" dirty="0">
+                <a:solidFill>
+                  <a:srgbClr val="CE9178"/>
+                </a:solidFill>
+                <a:latin typeface="Menlo" panose="020B0609030804020204" pitchFamily="49" charset="0"/>
+              </a:rPr>
+              <a:t>::</a:t>
+            </a:r>
+            <a:r>
+              <a:rPr lang="en-GB" sz="1100" dirty="0" err="1">
+                <a:solidFill>
+                  <a:srgbClr val="CE9178"/>
+                </a:solidFill>
+                <a:latin typeface="Menlo" panose="020B0609030804020204" pitchFamily="49" charset="0"/>
+              </a:rPr>
+              <a:t>LoadBalancer</a:t>
+            </a:r>
+            <a:endParaRPr lang="en-GB" sz="1100" dirty="0">
+              <a:solidFill>
+                <a:srgbClr val="D4D4D4"/>
+              </a:solidFill>
+              <a:latin typeface="Menlo" panose="020B0609030804020204" pitchFamily="49" charset="0"/>
+            </a:endParaRPr>
+          </a:p>
+          <a:p>
+            <a:r>
+              <a:rPr lang="en-GB" sz="1100" dirty="0">
+                <a:solidFill>
+                  <a:srgbClr val="569CD6"/>
+                </a:solidFill>
+                <a:latin typeface="Menlo" panose="020B0609030804020204" pitchFamily="49" charset="0"/>
+              </a:rPr>
+              <a:t>    Properties</a:t>
+            </a:r>
+            <a:r>
+              <a:rPr lang="en-GB" sz="1100" dirty="0">
+                <a:solidFill>
+                  <a:srgbClr val="D4D4D4"/>
+                </a:solidFill>
+                <a:latin typeface="Menlo" panose="020B0609030804020204" pitchFamily="49" charset="0"/>
+              </a:rPr>
+              <a:t>:</a:t>
+            </a:r>
+          </a:p>
+          <a:p>
+            <a:r>
+              <a:rPr lang="en-GB" sz="1100" dirty="0">
+                <a:solidFill>
+                  <a:srgbClr val="569CD6"/>
+                </a:solidFill>
+                <a:latin typeface="Menlo" panose="020B0609030804020204" pitchFamily="49" charset="0"/>
+              </a:rPr>
+              <a:t>      </a:t>
+            </a:r>
+            <a:r>
+              <a:rPr lang="en-GB" sz="1100" dirty="0" err="1">
+                <a:solidFill>
+                  <a:srgbClr val="569CD6"/>
+                </a:solidFill>
+                <a:latin typeface="Menlo" panose="020B0609030804020204" pitchFamily="49" charset="0"/>
+              </a:rPr>
+              <a:t>SecurityGroups</a:t>
+            </a:r>
+            <a:r>
+              <a:rPr lang="en-GB" sz="1100" dirty="0">
+                <a:solidFill>
+                  <a:srgbClr val="D4D4D4"/>
+                </a:solidFill>
+                <a:latin typeface="Menlo" panose="020B0609030804020204" pitchFamily="49" charset="0"/>
+              </a:rPr>
+              <a:t>:</a:t>
+            </a:r>
+          </a:p>
+          <a:p>
+            <a:r>
+              <a:rPr lang="en-GB" sz="1100" dirty="0">
+                <a:solidFill>
+                  <a:srgbClr val="D4D4D4"/>
+                </a:solidFill>
+                <a:latin typeface="Menlo" panose="020B0609030804020204" pitchFamily="49" charset="0"/>
+              </a:rPr>
+              <a:t>        - </a:t>
+            </a:r>
+            <a:r>
+              <a:rPr lang="en-GB" sz="1100" dirty="0">
+                <a:solidFill>
+                  <a:srgbClr val="569CD6"/>
+                </a:solidFill>
+                <a:latin typeface="Menlo" panose="020B0609030804020204" pitchFamily="49" charset="0"/>
+              </a:rPr>
+              <a:t>!Ref</a:t>
+            </a:r>
+            <a:r>
+              <a:rPr lang="en-GB" sz="1100" dirty="0">
+                <a:solidFill>
+                  <a:srgbClr val="D4D4D4"/>
+                </a:solidFill>
+                <a:latin typeface="Menlo" panose="020B0609030804020204" pitchFamily="49" charset="0"/>
+              </a:rPr>
+              <a:t> </a:t>
+            </a:r>
+            <a:r>
+              <a:rPr lang="en-GB" sz="1100" dirty="0" err="1">
+                <a:solidFill>
+                  <a:srgbClr val="CE9178"/>
+                </a:solidFill>
+                <a:latin typeface="Menlo" panose="020B0609030804020204" pitchFamily="49" charset="0"/>
+              </a:rPr>
+              <a:t>LoadBalancerSecurityGroup</a:t>
+            </a:r>
+            <a:endParaRPr lang="en-GB" sz="1100" dirty="0">
+              <a:solidFill>
+                <a:srgbClr val="D4D4D4"/>
+              </a:solidFill>
+              <a:latin typeface="Menlo" panose="020B0609030804020204" pitchFamily="49" charset="0"/>
+            </a:endParaRPr>
+          </a:p>
+          <a:p>
+            <a:r>
+              <a:rPr lang="en-GB" sz="1100" dirty="0">
+                <a:solidFill>
+                  <a:srgbClr val="569CD6"/>
+                </a:solidFill>
+                <a:latin typeface="Menlo" panose="020B0609030804020204" pitchFamily="49" charset="0"/>
+              </a:rPr>
+              <a:t>      Subnets</a:t>
+            </a:r>
+            <a:r>
+              <a:rPr lang="en-GB" sz="1100" dirty="0">
+                <a:solidFill>
+                  <a:srgbClr val="D4D4D4"/>
+                </a:solidFill>
+                <a:latin typeface="Menlo" panose="020B0609030804020204" pitchFamily="49" charset="0"/>
+              </a:rPr>
+              <a:t>:</a:t>
+            </a:r>
+          </a:p>
+          <a:p>
+            <a:r>
+              <a:rPr lang="en-GB" sz="1100" dirty="0">
+                <a:solidFill>
+                  <a:srgbClr val="D4D4D4"/>
+                </a:solidFill>
+                <a:latin typeface="Menlo" panose="020B0609030804020204" pitchFamily="49" charset="0"/>
+              </a:rPr>
+              <a:t>        - </a:t>
+            </a:r>
+            <a:r>
+              <a:rPr lang="en-GB" sz="1100" dirty="0">
+                <a:solidFill>
+                  <a:srgbClr val="569CD6"/>
+                </a:solidFill>
+                <a:latin typeface="Menlo" panose="020B0609030804020204" pitchFamily="49" charset="0"/>
+              </a:rPr>
+              <a:t>!</a:t>
+            </a:r>
+            <a:r>
+              <a:rPr lang="en-GB" sz="1100" dirty="0" err="1">
+                <a:solidFill>
+                  <a:srgbClr val="569CD6"/>
+                </a:solidFill>
+                <a:latin typeface="Menlo" panose="020B0609030804020204" pitchFamily="49" charset="0"/>
+              </a:rPr>
+              <a:t>ImportValue</a:t>
+            </a:r>
+            <a:r>
+              <a:rPr lang="en-GB" sz="1100" dirty="0">
+                <a:solidFill>
+                  <a:srgbClr val="569CD6"/>
+                </a:solidFill>
+                <a:latin typeface="Menlo" panose="020B0609030804020204" pitchFamily="49" charset="0"/>
+              </a:rPr>
+              <a:t>:</a:t>
+            </a:r>
+            <a:r>
+              <a:rPr lang="en-GB" sz="1100" dirty="0">
+                <a:solidFill>
+                  <a:srgbClr val="D4D4D4"/>
+                </a:solidFill>
+                <a:latin typeface="Menlo" panose="020B0609030804020204" pitchFamily="49" charset="0"/>
+              </a:rPr>
+              <a:t> </a:t>
+            </a:r>
+            <a:r>
+              <a:rPr lang="en-GB" sz="1100" dirty="0">
+                <a:solidFill>
+                  <a:srgbClr val="CE9178"/>
+                </a:solidFill>
+                <a:latin typeface="Menlo" panose="020B0609030804020204" pitchFamily="49" charset="0"/>
+              </a:rPr>
+              <a:t>PublicSubnet1A</a:t>
+            </a:r>
+            <a:endParaRPr lang="en-GB" sz="1100" dirty="0">
+              <a:solidFill>
+                <a:srgbClr val="D4D4D4"/>
+              </a:solidFill>
+              <a:latin typeface="Menlo" panose="020B0609030804020204" pitchFamily="49" charset="0"/>
+            </a:endParaRPr>
+          </a:p>
+          <a:p>
+            <a:r>
+              <a:rPr lang="en-GB" sz="1100" dirty="0">
+                <a:solidFill>
+                  <a:srgbClr val="D4D4D4"/>
+                </a:solidFill>
+                <a:latin typeface="Menlo" panose="020B0609030804020204" pitchFamily="49" charset="0"/>
+              </a:rPr>
+              <a:t>        - </a:t>
+            </a:r>
+            <a:r>
+              <a:rPr lang="en-GB" sz="1100" dirty="0">
+                <a:solidFill>
+                  <a:srgbClr val="569CD6"/>
+                </a:solidFill>
+                <a:latin typeface="Menlo" panose="020B0609030804020204" pitchFamily="49" charset="0"/>
+              </a:rPr>
+              <a:t>!</a:t>
+            </a:r>
+            <a:r>
+              <a:rPr lang="en-GB" sz="1100" dirty="0" err="1">
+                <a:solidFill>
+                  <a:srgbClr val="569CD6"/>
+                </a:solidFill>
+                <a:latin typeface="Menlo" panose="020B0609030804020204" pitchFamily="49" charset="0"/>
+              </a:rPr>
+              <a:t>ImportValue</a:t>
+            </a:r>
+            <a:r>
+              <a:rPr lang="en-GB" sz="1100" dirty="0">
+                <a:solidFill>
+                  <a:srgbClr val="569CD6"/>
+                </a:solidFill>
+                <a:latin typeface="Menlo" panose="020B0609030804020204" pitchFamily="49" charset="0"/>
+              </a:rPr>
+              <a:t>:</a:t>
+            </a:r>
+            <a:r>
+              <a:rPr lang="en-GB" sz="1100" dirty="0">
+                <a:solidFill>
+                  <a:srgbClr val="D4D4D4"/>
+                </a:solidFill>
+                <a:latin typeface="Menlo" panose="020B0609030804020204" pitchFamily="49" charset="0"/>
+              </a:rPr>
+              <a:t> </a:t>
+            </a:r>
+            <a:r>
+              <a:rPr lang="en-GB" sz="1100" dirty="0">
+                <a:solidFill>
+                  <a:srgbClr val="CE9178"/>
+                </a:solidFill>
+                <a:latin typeface="Menlo" panose="020B0609030804020204" pitchFamily="49" charset="0"/>
+              </a:rPr>
+              <a:t>PublicSubnet1B</a:t>
+            </a:r>
+            <a:endParaRPr lang="en-GB" sz="1100" dirty="0">
+              <a:solidFill>
+                <a:srgbClr val="D4D4D4"/>
+              </a:solidFill>
+              <a:latin typeface="Menlo" panose="020B0609030804020204" pitchFamily="49" charset="0"/>
+            </a:endParaRPr>
+          </a:p>
+          <a:p>
+            <a:r>
+              <a:rPr lang="en-GB" sz="1100" dirty="0">
+                <a:solidFill>
+                  <a:srgbClr val="569CD6"/>
+                </a:solidFill>
+                <a:latin typeface="Menlo" panose="020B0609030804020204" pitchFamily="49" charset="0"/>
+              </a:rPr>
+              <a:t>      Listeners</a:t>
+            </a:r>
+            <a:r>
+              <a:rPr lang="en-GB" sz="1100" dirty="0">
+                <a:solidFill>
+                  <a:srgbClr val="D4D4D4"/>
+                </a:solidFill>
+                <a:latin typeface="Menlo" panose="020B0609030804020204" pitchFamily="49" charset="0"/>
+              </a:rPr>
+              <a:t>:</a:t>
+            </a:r>
+          </a:p>
+          <a:p>
+            <a:r>
+              <a:rPr lang="en-GB" sz="1100" dirty="0">
+                <a:solidFill>
+                  <a:srgbClr val="569CD6"/>
+                </a:solidFill>
+                <a:latin typeface="Menlo" panose="020B0609030804020204" pitchFamily="49" charset="0"/>
+              </a:rPr>
+              <a:t>        </a:t>
+            </a:r>
+            <a:r>
+              <a:rPr lang="en-GB" sz="1100" dirty="0" err="1">
+                <a:solidFill>
+                  <a:srgbClr val="569CD6"/>
+                </a:solidFill>
+                <a:latin typeface="Menlo" panose="020B0609030804020204" pitchFamily="49" charset="0"/>
+              </a:rPr>
+              <a:t>LoadBalancerPort</a:t>
+            </a:r>
+            <a:r>
+              <a:rPr lang="en-GB" sz="1100" dirty="0">
+                <a:solidFill>
+                  <a:srgbClr val="D4D4D4"/>
+                </a:solidFill>
+                <a:latin typeface="Menlo" panose="020B0609030804020204" pitchFamily="49" charset="0"/>
+              </a:rPr>
+              <a:t>: </a:t>
+            </a:r>
+            <a:r>
+              <a:rPr lang="en-GB" sz="1100" dirty="0">
+                <a:solidFill>
+                  <a:srgbClr val="B5CEA8"/>
+                </a:solidFill>
+                <a:latin typeface="Menlo" panose="020B0609030804020204" pitchFamily="49" charset="0"/>
+              </a:rPr>
+              <a:t>443</a:t>
+            </a:r>
+            <a:endParaRPr lang="en-GB" sz="1100" dirty="0">
+              <a:solidFill>
+                <a:srgbClr val="D4D4D4"/>
+              </a:solidFill>
+              <a:latin typeface="Menlo" panose="020B0609030804020204" pitchFamily="49" charset="0"/>
+            </a:endParaRPr>
+          </a:p>
+          <a:p>
+            <a:r>
+              <a:rPr lang="en-GB" sz="1100" dirty="0">
+                <a:solidFill>
+                  <a:srgbClr val="569CD6"/>
+                </a:solidFill>
+                <a:latin typeface="Menlo" panose="020B0609030804020204" pitchFamily="49" charset="0"/>
+              </a:rPr>
+              <a:t>        </a:t>
+            </a:r>
+            <a:r>
+              <a:rPr lang="en-GB" sz="1100" dirty="0" err="1">
+                <a:solidFill>
+                  <a:srgbClr val="569CD6"/>
+                </a:solidFill>
+                <a:latin typeface="Menlo" panose="020B0609030804020204" pitchFamily="49" charset="0"/>
+              </a:rPr>
+              <a:t>InstancePort</a:t>
+            </a:r>
+            <a:r>
+              <a:rPr lang="en-GB" sz="1100" dirty="0">
+                <a:solidFill>
+                  <a:srgbClr val="D4D4D4"/>
+                </a:solidFill>
+                <a:latin typeface="Menlo" panose="020B0609030804020204" pitchFamily="49" charset="0"/>
+              </a:rPr>
+              <a:t>: </a:t>
+            </a:r>
+            <a:r>
+              <a:rPr lang="en-GB" sz="1100" dirty="0">
+                <a:solidFill>
+                  <a:srgbClr val="B5CEA8"/>
+                </a:solidFill>
+                <a:latin typeface="Menlo" panose="020B0609030804020204" pitchFamily="49" charset="0"/>
+              </a:rPr>
+              <a:t>8080</a:t>
+            </a:r>
+            <a:endParaRPr lang="en-GB" sz="1100" dirty="0">
+              <a:solidFill>
+                <a:srgbClr val="D4D4D4"/>
+              </a:solidFill>
+              <a:latin typeface="Menlo" panose="020B0609030804020204" pitchFamily="49" charset="0"/>
+            </a:endParaRPr>
+          </a:p>
+          <a:p>
+            <a:r>
+              <a:rPr lang="en-GB" sz="1100" dirty="0">
+                <a:solidFill>
+                  <a:srgbClr val="569CD6"/>
+                </a:solidFill>
+                <a:latin typeface="Menlo" panose="020B0609030804020204" pitchFamily="49" charset="0"/>
+              </a:rPr>
+              <a:t>        Protocol</a:t>
+            </a:r>
+            <a:r>
+              <a:rPr lang="en-GB" sz="1100" dirty="0">
+                <a:solidFill>
+                  <a:srgbClr val="D4D4D4"/>
+                </a:solidFill>
+                <a:latin typeface="Menlo" panose="020B0609030804020204" pitchFamily="49" charset="0"/>
+              </a:rPr>
+              <a:t>: </a:t>
+            </a:r>
+            <a:r>
+              <a:rPr lang="en-GB" sz="1100" dirty="0">
+                <a:solidFill>
+                  <a:srgbClr val="CE9178"/>
+                </a:solidFill>
+                <a:latin typeface="Menlo" panose="020B0609030804020204" pitchFamily="49" charset="0"/>
+              </a:rPr>
+              <a:t>HTTPS</a:t>
+            </a:r>
+            <a:endParaRPr lang="en-GB" sz="1100" dirty="0">
+              <a:solidFill>
+                <a:srgbClr val="D4D4D4"/>
+              </a:solidFill>
+              <a:latin typeface="Menlo" panose="020B0609030804020204" pitchFamily="49" charset="0"/>
+            </a:endParaRPr>
+          </a:p>
+          <a:p>
+            <a:r>
+              <a:rPr lang="en-GB" sz="1100" dirty="0">
+                <a:solidFill>
+                  <a:srgbClr val="569CD6"/>
+                </a:solidFill>
+                <a:latin typeface="Menlo" panose="020B0609030804020204" pitchFamily="49" charset="0"/>
+              </a:rPr>
+              <a:t>        </a:t>
+            </a:r>
+            <a:r>
+              <a:rPr lang="en-GB" sz="1100" dirty="0" err="1">
+                <a:solidFill>
+                  <a:srgbClr val="569CD6"/>
+                </a:solidFill>
+                <a:latin typeface="Menlo" panose="020B0609030804020204" pitchFamily="49" charset="0"/>
+              </a:rPr>
+              <a:t>SSLCertificateId</a:t>
+            </a:r>
+            <a:r>
+              <a:rPr lang="en-GB" sz="1100" dirty="0">
+                <a:solidFill>
+                  <a:srgbClr val="D4D4D4"/>
+                </a:solidFill>
+                <a:latin typeface="Menlo" panose="020B0609030804020204" pitchFamily="49" charset="0"/>
+              </a:rPr>
+              <a:t>: </a:t>
+            </a:r>
+            <a:r>
+              <a:rPr lang="en-GB" sz="1100" dirty="0">
+                <a:solidFill>
+                  <a:srgbClr val="569CD6"/>
+                </a:solidFill>
+                <a:latin typeface="Menlo" panose="020B0609030804020204" pitchFamily="49" charset="0"/>
+              </a:rPr>
+              <a:t>!</a:t>
+            </a:r>
+            <a:r>
+              <a:rPr lang="en-GB" sz="1100" dirty="0" err="1">
+                <a:solidFill>
+                  <a:srgbClr val="569CD6"/>
+                </a:solidFill>
+                <a:latin typeface="Menlo" panose="020B0609030804020204" pitchFamily="49" charset="0"/>
+              </a:rPr>
+              <a:t>ImportValue</a:t>
+            </a:r>
+            <a:r>
+              <a:rPr lang="en-GB" sz="1100" dirty="0">
+                <a:solidFill>
+                  <a:srgbClr val="D4D4D4"/>
+                </a:solidFill>
+                <a:latin typeface="Menlo" panose="020B0609030804020204" pitchFamily="49" charset="0"/>
+              </a:rPr>
+              <a:t> </a:t>
+            </a:r>
+            <a:r>
+              <a:rPr lang="en-GB" sz="1100" dirty="0" err="1">
+                <a:solidFill>
+                  <a:srgbClr val="CE9178"/>
+                </a:solidFill>
+                <a:latin typeface="Menlo" panose="020B0609030804020204" pitchFamily="49" charset="0"/>
+              </a:rPr>
+              <a:t>CertificateId</a:t>
+            </a:r>
+            <a:endParaRPr lang="en-GB" sz="1100" dirty="0">
+              <a:solidFill>
+                <a:srgbClr val="D4D4D4"/>
+              </a:solidFill>
+              <a:latin typeface="Menlo" panose="020B0609030804020204" pitchFamily="49" charset="0"/>
+            </a:endParaRPr>
+          </a:p>
+          <a:p>
+            <a:r>
+              <a:rPr lang="en-GB" sz="1100" dirty="0">
+                <a:solidFill>
+                  <a:srgbClr val="569CD6"/>
+                </a:solidFill>
+                <a:latin typeface="Menlo" panose="020B0609030804020204" pitchFamily="49" charset="0"/>
+              </a:rPr>
+              <a:t>      </a:t>
+            </a:r>
+            <a:r>
+              <a:rPr lang="en-GB" sz="1100" dirty="0" err="1">
+                <a:solidFill>
+                  <a:srgbClr val="569CD6"/>
+                </a:solidFill>
+                <a:latin typeface="Menlo" panose="020B0609030804020204" pitchFamily="49" charset="0"/>
+              </a:rPr>
+              <a:t>HealthCheck</a:t>
+            </a:r>
+            <a:r>
+              <a:rPr lang="en-GB" sz="1100" dirty="0">
+                <a:solidFill>
+                  <a:srgbClr val="D4D4D4"/>
+                </a:solidFill>
+                <a:latin typeface="Menlo" panose="020B0609030804020204" pitchFamily="49" charset="0"/>
+              </a:rPr>
+              <a:t>:</a:t>
+            </a:r>
+          </a:p>
+          <a:p>
+            <a:r>
+              <a:rPr lang="en-GB" sz="1100" dirty="0">
+                <a:solidFill>
+                  <a:srgbClr val="569CD6"/>
+                </a:solidFill>
+                <a:latin typeface="Menlo" panose="020B0609030804020204" pitchFamily="49" charset="0"/>
+              </a:rPr>
+              <a:t>        Target</a:t>
+            </a:r>
+            <a:r>
+              <a:rPr lang="en-GB" sz="1100" dirty="0">
+                <a:solidFill>
+                  <a:srgbClr val="D4D4D4"/>
+                </a:solidFill>
+                <a:latin typeface="Menlo" panose="020B0609030804020204" pitchFamily="49" charset="0"/>
+              </a:rPr>
+              <a:t>: </a:t>
+            </a:r>
+            <a:r>
+              <a:rPr lang="en-GB" sz="1100" dirty="0">
+                <a:solidFill>
+                  <a:srgbClr val="CE9178"/>
+                </a:solidFill>
+                <a:latin typeface="Menlo" panose="020B0609030804020204" pitchFamily="49" charset="0"/>
+              </a:rPr>
+              <a:t>'HTTP:80/'</a:t>
+            </a:r>
+            <a:endParaRPr lang="en-GB" sz="1100" dirty="0">
+              <a:solidFill>
+                <a:srgbClr val="D4D4D4"/>
+              </a:solidFill>
+              <a:latin typeface="Menlo" panose="020B0609030804020204" pitchFamily="49" charset="0"/>
+            </a:endParaRPr>
+          </a:p>
+          <a:p>
+            <a:r>
+              <a:rPr lang="en-GB" sz="1100" dirty="0">
+                <a:solidFill>
+                  <a:srgbClr val="569CD6"/>
+                </a:solidFill>
+                <a:latin typeface="Menlo" panose="020B0609030804020204" pitchFamily="49" charset="0"/>
+              </a:rPr>
+              <a:t>        </a:t>
+            </a:r>
+            <a:r>
+              <a:rPr lang="en-GB" sz="1100" dirty="0" err="1">
+                <a:solidFill>
+                  <a:srgbClr val="569CD6"/>
+                </a:solidFill>
+                <a:latin typeface="Menlo" panose="020B0609030804020204" pitchFamily="49" charset="0"/>
+              </a:rPr>
+              <a:t>HealtyThreshold</a:t>
+            </a:r>
+            <a:r>
+              <a:rPr lang="en-GB" sz="1100" dirty="0">
+                <a:solidFill>
+                  <a:srgbClr val="D4D4D4"/>
+                </a:solidFill>
+                <a:latin typeface="Menlo" panose="020B0609030804020204" pitchFamily="49" charset="0"/>
+              </a:rPr>
+              <a:t>: </a:t>
+            </a:r>
+            <a:r>
+              <a:rPr lang="en-GB" sz="1100" dirty="0">
+                <a:solidFill>
+                  <a:srgbClr val="B5CEA8"/>
+                </a:solidFill>
+                <a:latin typeface="Menlo" panose="020B0609030804020204" pitchFamily="49" charset="0"/>
+              </a:rPr>
+              <a:t>2</a:t>
+            </a:r>
+            <a:endParaRPr lang="en-GB" sz="1100" dirty="0">
+              <a:solidFill>
+                <a:srgbClr val="D4D4D4"/>
+              </a:solidFill>
+              <a:latin typeface="Menlo" panose="020B0609030804020204" pitchFamily="49" charset="0"/>
+            </a:endParaRPr>
+          </a:p>
+          <a:p>
+            <a:r>
+              <a:rPr lang="en-GB" sz="1100" dirty="0">
+                <a:solidFill>
+                  <a:srgbClr val="569CD6"/>
+                </a:solidFill>
+                <a:latin typeface="Menlo" panose="020B0609030804020204" pitchFamily="49" charset="0"/>
+              </a:rPr>
+              <a:t>        </a:t>
+            </a:r>
+            <a:r>
+              <a:rPr lang="en-GB" sz="1100" dirty="0" err="1">
+                <a:solidFill>
+                  <a:srgbClr val="569CD6"/>
+                </a:solidFill>
+                <a:latin typeface="Menlo" panose="020B0609030804020204" pitchFamily="49" charset="0"/>
+              </a:rPr>
+              <a:t>UnhealtyThreshold</a:t>
+            </a:r>
+            <a:r>
+              <a:rPr lang="en-GB" sz="1100" dirty="0">
+                <a:solidFill>
+                  <a:srgbClr val="D4D4D4"/>
+                </a:solidFill>
+                <a:latin typeface="Menlo" panose="020B0609030804020204" pitchFamily="49" charset="0"/>
+              </a:rPr>
+              <a:t>: </a:t>
+            </a:r>
+            <a:r>
+              <a:rPr lang="en-GB" sz="1100" dirty="0">
+                <a:solidFill>
+                  <a:srgbClr val="B5CEA8"/>
+                </a:solidFill>
+                <a:latin typeface="Menlo" panose="020B0609030804020204" pitchFamily="49" charset="0"/>
+              </a:rPr>
+              <a:t>3</a:t>
+            </a:r>
+            <a:endParaRPr lang="en-GB" sz="1100" dirty="0">
+              <a:solidFill>
+                <a:srgbClr val="D4D4D4"/>
+              </a:solidFill>
+              <a:latin typeface="Menlo" panose="020B0609030804020204" pitchFamily="49" charset="0"/>
+            </a:endParaRPr>
+          </a:p>
+          <a:p>
+            <a:r>
+              <a:rPr lang="en-GB" sz="1100" dirty="0">
+                <a:solidFill>
+                  <a:srgbClr val="569CD6"/>
+                </a:solidFill>
+                <a:latin typeface="Menlo" panose="020B0609030804020204" pitchFamily="49" charset="0"/>
+              </a:rPr>
+              <a:t>        Interval</a:t>
+            </a:r>
+            <a:r>
+              <a:rPr lang="en-GB" sz="1100" dirty="0">
+                <a:solidFill>
+                  <a:srgbClr val="D4D4D4"/>
+                </a:solidFill>
+                <a:latin typeface="Menlo" panose="020B0609030804020204" pitchFamily="49" charset="0"/>
+              </a:rPr>
+              <a:t>: </a:t>
+            </a:r>
+            <a:r>
+              <a:rPr lang="en-GB" sz="1100" dirty="0">
+                <a:solidFill>
+                  <a:srgbClr val="B5CEA8"/>
+                </a:solidFill>
+                <a:latin typeface="Menlo" panose="020B0609030804020204" pitchFamily="49" charset="0"/>
+              </a:rPr>
+              <a:t>20</a:t>
+            </a:r>
+            <a:endParaRPr lang="en-GB" sz="1100" dirty="0">
+              <a:solidFill>
+                <a:srgbClr val="D4D4D4"/>
+              </a:solidFill>
+              <a:latin typeface="Menlo" panose="020B0609030804020204" pitchFamily="49" charset="0"/>
+            </a:endParaRPr>
+          </a:p>
+          <a:p>
+            <a:r>
+              <a:rPr lang="en-GB" sz="1100" dirty="0">
+                <a:solidFill>
+                  <a:srgbClr val="569CD6"/>
+                </a:solidFill>
+                <a:latin typeface="Menlo" panose="020B0609030804020204" pitchFamily="49" charset="0"/>
+              </a:rPr>
+              <a:t>        Timeout</a:t>
+            </a:r>
+            <a:r>
+              <a:rPr lang="en-GB" sz="1100" dirty="0">
+                <a:solidFill>
+                  <a:srgbClr val="D4D4D4"/>
+                </a:solidFill>
+                <a:latin typeface="Menlo" panose="020B0609030804020204" pitchFamily="49" charset="0"/>
+              </a:rPr>
+              <a:t>: </a:t>
+            </a:r>
+            <a:r>
+              <a:rPr lang="en-GB" sz="1100" dirty="0">
+                <a:solidFill>
+                  <a:srgbClr val="B5CEA8"/>
+                </a:solidFill>
+                <a:latin typeface="Menlo" panose="020B0609030804020204" pitchFamily="49" charset="0"/>
+              </a:rPr>
+              <a:t>10</a:t>
+            </a:r>
+            <a:endParaRPr lang="en-GB" sz="1100" dirty="0">
+              <a:solidFill>
+                <a:srgbClr val="D4D4D4"/>
+              </a:solidFill>
+              <a:latin typeface="Menlo" panose="020B0609030804020204" pitchFamily="49" charset="0"/>
+            </a:endParaRPr>
+          </a:p>
+          <a:p>
+            <a:endParaRPr lang="en-SE" sz="1100" dirty="0"/>
+          </a:p>
+        </p:txBody>
+      </p:sp>
+      <p:sp>
+        <p:nvSpPr>
+          <p:cNvPr id="3" name="TextBox 2">
+            <a:extLst>
+              <a:ext uri="{FF2B5EF4-FFF2-40B4-BE49-F238E27FC236}">
+                <a16:creationId xmlns:a16="http://schemas.microsoft.com/office/drawing/2014/main" id="{7B73804B-AAF5-AE44-AC3F-EC4596619D8B}"/>
+              </a:ext>
+            </a:extLst>
+          </p:cNvPr>
+          <p:cNvSpPr txBox="1"/>
+          <p:nvPr/>
+        </p:nvSpPr>
+        <p:spPr>
+          <a:xfrm>
+            <a:off x="9776955" y="5346954"/>
+            <a:ext cx="1883849" cy="261610"/>
+          </a:xfrm>
+          <a:prstGeom prst="rect">
+            <a:avLst/>
+          </a:prstGeom>
+          <a:noFill/>
+        </p:spPr>
+        <p:txBody>
+          <a:bodyPr wrap="none" rtlCol="0">
+            <a:spAutoFit/>
+          </a:bodyPr>
+          <a:lstStyle/>
+          <a:p>
+            <a:pPr algn="r"/>
+            <a:r>
+              <a:rPr lang="en-US" sz="1050" dirty="0">
+                <a:solidFill>
+                  <a:schemeClr val="bg1"/>
+                </a:solidFill>
+                <a:latin typeface="Menlo" panose="020B0609030804020204" pitchFamily="49" charset="0"/>
+                <a:ea typeface="Menlo" panose="020B0609030804020204" pitchFamily="49" charset="0"/>
+                <a:cs typeface="Menlo" panose="020B0609030804020204" pitchFamily="49" charset="0"/>
+              </a:rPr>
+              <a:t>[AWS CloudFormation]</a:t>
+            </a:r>
+          </a:p>
+        </p:txBody>
+      </p:sp>
+      <p:pic>
+        <p:nvPicPr>
+          <p:cNvPr id="1028" name="Picture 4" descr="How to use AWS Cloud​Formation to setup a static website - Coletiv Blog">
+            <a:extLst>
+              <a:ext uri="{FF2B5EF4-FFF2-40B4-BE49-F238E27FC236}">
+                <a16:creationId xmlns:a16="http://schemas.microsoft.com/office/drawing/2014/main" id="{81DFE706-281E-FB41-8B69-C59478517101}"/>
+              </a:ext>
+            </a:extLst>
+          </p:cNvPr>
+          <p:cNvPicPr>
+            <a:picLocks noChangeAspect="1" noChangeArrowheads="1"/>
+          </p:cNvPicPr>
+          <p:nvPr/>
+        </p:nvPicPr>
+        <p:blipFill>
+          <a:blip r:embed="rId2">
+            <a:extLst>
+              <a:ext uri="{28A0092B-C50C-407E-A947-70E740481C1C}">
+                <a14:useLocalDpi xmlns:a14="http://schemas.microsoft.com/office/drawing/2010/main" val="0"/>
+              </a:ext>
+            </a:extLst>
+          </a:blip>
+          <a:srcRect/>
+          <a:stretch>
+            <a:fillRect/>
+          </a:stretch>
+        </p:blipFill>
+        <p:spPr bwMode="auto">
+          <a:xfrm>
+            <a:off x="669025" y="1787970"/>
+            <a:ext cx="3077667" cy="1797907"/>
+          </a:xfrm>
+          <a:prstGeom prst="rect">
+            <a:avLst/>
+          </a:prstGeom>
+          <a:noFill/>
+          <a:ln>
+            <a:solidFill>
+              <a:schemeClr val="tx1"/>
+            </a:solidFill>
+          </a:ln>
+          <a:extLst>
+            <a:ext uri="{909E8E84-426E-40DD-AFC4-6F175D3DCCD1}">
+              <a14:hiddenFill xmlns:a14="http://schemas.microsoft.com/office/drawing/2010/main">
+                <a:solidFill>
+                  <a:srgbClr val="FFFFFF"/>
+                </a:solidFill>
+              </a14:hiddenFill>
+            </a:ext>
+          </a:extLst>
+        </p:spPr>
+      </p:pic>
+      <p:grpSp>
+        <p:nvGrpSpPr>
+          <p:cNvPr id="5" name="Group 4">
+            <a:extLst>
+              <a:ext uri="{FF2B5EF4-FFF2-40B4-BE49-F238E27FC236}">
+                <a16:creationId xmlns:a16="http://schemas.microsoft.com/office/drawing/2014/main" id="{522BB828-1A54-A747-8A1B-F2A52EE7C9B0}"/>
+              </a:ext>
+            </a:extLst>
+          </p:cNvPr>
+          <p:cNvGrpSpPr/>
+          <p:nvPr/>
+        </p:nvGrpSpPr>
+        <p:grpSpPr>
+          <a:xfrm>
+            <a:off x="669026" y="3810657"/>
+            <a:ext cx="3077668" cy="1797907"/>
+            <a:chOff x="1954236" y="3724498"/>
+            <a:chExt cx="3077668" cy="1797907"/>
+          </a:xfrm>
+        </p:grpSpPr>
+        <p:sp>
+          <p:nvSpPr>
+            <p:cNvPr id="4" name="Rectangle 3">
+              <a:extLst>
+                <a:ext uri="{FF2B5EF4-FFF2-40B4-BE49-F238E27FC236}">
+                  <a16:creationId xmlns:a16="http://schemas.microsoft.com/office/drawing/2014/main" id="{CBBE511A-61CC-5D4A-A3EC-BBE5841D47C3}"/>
+                </a:ext>
+              </a:extLst>
+            </p:cNvPr>
+            <p:cNvSpPr/>
+            <p:nvPr/>
+          </p:nvSpPr>
+          <p:spPr>
+            <a:xfrm>
+              <a:off x="1954236" y="3724498"/>
+              <a:ext cx="3077668" cy="1797907"/>
+            </a:xfrm>
+            <a:prstGeom prst="rect">
+              <a:avLst/>
+            </a:prstGeom>
+            <a:solidFill>
+              <a:srgbClr val="F6F6F6"/>
+            </a:solidFill>
+            <a:ln>
+              <a:solidFill>
+                <a:schemeClr val="tx1"/>
+              </a:solidFill>
+            </a:ln>
+          </p:spPr>
+          <p:style>
+            <a:lnRef idx="2">
+              <a:schemeClr val="accent1">
+                <a:shade val="50000"/>
+              </a:schemeClr>
+            </a:lnRef>
+            <a:fillRef idx="1">
+              <a:schemeClr val="accent1"/>
+            </a:fillRef>
+            <a:effectRef idx="0">
+              <a:schemeClr val="accent1"/>
+            </a:effectRef>
+            <a:fontRef idx="minor">
+              <a:schemeClr val="lt1"/>
+            </a:fontRef>
+          </p:style>
+          <p:txBody>
+            <a:bodyPr rtlCol="0" anchor="ctr"/>
+            <a:lstStyle/>
+            <a:p>
+              <a:pPr algn="ctr"/>
+              <a:endParaRPr lang="en-US"/>
+            </a:p>
+          </p:txBody>
+        </p:sp>
+        <p:pic>
+          <p:nvPicPr>
+            <p:cNvPr id="1030" name="Picture 6" descr="Building Infrastructure using Terraform - ALMtoolbox NewsALMtoolbox News">
+              <a:extLst>
+                <a:ext uri="{FF2B5EF4-FFF2-40B4-BE49-F238E27FC236}">
+                  <a16:creationId xmlns:a16="http://schemas.microsoft.com/office/drawing/2014/main" id="{549CF92F-F9DE-D045-A7E1-B528002411BE}"/>
+                </a:ext>
+              </a:extLst>
+            </p:cNvPr>
+            <p:cNvPicPr>
+              <a:picLocks noChangeAspect="1" noChangeArrowheads="1"/>
+            </p:cNvPicPr>
+            <p:nvPr/>
+          </p:nvPicPr>
+          <p:blipFill>
+            <a:blip r:embed="rId3">
+              <a:extLst>
+                <a:ext uri="{28A0092B-C50C-407E-A947-70E740481C1C}">
+                  <a14:useLocalDpi xmlns:a14="http://schemas.microsoft.com/office/drawing/2010/main" val="0"/>
+                </a:ext>
+              </a:extLst>
+            </a:blip>
+            <a:srcRect/>
+            <a:stretch>
+              <a:fillRect/>
+            </a:stretch>
+          </p:blipFill>
+          <p:spPr bwMode="auto">
+            <a:xfrm>
+              <a:off x="2007169" y="4174057"/>
+              <a:ext cx="2971801" cy="898788"/>
+            </a:xfrm>
+            <a:prstGeom prst="rect">
+              <a:avLst/>
+            </a:prstGeom>
+            <a:noFill/>
+            <a:extLst>
+              <a:ext uri="{909E8E84-426E-40DD-AFC4-6F175D3DCCD1}">
+                <a14:hiddenFill xmlns:a14="http://schemas.microsoft.com/office/drawing/2010/main">
+                  <a:solidFill>
+                    <a:srgbClr val="FFFFFF"/>
+                  </a:solidFill>
+                </a14:hiddenFill>
+              </a:ext>
+            </a:extLst>
+          </p:spPr>
+        </p:pic>
+      </p:grpSp>
+      <p:pic>
+        <p:nvPicPr>
+          <p:cNvPr id="1034" name="Picture 10" descr="Blogg med intressanta artiklar och innehåll - PASCO AB">
+            <a:extLst>
+              <a:ext uri="{FF2B5EF4-FFF2-40B4-BE49-F238E27FC236}">
+                <a16:creationId xmlns:a16="http://schemas.microsoft.com/office/drawing/2014/main" id="{A337E610-284D-1E40-933F-80556313C632}"/>
+              </a:ext>
+            </a:extLst>
+          </p:cNvPr>
+          <p:cNvPicPr>
+            <a:picLocks noChangeAspect="1" noChangeArrowheads="1"/>
+          </p:cNvPicPr>
+          <p:nvPr/>
+        </p:nvPicPr>
+        <p:blipFill>
+          <a:blip r:embed="rId4">
+            <a:extLst>
+              <a:ext uri="{28A0092B-C50C-407E-A947-70E740481C1C}">
+                <a14:useLocalDpi xmlns:a14="http://schemas.microsoft.com/office/drawing/2010/main" val="0"/>
+              </a:ext>
+            </a:extLst>
+          </a:blip>
+          <a:srcRect/>
+          <a:stretch>
+            <a:fillRect/>
+          </a:stretch>
+        </p:blipFill>
+        <p:spPr bwMode="auto">
+          <a:xfrm>
+            <a:off x="3535933" y="1041990"/>
+            <a:ext cx="2774466" cy="1156028"/>
+          </a:xfrm>
+          <a:prstGeom prst="rect">
+            <a:avLst/>
+          </a:prstGeom>
+          <a:noFill/>
+          <a:ln>
+            <a:solidFill>
+              <a:schemeClr val="tx1"/>
+            </a:solidFill>
+          </a:ln>
+          <a:extLst>
+            <a:ext uri="{909E8E84-426E-40DD-AFC4-6F175D3DCCD1}">
+              <a14:hiddenFill xmlns:a14="http://schemas.microsoft.com/office/drawing/2010/main">
+                <a:solidFill>
+                  <a:srgbClr val="FFFFFF"/>
+                </a:solidFill>
+              </a14:hiddenFill>
+            </a:ext>
+          </a:extLst>
+        </p:spPr>
+      </p:pic>
+      <p:pic>
+        <p:nvPicPr>
+          <p:cNvPr id="1036" name="Picture 12" descr="Ansible The Hard Way | askops">
+            <a:extLst>
+              <a:ext uri="{FF2B5EF4-FFF2-40B4-BE49-F238E27FC236}">
+                <a16:creationId xmlns:a16="http://schemas.microsoft.com/office/drawing/2014/main" id="{E8B3F81B-5907-A84C-B5CE-6E4BB6FBBD19}"/>
+              </a:ext>
+            </a:extLst>
+          </p:cNvPr>
+          <p:cNvPicPr>
+            <a:picLocks noChangeAspect="1" noChangeArrowheads="1"/>
+          </p:cNvPicPr>
+          <p:nvPr/>
+        </p:nvPicPr>
+        <p:blipFill>
+          <a:blip r:embed="rId5">
+            <a:extLst>
+              <a:ext uri="{28A0092B-C50C-407E-A947-70E740481C1C}">
+                <a14:useLocalDpi xmlns:a14="http://schemas.microsoft.com/office/drawing/2010/main" val="0"/>
+              </a:ext>
+            </a:extLst>
+          </a:blip>
+          <a:srcRect/>
+          <a:stretch>
+            <a:fillRect/>
+          </a:stretch>
+        </p:blipFill>
+        <p:spPr bwMode="auto">
+          <a:xfrm>
+            <a:off x="3910041" y="2367709"/>
+            <a:ext cx="2512369" cy="1411632"/>
+          </a:xfrm>
+          <a:prstGeom prst="rect">
+            <a:avLst/>
+          </a:prstGeom>
+          <a:noFill/>
+          <a:ln>
+            <a:solidFill>
+              <a:schemeClr val="tx1"/>
+            </a:solidFill>
+          </a:ln>
+          <a:extLst>
+            <a:ext uri="{909E8E84-426E-40DD-AFC4-6F175D3DCCD1}">
+              <a14:hiddenFill xmlns:a14="http://schemas.microsoft.com/office/drawing/2010/main">
+                <a:solidFill>
+                  <a:srgbClr val="FFFFFF"/>
+                </a:solidFill>
+              </a14:hiddenFill>
+            </a:ext>
+          </a:extLst>
+        </p:spPr>
+      </p:pic>
+      <p:pic>
+        <p:nvPicPr>
+          <p:cNvPr id="1038" name="Picture 14" descr="What Is CHEF? An Introduction! » LEARN Inside">
+            <a:extLst>
+              <a:ext uri="{FF2B5EF4-FFF2-40B4-BE49-F238E27FC236}">
+                <a16:creationId xmlns:a16="http://schemas.microsoft.com/office/drawing/2014/main" id="{587A6D7C-DB3F-F148-93E9-F3FC72F8DAC9}"/>
+              </a:ext>
+            </a:extLst>
+          </p:cNvPr>
+          <p:cNvPicPr>
+            <a:picLocks noChangeAspect="1" noChangeArrowheads="1"/>
+          </p:cNvPicPr>
+          <p:nvPr/>
+        </p:nvPicPr>
+        <p:blipFill>
+          <a:blip r:embed="rId6">
+            <a:extLst>
+              <a:ext uri="{28A0092B-C50C-407E-A947-70E740481C1C}">
+                <a14:useLocalDpi xmlns:a14="http://schemas.microsoft.com/office/drawing/2010/main" val="0"/>
+              </a:ext>
+            </a:extLst>
+          </a:blip>
+          <a:srcRect/>
+          <a:stretch>
+            <a:fillRect/>
+          </a:stretch>
+        </p:blipFill>
+        <p:spPr bwMode="auto">
+          <a:xfrm>
+            <a:off x="3913311" y="3904673"/>
+            <a:ext cx="2509099" cy="1316949"/>
+          </a:xfrm>
+          <a:prstGeom prst="rect">
+            <a:avLst/>
+          </a:prstGeom>
+          <a:noFill/>
+          <a:ln>
+            <a:solidFill>
+              <a:schemeClr val="tx1"/>
+            </a:solidFill>
+          </a:ln>
+          <a:extLst>
+            <a:ext uri="{909E8E84-426E-40DD-AFC4-6F175D3DCCD1}">
+              <a14:hiddenFill xmlns:a14="http://schemas.microsoft.com/office/drawing/2010/main">
+                <a:solidFill>
+                  <a:srgbClr val="FFFFFF"/>
+                </a:solidFill>
+              </a14:hiddenFill>
+            </a:ext>
+          </a:extLst>
+        </p:spPr>
+      </p:pic>
+      <p:pic>
+        <p:nvPicPr>
+          <p:cNvPr id="1040" name="Picture 16" descr="Puppet - Infocomm Media Development Authority">
+            <a:extLst>
+              <a:ext uri="{FF2B5EF4-FFF2-40B4-BE49-F238E27FC236}">
+                <a16:creationId xmlns:a16="http://schemas.microsoft.com/office/drawing/2014/main" id="{F7584CDE-8292-944A-8D69-821255197783}"/>
+              </a:ext>
+            </a:extLst>
+          </p:cNvPr>
+          <p:cNvPicPr>
+            <a:picLocks noChangeAspect="1" noChangeArrowheads="1"/>
+          </p:cNvPicPr>
+          <p:nvPr/>
+        </p:nvPicPr>
+        <p:blipFill>
+          <a:blip r:embed="rId7">
+            <a:extLst>
+              <a:ext uri="{28A0092B-C50C-407E-A947-70E740481C1C}">
+                <a14:useLocalDpi xmlns:a14="http://schemas.microsoft.com/office/drawing/2010/main" val="0"/>
+              </a:ext>
+            </a:extLst>
+          </a:blip>
+          <a:srcRect/>
+          <a:stretch>
+            <a:fillRect/>
+          </a:stretch>
+        </p:blipFill>
+        <p:spPr bwMode="auto">
+          <a:xfrm>
+            <a:off x="3535933" y="5346954"/>
+            <a:ext cx="2774466" cy="1456595"/>
+          </a:xfrm>
+          <a:prstGeom prst="rect">
+            <a:avLst/>
+          </a:prstGeom>
+          <a:noFill/>
+          <a:ln>
+            <a:solidFill>
+              <a:schemeClr val="tx1"/>
+            </a:solidFill>
+          </a:ln>
+          <a:extLst>
+            <a:ext uri="{909E8E84-426E-40DD-AFC4-6F175D3DCCD1}">
+              <a14:hiddenFill xmlns:a14="http://schemas.microsoft.com/office/drawing/2010/main">
+                <a:solidFill>
+                  <a:srgbClr val="FFFFFF"/>
+                </a:solidFill>
+              </a14:hiddenFill>
+            </a:ext>
+          </a:extLst>
+        </p:spPr>
+      </p:pic>
+    </p:spTree>
+    <p:extLst>
+      <p:ext uri="{BB962C8B-B14F-4D97-AF65-F5344CB8AC3E}">
+        <p14:creationId xmlns:p14="http://schemas.microsoft.com/office/powerpoint/2010/main" val="3828845183"/>
+      </p:ext>
+    </p:extLst>
+  </p:cSld>
+  <p:clrMapOvr>
+    <a:masterClrMapping/>
+  </p:clrMapOvr>
+</p:sld>
+</file>
+
+<file path=ppt/slides/slide4.xml><?xml version="1.0" encoding="utf-8"?>
+<p:sld xmlns:a="http://schemas.openxmlformats.org/drawingml/2006/main" xmlns:r="http://schemas.openxmlformats.org/officeDocument/2006/relationships" xmlns:p="http://schemas.openxmlformats.org/presentationml/2006/main">
+  <p:cSld>
+    <p:bg>
+      <p:bgPr>
+        <a:gradFill>
+          <a:gsLst>
+            <a:gs pos="0">
+              <a:schemeClr val="accent1">
+                <a:lumMod val="5000"/>
+                <a:lumOff val="95000"/>
+              </a:schemeClr>
+            </a:gs>
+            <a:gs pos="74000">
+              <a:schemeClr val="accent1">
+                <a:lumMod val="45000"/>
+                <a:lumOff val="55000"/>
+              </a:schemeClr>
+            </a:gs>
+            <a:gs pos="83000">
+              <a:schemeClr val="accent1">
+                <a:lumMod val="45000"/>
+                <a:lumOff val="55000"/>
+              </a:schemeClr>
+            </a:gs>
+            <a:gs pos="100000">
+              <a:schemeClr val="accent1">
+                <a:lumMod val="30000"/>
+                <a:lumOff val="70000"/>
+              </a:schemeClr>
+            </a:gs>
+          </a:gsLst>
+          <a:lin ang="5400000" scaled="1"/>
+        </a:gradFill>
+        <a:effectLst/>
+      </p:bgPr>
+    </p:bg>
+    <p:spTree>
+      <p:nvGrpSpPr>
+        <p:cNvPr id="1" name=""/>
+        <p:cNvGrpSpPr/>
+        <p:nvPr/>
+      </p:nvGrpSpPr>
+      <p:grpSpPr>
+        <a:xfrm>
+          <a:off x="0" y="0"/>
+          <a:ext cx="0" cy="0"/>
+          <a:chOff x="0" y="0"/>
+          <a:chExt cx="0" cy="0"/>
+        </a:xfrm>
+      </p:grpSpPr>
+      <p:sp>
+        <p:nvSpPr>
+          <p:cNvPr id="2" name="Title 1">
+            <a:extLst>
+              <a:ext uri="{FF2B5EF4-FFF2-40B4-BE49-F238E27FC236}">
+                <a16:creationId xmlns:a16="http://schemas.microsoft.com/office/drawing/2014/main" id="{006B299C-04F3-8747-A305-AAE66FFD36D4}"/>
+              </a:ext>
+            </a:extLst>
+          </p:cNvPr>
+          <p:cNvSpPr>
+            <a:spLocks noGrp="1"/>
+          </p:cNvSpPr>
+          <p:nvPr>
+            <p:ph type="title"/>
+          </p:nvPr>
+        </p:nvSpPr>
+        <p:spPr/>
+        <p:txBody>
+          <a:bodyPr>
+            <a:noAutofit/>
+          </a:bodyPr>
+          <a:lstStyle/>
+          <a:p>
+            <a:r>
+              <a:rPr lang="en-US" sz="3200" dirty="0"/>
+              <a:t>Infrastructure as Code (</a:t>
+            </a:r>
+            <a:r>
+              <a:rPr lang="en-US" sz="3200" dirty="0" err="1"/>
+              <a:t>IaC</a:t>
+            </a:r>
+            <a:r>
+              <a:rPr lang="en-US" sz="3200" dirty="0"/>
+              <a:t>) - Tools</a:t>
+            </a:r>
+          </a:p>
+        </p:txBody>
+      </p:sp>
+      <p:sp>
+        <p:nvSpPr>
+          <p:cNvPr id="8" name="TextBox 7">
+            <a:extLst>
+              <a:ext uri="{FF2B5EF4-FFF2-40B4-BE49-F238E27FC236}">
+                <a16:creationId xmlns:a16="http://schemas.microsoft.com/office/drawing/2014/main" id="{96833E7D-6DC1-7041-A2C7-83EB10D16A32}"/>
+              </a:ext>
+            </a:extLst>
+          </p:cNvPr>
+          <p:cNvSpPr txBox="1"/>
+          <p:nvPr/>
+        </p:nvSpPr>
+        <p:spPr>
+          <a:xfrm>
+            <a:off x="6782669" y="1792135"/>
+            <a:ext cx="4878135" cy="3816429"/>
+          </a:xfrm>
+          <a:prstGeom prst="rect">
+            <a:avLst/>
+          </a:prstGeom>
+          <a:solidFill>
+            <a:srgbClr val="000000"/>
+          </a:solidFill>
+        </p:spPr>
+        <p:txBody>
+          <a:bodyPr wrap="square" rtlCol="0">
+            <a:spAutoFit/>
+          </a:bodyPr>
+          <a:lstStyle/>
+          <a:p>
+            <a:endParaRPr lang="en-GB" sz="1100" dirty="0">
+              <a:solidFill>
+                <a:srgbClr val="569CD6"/>
+              </a:solidFill>
+              <a:latin typeface="Menlo" panose="020B0609030804020204" pitchFamily="49" charset="0"/>
+            </a:endParaRPr>
+          </a:p>
+          <a:p>
+            <a:r>
+              <a:rPr lang="en-GB" sz="1100" dirty="0">
+                <a:solidFill>
+                  <a:srgbClr val="569CD6"/>
+                </a:solidFill>
+                <a:latin typeface="Menlo" panose="020B0609030804020204" pitchFamily="49" charset="0"/>
+              </a:rPr>
+              <a:t>Resources</a:t>
+            </a:r>
+            <a:r>
+              <a:rPr lang="en-GB" sz="1100" dirty="0">
+                <a:solidFill>
+                  <a:srgbClr val="D4D4D4"/>
+                </a:solidFill>
+                <a:latin typeface="Menlo" panose="020B0609030804020204" pitchFamily="49" charset="0"/>
+              </a:rPr>
+              <a:t>:</a:t>
+            </a:r>
+          </a:p>
+          <a:p>
+            <a:r>
+              <a:rPr lang="en-GB" sz="1100" dirty="0">
+                <a:solidFill>
+                  <a:srgbClr val="569CD6"/>
+                </a:solidFill>
+                <a:latin typeface="Menlo" panose="020B0609030804020204" pitchFamily="49" charset="0"/>
+              </a:rPr>
+              <a:t>  </a:t>
+            </a:r>
+            <a:r>
+              <a:rPr lang="en-GB" sz="1100" dirty="0" err="1">
+                <a:solidFill>
+                  <a:srgbClr val="569CD6"/>
+                </a:solidFill>
+                <a:latin typeface="Menlo" panose="020B0609030804020204" pitchFamily="49" charset="0"/>
+              </a:rPr>
+              <a:t>ElasticLoadBalancer</a:t>
+            </a:r>
+            <a:r>
+              <a:rPr lang="en-GB" sz="1100" dirty="0">
+                <a:solidFill>
+                  <a:srgbClr val="D4D4D4"/>
+                </a:solidFill>
+                <a:latin typeface="Menlo" panose="020B0609030804020204" pitchFamily="49" charset="0"/>
+              </a:rPr>
+              <a:t>:</a:t>
+            </a:r>
+          </a:p>
+          <a:p>
+            <a:r>
+              <a:rPr lang="en-GB" sz="1100" dirty="0">
+                <a:solidFill>
+                  <a:srgbClr val="569CD6"/>
+                </a:solidFill>
+                <a:latin typeface="Menlo" panose="020B0609030804020204" pitchFamily="49" charset="0"/>
+              </a:rPr>
+              <a:t>    Type</a:t>
+            </a:r>
+            <a:r>
+              <a:rPr lang="en-GB" sz="1100" dirty="0">
+                <a:solidFill>
+                  <a:srgbClr val="D4D4D4"/>
+                </a:solidFill>
+                <a:latin typeface="Menlo" panose="020B0609030804020204" pitchFamily="49" charset="0"/>
+              </a:rPr>
+              <a:t>: </a:t>
+            </a:r>
+            <a:r>
+              <a:rPr lang="en-GB" sz="1100" dirty="0">
+                <a:solidFill>
+                  <a:srgbClr val="CE9178"/>
+                </a:solidFill>
+                <a:latin typeface="Menlo" panose="020B0609030804020204" pitchFamily="49" charset="0"/>
+              </a:rPr>
+              <a:t>AWS::</a:t>
+            </a:r>
+            <a:r>
+              <a:rPr lang="en-GB" sz="1100" dirty="0" err="1">
+                <a:solidFill>
+                  <a:srgbClr val="CE9178"/>
+                </a:solidFill>
+                <a:latin typeface="Menlo" panose="020B0609030804020204" pitchFamily="49" charset="0"/>
+              </a:rPr>
+              <a:t>ElasticLoadBalancing</a:t>
+            </a:r>
+            <a:r>
+              <a:rPr lang="en-GB" sz="1100" dirty="0">
+                <a:solidFill>
+                  <a:srgbClr val="CE9178"/>
+                </a:solidFill>
+                <a:latin typeface="Menlo" panose="020B0609030804020204" pitchFamily="49" charset="0"/>
+              </a:rPr>
+              <a:t>::</a:t>
+            </a:r>
+            <a:r>
+              <a:rPr lang="en-GB" sz="1100" dirty="0" err="1">
+                <a:solidFill>
+                  <a:srgbClr val="CE9178"/>
+                </a:solidFill>
+                <a:latin typeface="Menlo" panose="020B0609030804020204" pitchFamily="49" charset="0"/>
+              </a:rPr>
+              <a:t>LoadBalancer</a:t>
+            </a:r>
+            <a:endParaRPr lang="en-GB" sz="1100" dirty="0">
+              <a:solidFill>
+                <a:srgbClr val="D4D4D4"/>
+              </a:solidFill>
+              <a:latin typeface="Menlo" panose="020B0609030804020204" pitchFamily="49" charset="0"/>
+            </a:endParaRPr>
+          </a:p>
+          <a:p>
+            <a:r>
+              <a:rPr lang="en-GB" sz="1100" dirty="0">
+                <a:solidFill>
+                  <a:srgbClr val="569CD6"/>
+                </a:solidFill>
+                <a:latin typeface="Menlo" panose="020B0609030804020204" pitchFamily="49" charset="0"/>
+              </a:rPr>
+              <a:t>    Properties</a:t>
+            </a:r>
+            <a:r>
+              <a:rPr lang="en-GB" sz="1100" dirty="0">
+                <a:solidFill>
+                  <a:srgbClr val="D4D4D4"/>
+                </a:solidFill>
+                <a:latin typeface="Menlo" panose="020B0609030804020204" pitchFamily="49" charset="0"/>
+              </a:rPr>
+              <a:t>:</a:t>
+            </a:r>
+          </a:p>
+          <a:p>
+            <a:r>
+              <a:rPr lang="en-GB" sz="1100" dirty="0">
+                <a:solidFill>
+                  <a:srgbClr val="569CD6"/>
+                </a:solidFill>
+                <a:latin typeface="Menlo" panose="020B0609030804020204" pitchFamily="49" charset="0"/>
+              </a:rPr>
+              <a:t>      </a:t>
+            </a:r>
+            <a:r>
+              <a:rPr lang="en-GB" sz="1100" dirty="0" err="1">
+                <a:solidFill>
+                  <a:srgbClr val="569CD6"/>
+                </a:solidFill>
+                <a:latin typeface="Menlo" panose="020B0609030804020204" pitchFamily="49" charset="0"/>
+              </a:rPr>
+              <a:t>SecurityGroups</a:t>
+            </a:r>
+            <a:r>
+              <a:rPr lang="en-GB" sz="1100" dirty="0">
+                <a:solidFill>
+                  <a:srgbClr val="D4D4D4"/>
+                </a:solidFill>
+                <a:latin typeface="Menlo" panose="020B0609030804020204" pitchFamily="49" charset="0"/>
+              </a:rPr>
+              <a:t>:</a:t>
+            </a:r>
+          </a:p>
+          <a:p>
+            <a:r>
+              <a:rPr lang="en-GB" sz="1100" dirty="0">
+                <a:solidFill>
+                  <a:srgbClr val="D4D4D4"/>
+                </a:solidFill>
+                <a:latin typeface="Menlo" panose="020B0609030804020204" pitchFamily="49" charset="0"/>
+              </a:rPr>
+              <a:t>        - </a:t>
+            </a:r>
+            <a:r>
+              <a:rPr lang="en-GB" sz="1100" dirty="0">
+                <a:solidFill>
+                  <a:srgbClr val="569CD6"/>
+                </a:solidFill>
+                <a:latin typeface="Menlo" panose="020B0609030804020204" pitchFamily="49" charset="0"/>
+              </a:rPr>
+              <a:t>!Ref</a:t>
+            </a:r>
+            <a:r>
+              <a:rPr lang="en-GB" sz="1100" dirty="0">
+                <a:solidFill>
+                  <a:srgbClr val="D4D4D4"/>
+                </a:solidFill>
+                <a:latin typeface="Menlo" panose="020B0609030804020204" pitchFamily="49" charset="0"/>
+              </a:rPr>
+              <a:t> </a:t>
+            </a:r>
+            <a:r>
+              <a:rPr lang="en-GB" sz="1100" dirty="0" err="1">
+                <a:solidFill>
+                  <a:srgbClr val="CE9178"/>
+                </a:solidFill>
+                <a:latin typeface="Menlo" panose="020B0609030804020204" pitchFamily="49" charset="0"/>
+              </a:rPr>
+              <a:t>LoadBalancerSecurityGroup</a:t>
+            </a:r>
+            <a:endParaRPr lang="en-GB" sz="1100" dirty="0">
+              <a:solidFill>
+                <a:srgbClr val="D4D4D4"/>
+              </a:solidFill>
+              <a:latin typeface="Menlo" panose="020B0609030804020204" pitchFamily="49" charset="0"/>
+            </a:endParaRPr>
+          </a:p>
+          <a:p>
+            <a:r>
+              <a:rPr lang="en-GB" sz="1100" dirty="0">
+                <a:solidFill>
+                  <a:srgbClr val="569CD6"/>
+                </a:solidFill>
+                <a:latin typeface="Menlo" panose="020B0609030804020204" pitchFamily="49" charset="0"/>
+              </a:rPr>
+              <a:t>      Subnets</a:t>
+            </a:r>
+            <a:r>
+              <a:rPr lang="en-GB" sz="1100" dirty="0">
+                <a:solidFill>
+                  <a:srgbClr val="D4D4D4"/>
+                </a:solidFill>
+                <a:latin typeface="Menlo" panose="020B0609030804020204" pitchFamily="49" charset="0"/>
+              </a:rPr>
+              <a:t>:</a:t>
+            </a:r>
+          </a:p>
+          <a:p>
+            <a:r>
+              <a:rPr lang="en-GB" sz="1100" dirty="0">
+                <a:solidFill>
+                  <a:srgbClr val="D4D4D4"/>
+                </a:solidFill>
+                <a:latin typeface="Menlo" panose="020B0609030804020204" pitchFamily="49" charset="0"/>
+              </a:rPr>
+              <a:t>        - </a:t>
+            </a:r>
+            <a:r>
+              <a:rPr lang="en-GB" sz="1100" dirty="0">
+                <a:solidFill>
+                  <a:srgbClr val="569CD6"/>
+                </a:solidFill>
+                <a:latin typeface="Menlo" panose="020B0609030804020204" pitchFamily="49" charset="0"/>
+              </a:rPr>
+              <a:t>!</a:t>
+            </a:r>
+            <a:r>
+              <a:rPr lang="en-GB" sz="1100" dirty="0" err="1">
+                <a:solidFill>
+                  <a:srgbClr val="569CD6"/>
+                </a:solidFill>
+                <a:latin typeface="Menlo" panose="020B0609030804020204" pitchFamily="49" charset="0"/>
+              </a:rPr>
+              <a:t>ImportValue</a:t>
+            </a:r>
+            <a:r>
+              <a:rPr lang="en-GB" sz="1100" dirty="0">
+                <a:solidFill>
+                  <a:srgbClr val="569CD6"/>
+                </a:solidFill>
+                <a:latin typeface="Menlo" panose="020B0609030804020204" pitchFamily="49" charset="0"/>
+              </a:rPr>
+              <a:t>:</a:t>
+            </a:r>
+            <a:r>
+              <a:rPr lang="en-GB" sz="1100" dirty="0">
+                <a:solidFill>
+                  <a:srgbClr val="D4D4D4"/>
+                </a:solidFill>
+                <a:latin typeface="Menlo" panose="020B0609030804020204" pitchFamily="49" charset="0"/>
+              </a:rPr>
+              <a:t> </a:t>
+            </a:r>
+            <a:r>
+              <a:rPr lang="en-GB" sz="1100" dirty="0">
+                <a:solidFill>
+                  <a:srgbClr val="CE9178"/>
+                </a:solidFill>
+                <a:latin typeface="Menlo" panose="020B0609030804020204" pitchFamily="49" charset="0"/>
+              </a:rPr>
+              <a:t>PublicSubnet1A</a:t>
+            </a:r>
+            <a:endParaRPr lang="en-GB" sz="1100" dirty="0">
+              <a:solidFill>
+                <a:srgbClr val="D4D4D4"/>
+              </a:solidFill>
+              <a:latin typeface="Menlo" panose="020B0609030804020204" pitchFamily="49" charset="0"/>
+            </a:endParaRPr>
+          </a:p>
+          <a:p>
+            <a:r>
+              <a:rPr lang="en-GB" sz="1100" dirty="0">
+                <a:solidFill>
+                  <a:srgbClr val="D4D4D4"/>
+                </a:solidFill>
+                <a:latin typeface="Menlo" panose="020B0609030804020204" pitchFamily="49" charset="0"/>
+              </a:rPr>
+              <a:t>        - </a:t>
+            </a:r>
+            <a:r>
+              <a:rPr lang="en-GB" sz="1100" dirty="0">
+                <a:solidFill>
+                  <a:srgbClr val="569CD6"/>
+                </a:solidFill>
+                <a:latin typeface="Menlo" panose="020B0609030804020204" pitchFamily="49" charset="0"/>
+              </a:rPr>
+              <a:t>!</a:t>
+            </a:r>
+            <a:r>
+              <a:rPr lang="en-GB" sz="1100" dirty="0" err="1">
+                <a:solidFill>
+                  <a:srgbClr val="569CD6"/>
+                </a:solidFill>
+                <a:latin typeface="Menlo" panose="020B0609030804020204" pitchFamily="49" charset="0"/>
+              </a:rPr>
+              <a:t>ImportValue</a:t>
+            </a:r>
+            <a:r>
+              <a:rPr lang="en-GB" sz="1100" dirty="0">
+                <a:solidFill>
+                  <a:srgbClr val="569CD6"/>
+                </a:solidFill>
+                <a:latin typeface="Menlo" panose="020B0609030804020204" pitchFamily="49" charset="0"/>
+              </a:rPr>
+              <a:t>:</a:t>
+            </a:r>
+            <a:r>
+              <a:rPr lang="en-GB" sz="1100" dirty="0">
+                <a:solidFill>
+                  <a:srgbClr val="D4D4D4"/>
+                </a:solidFill>
+                <a:latin typeface="Menlo" panose="020B0609030804020204" pitchFamily="49" charset="0"/>
+              </a:rPr>
+              <a:t> </a:t>
+            </a:r>
+            <a:r>
+              <a:rPr lang="en-GB" sz="1100" dirty="0">
+                <a:solidFill>
+                  <a:srgbClr val="CE9178"/>
+                </a:solidFill>
+                <a:latin typeface="Menlo" panose="020B0609030804020204" pitchFamily="49" charset="0"/>
+              </a:rPr>
+              <a:t>PublicSubnet1B</a:t>
+            </a:r>
+            <a:endParaRPr lang="en-GB" sz="1100" dirty="0">
+              <a:solidFill>
+                <a:srgbClr val="D4D4D4"/>
+              </a:solidFill>
+              <a:latin typeface="Menlo" panose="020B0609030804020204" pitchFamily="49" charset="0"/>
+            </a:endParaRPr>
+          </a:p>
+          <a:p>
+            <a:r>
+              <a:rPr lang="en-GB" sz="1100" dirty="0">
+                <a:solidFill>
+                  <a:srgbClr val="569CD6"/>
+                </a:solidFill>
+                <a:latin typeface="Menlo" panose="020B0609030804020204" pitchFamily="49" charset="0"/>
+              </a:rPr>
+              <a:t>      Listeners</a:t>
+            </a:r>
+            <a:r>
+              <a:rPr lang="en-GB" sz="1100" dirty="0">
+                <a:solidFill>
+                  <a:srgbClr val="D4D4D4"/>
+                </a:solidFill>
+                <a:latin typeface="Menlo" panose="020B0609030804020204" pitchFamily="49" charset="0"/>
+              </a:rPr>
+              <a:t>:</a:t>
+            </a:r>
+          </a:p>
+          <a:p>
+            <a:r>
+              <a:rPr lang="en-GB" sz="1100" dirty="0">
+                <a:solidFill>
+                  <a:srgbClr val="569CD6"/>
+                </a:solidFill>
+                <a:latin typeface="Menlo" panose="020B0609030804020204" pitchFamily="49" charset="0"/>
+              </a:rPr>
+              <a:t>        </a:t>
+            </a:r>
+            <a:r>
+              <a:rPr lang="en-GB" sz="1100" dirty="0" err="1">
+                <a:solidFill>
+                  <a:srgbClr val="569CD6"/>
+                </a:solidFill>
+                <a:latin typeface="Menlo" panose="020B0609030804020204" pitchFamily="49" charset="0"/>
+              </a:rPr>
+              <a:t>LoadBalancerPort</a:t>
+            </a:r>
+            <a:r>
+              <a:rPr lang="en-GB" sz="1100" dirty="0">
+                <a:solidFill>
+                  <a:srgbClr val="D4D4D4"/>
+                </a:solidFill>
+                <a:latin typeface="Menlo" panose="020B0609030804020204" pitchFamily="49" charset="0"/>
+              </a:rPr>
+              <a:t>: </a:t>
+            </a:r>
+            <a:r>
+              <a:rPr lang="en-GB" sz="1100" dirty="0">
+                <a:solidFill>
+                  <a:srgbClr val="B5CEA8"/>
+                </a:solidFill>
+                <a:latin typeface="Menlo" panose="020B0609030804020204" pitchFamily="49" charset="0"/>
+              </a:rPr>
+              <a:t>443</a:t>
+            </a:r>
+            <a:endParaRPr lang="en-GB" sz="1100" dirty="0">
+              <a:solidFill>
+                <a:srgbClr val="D4D4D4"/>
+              </a:solidFill>
+              <a:latin typeface="Menlo" panose="020B0609030804020204" pitchFamily="49" charset="0"/>
+            </a:endParaRPr>
+          </a:p>
+          <a:p>
+            <a:r>
+              <a:rPr lang="en-GB" sz="1100" dirty="0">
+                <a:solidFill>
+                  <a:srgbClr val="569CD6"/>
+                </a:solidFill>
+                <a:latin typeface="Menlo" panose="020B0609030804020204" pitchFamily="49" charset="0"/>
+              </a:rPr>
+              <a:t>        </a:t>
+            </a:r>
+            <a:r>
+              <a:rPr lang="en-GB" sz="1100" dirty="0" err="1">
+                <a:solidFill>
+                  <a:srgbClr val="569CD6"/>
+                </a:solidFill>
+                <a:latin typeface="Menlo" panose="020B0609030804020204" pitchFamily="49" charset="0"/>
+              </a:rPr>
+              <a:t>InstancePort</a:t>
+            </a:r>
+            <a:r>
+              <a:rPr lang="en-GB" sz="1100" dirty="0">
+                <a:solidFill>
+                  <a:srgbClr val="D4D4D4"/>
+                </a:solidFill>
+                <a:latin typeface="Menlo" panose="020B0609030804020204" pitchFamily="49" charset="0"/>
+              </a:rPr>
+              <a:t>: </a:t>
+            </a:r>
+            <a:r>
+              <a:rPr lang="en-GB" sz="1100" dirty="0">
+                <a:solidFill>
+                  <a:srgbClr val="B5CEA8"/>
+                </a:solidFill>
+                <a:latin typeface="Menlo" panose="020B0609030804020204" pitchFamily="49" charset="0"/>
+              </a:rPr>
+              <a:t>8080</a:t>
+            </a:r>
+            <a:endParaRPr lang="en-GB" sz="1100" dirty="0">
+              <a:solidFill>
+                <a:srgbClr val="D4D4D4"/>
+              </a:solidFill>
+              <a:latin typeface="Menlo" panose="020B0609030804020204" pitchFamily="49" charset="0"/>
+            </a:endParaRPr>
+          </a:p>
+          <a:p>
+            <a:r>
+              <a:rPr lang="en-GB" sz="1100" dirty="0">
+                <a:solidFill>
+                  <a:srgbClr val="569CD6"/>
+                </a:solidFill>
+                <a:latin typeface="Menlo" panose="020B0609030804020204" pitchFamily="49" charset="0"/>
+              </a:rPr>
+              <a:t>        Protocol</a:t>
+            </a:r>
+            <a:r>
+              <a:rPr lang="en-GB" sz="1100" dirty="0">
+                <a:solidFill>
+                  <a:srgbClr val="D4D4D4"/>
+                </a:solidFill>
+                <a:latin typeface="Menlo" panose="020B0609030804020204" pitchFamily="49" charset="0"/>
+              </a:rPr>
+              <a:t>: </a:t>
+            </a:r>
+            <a:r>
+              <a:rPr lang="en-GB" sz="1100" dirty="0">
+                <a:solidFill>
+                  <a:srgbClr val="CE9178"/>
+                </a:solidFill>
+                <a:latin typeface="Menlo" panose="020B0609030804020204" pitchFamily="49" charset="0"/>
+              </a:rPr>
+              <a:t>HTTPS</a:t>
+            </a:r>
+            <a:endParaRPr lang="en-GB" sz="1100" dirty="0">
+              <a:solidFill>
+                <a:srgbClr val="D4D4D4"/>
+              </a:solidFill>
+              <a:latin typeface="Menlo" panose="020B0609030804020204" pitchFamily="49" charset="0"/>
+            </a:endParaRPr>
+          </a:p>
+          <a:p>
+            <a:r>
+              <a:rPr lang="en-GB" sz="1100" dirty="0">
+                <a:solidFill>
+                  <a:srgbClr val="569CD6"/>
+                </a:solidFill>
+                <a:latin typeface="Menlo" panose="020B0609030804020204" pitchFamily="49" charset="0"/>
+              </a:rPr>
+              <a:t>        </a:t>
+            </a:r>
+            <a:r>
+              <a:rPr lang="en-GB" sz="1100" dirty="0" err="1">
+                <a:solidFill>
+                  <a:srgbClr val="569CD6"/>
+                </a:solidFill>
+                <a:latin typeface="Menlo" panose="020B0609030804020204" pitchFamily="49" charset="0"/>
+              </a:rPr>
+              <a:t>SSLCertificateId</a:t>
+            </a:r>
+            <a:r>
+              <a:rPr lang="en-GB" sz="1100" dirty="0">
+                <a:solidFill>
+                  <a:srgbClr val="D4D4D4"/>
+                </a:solidFill>
+                <a:latin typeface="Menlo" panose="020B0609030804020204" pitchFamily="49" charset="0"/>
+              </a:rPr>
+              <a:t>: </a:t>
+            </a:r>
+            <a:r>
+              <a:rPr lang="en-GB" sz="1100" dirty="0">
+                <a:solidFill>
+                  <a:srgbClr val="569CD6"/>
+                </a:solidFill>
+                <a:latin typeface="Menlo" panose="020B0609030804020204" pitchFamily="49" charset="0"/>
+              </a:rPr>
+              <a:t>!</a:t>
+            </a:r>
+            <a:r>
+              <a:rPr lang="en-GB" sz="1100" dirty="0" err="1">
+                <a:solidFill>
+                  <a:srgbClr val="569CD6"/>
+                </a:solidFill>
+                <a:latin typeface="Menlo" panose="020B0609030804020204" pitchFamily="49" charset="0"/>
+              </a:rPr>
+              <a:t>ImportValue</a:t>
+            </a:r>
+            <a:r>
+              <a:rPr lang="en-GB" sz="1100" dirty="0">
+                <a:solidFill>
+                  <a:srgbClr val="D4D4D4"/>
+                </a:solidFill>
+                <a:latin typeface="Menlo" panose="020B0609030804020204" pitchFamily="49" charset="0"/>
+              </a:rPr>
+              <a:t> </a:t>
+            </a:r>
+            <a:r>
+              <a:rPr lang="en-GB" sz="1100" dirty="0" err="1">
+                <a:solidFill>
+                  <a:srgbClr val="CE9178"/>
+                </a:solidFill>
+                <a:latin typeface="Menlo" panose="020B0609030804020204" pitchFamily="49" charset="0"/>
+              </a:rPr>
+              <a:t>CertificateId</a:t>
+            </a:r>
+            <a:endParaRPr lang="en-GB" sz="1100" dirty="0">
+              <a:solidFill>
+                <a:srgbClr val="D4D4D4"/>
+              </a:solidFill>
+              <a:latin typeface="Menlo" panose="020B0609030804020204" pitchFamily="49" charset="0"/>
+            </a:endParaRPr>
+          </a:p>
+          <a:p>
+            <a:r>
+              <a:rPr lang="en-GB" sz="1100" dirty="0">
+                <a:solidFill>
+                  <a:srgbClr val="569CD6"/>
+                </a:solidFill>
+                <a:latin typeface="Menlo" panose="020B0609030804020204" pitchFamily="49" charset="0"/>
+              </a:rPr>
+              <a:t>      </a:t>
+            </a:r>
+            <a:r>
+              <a:rPr lang="en-GB" sz="1100" dirty="0" err="1">
+                <a:solidFill>
+                  <a:srgbClr val="569CD6"/>
+                </a:solidFill>
+                <a:latin typeface="Menlo" panose="020B0609030804020204" pitchFamily="49" charset="0"/>
+              </a:rPr>
+              <a:t>HealthCheck</a:t>
+            </a:r>
+            <a:r>
+              <a:rPr lang="en-GB" sz="1100" dirty="0">
+                <a:solidFill>
+                  <a:srgbClr val="D4D4D4"/>
+                </a:solidFill>
+                <a:latin typeface="Menlo" panose="020B0609030804020204" pitchFamily="49" charset="0"/>
+              </a:rPr>
+              <a:t>:</a:t>
+            </a:r>
+          </a:p>
+          <a:p>
+            <a:r>
+              <a:rPr lang="en-GB" sz="1100" dirty="0">
+                <a:solidFill>
+                  <a:srgbClr val="569CD6"/>
+                </a:solidFill>
+                <a:latin typeface="Menlo" panose="020B0609030804020204" pitchFamily="49" charset="0"/>
+              </a:rPr>
+              <a:t>        Target</a:t>
+            </a:r>
+            <a:r>
+              <a:rPr lang="en-GB" sz="1100" dirty="0">
+                <a:solidFill>
+                  <a:srgbClr val="D4D4D4"/>
+                </a:solidFill>
+                <a:latin typeface="Menlo" panose="020B0609030804020204" pitchFamily="49" charset="0"/>
+              </a:rPr>
+              <a:t>: </a:t>
+            </a:r>
+            <a:r>
+              <a:rPr lang="en-GB" sz="1100" dirty="0">
+                <a:solidFill>
+                  <a:srgbClr val="CE9178"/>
+                </a:solidFill>
+                <a:latin typeface="Menlo" panose="020B0609030804020204" pitchFamily="49" charset="0"/>
+              </a:rPr>
+              <a:t>'HTTP:80/'</a:t>
+            </a:r>
+            <a:endParaRPr lang="en-GB" sz="1100" dirty="0">
+              <a:solidFill>
+                <a:srgbClr val="D4D4D4"/>
+              </a:solidFill>
+              <a:latin typeface="Menlo" panose="020B0609030804020204" pitchFamily="49" charset="0"/>
+            </a:endParaRPr>
+          </a:p>
+          <a:p>
+            <a:r>
+              <a:rPr lang="en-GB" sz="1100" dirty="0">
+                <a:solidFill>
+                  <a:srgbClr val="569CD6"/>
+                </a:solidFill>
+                <a:latin typeface="Menlo" panose="020B0609030804020204" pitchFamily="49" charset="0"/>
+              </a:rPr>
+              <a:t>        </a:t>
+            </a:r>
+            <a:r>
+              <a:rPr lang="en-GB" sz="1100" dirty="0" err="1">
+                <a:solidFill>
+                  <a:srgbClr val="569CD6"/>
+                </a:solidFill>
+                <a:latin typeface="Menlo" panose="020B0609030804020204" pitchFamily="49" charset="0"/>
+              </a:rPr>
+              <a:t>HealtyThreshold</a:t>
+            </a:r>
+            <a:r>
+              <a:rPr lang="en-GB" sz="1100" dirty="0">
+                <a:solidFill>
+                  <a:srgbClr val="D4D4D4"/>
+                </a:solidFill>
+                <a:latin typeface="Menlo" panose="020B0609030804020204" pitchFamily="49" charset="0"/>
+              </a:rPr>
+              <a:t>: </a:t>
+            </a:r>
+            <a:r>
+              <a:rPr lang="en-GB" sz="1100" dirty="0">
+                <a:solidFill>
+                  <a:srgbClr val="B5CEA8"/>
+                </a:solidFill>
+                <a:latin typeface="Menlo" panose="020B0609030804020204" pitchFamily="49" charset="0"/>
+              </a:rPr>
+              <a:t>2</a:t>
+            </a:r>
+            <a:endParaRPr lang="en-GB" sz="1100" dirty="0">
+              <a:solidFill>
+                <a:srgbClr val="D4D4D4"/>
+              </a:solidFill>
+              <a:latin typeface="Menlo" panose="020B0609030804020204" pitchFamily="49" charset="0"/>
+            </a:endParaRPr>
+          </a:p>
+          <a:p>
+            <a:r>
+              <a:rPr lang="en-GB" sz="1100" dirty="0">
+                <a:solidFill>
+                  <a:srgbClr val="569CD6"/>
+                </a:solidFill>
+                <a:latin typeface="Menlo" panose="020B0609030804020204" pitchFamily="49" charset="0"/>
+              </a:rPr>
+              <a:t>        </a:t>
+            </a:r>
+            <a:r>
+              <a:rPr lang="en-GB" sz="1100" dirty="0" err="1">
+                <a:solidFill>
+                  <a:srgbClr val="569CD6"/>
+                </a:solidFill>
+                <a:latin typeface="Menlo" panose="020B0609030804020204" pitchFamily="49" charset="0"/>
+              </a:rPr>
+              <a:t>UnhealtyThreshold</a:t>
+            </a:r>
+            <a:r>
+              <a:rPr lang="en-GB" sz="1100" dirty="0">
+                <a:solidFill>
+                  <a:srgbClr val="D4D4D4"/>
+                </a:solidFill>
+                <a:latin typeface="Menlo" panose="020B0609030804020204" pitchFamily="49" charset="0"/>
+              </a:rPr>
+              <a:t>: </a:t>
+            </a:r>
+            <a:r>
+              <a:rPr lang="en-GB" sz="1100" dirty="0">
+                <a:solidFill>
+                  <a:srgbClr val="B5CEA8"/>
+                </a:solidFill>
+                <a:latin typeface="Menlo" panose="020B0609030804020204" pitchFamily="49" charset="0"/>
+              </a:rPr>
+              <a:t>3</a:t>
+            </a:r>
+            <a:endParaRPr lang="en-GB" sz="1100" dirty="0">
+              <a:solidFill>
+                <a:srgbClr val="D4D4D4"/>
+              </a:solidFill>
+              <a:latin typeface="Menlo" panose="020B0609030804020204" pitchFamily="49" charset="0"/>
+            </a:endParaRPr>
+          </a:p>
+          <a:p>
+            <a:r>
+              <a:rPr lang="en-GB" sz="1100" dirty="0">
+                <a:solidFill>
+                  <a:srgbClr val="569CD6"/>
+                </a:solidFill>
+                <a:latin typeface="Menlo" panose="020B0609030804020204" pitchFamily="49" charset="0"/>
+              </a:rPr>
+              <a:t>        Interval</a:t>
+            </a:r>
+            <a:r>
+              <a:rPr lang="en-GB" sz="1100" dirty="0">
+                <a:solidFill>
+                  <a:srgbClr val="D4D4D4"/>
+                </a:solidFill>
+                <a:latin typeface="Menlo" panose="020B0609030804020204" pitchFamily="49" charset="0"/>
+              </a:rPr>
+              <a:t>: </a:t>
+            </a:r>
+            <a:r>
+              <a:rPr lang="en-GB" sz="1100" dirty="0">
+                <a:solidFill>
+                  <a:srgbClr val="B5CEA8"/>
+                </a:solidFill>
+                <a:latin typeface="Menlo" panose="020B0609030804020204" pitchFamily="49" charset="0"/>
+              </a:rPr>
+              <a:t>20</a:t>
+            </a:r>
+            <a:endParaRPr lang="en-GB" sz="1100" dirty="0">
+              <a:solidFill>
+                <a:srgbClr val="D4D4D4"/>
+              </a:solidFill>
+              <a:latin typeface="Menlo" panose="020B0609030804020204" pitchFamily="49" charset="0"/>
+            </a:endParaRPr>
+          </a:p>
+          <a:p>
+            <a:r>
+              <a:rPr lang="en-GB" sz="1100" dirty="0">
+                <a:solidFill>
+                  <a:srgbClr val="569CD6"/>
+                </a:solidFill>
+                <a:latin typeface="Menlo" panose="020B0609030804020204" pitchFamily="49" charset="0"/>
+              </a:rPr>
+              <a:t>        Timeout</a:t>
+            </a:r>
+            <a:r>
+              <a:rPr lang="en-GB" sz="1100" dirty="0">
+                <a:solidFill>
+                  <a:srgbClr val="D4D4D4"/>
+                </a:solidFill>
+                <a:latin typeface="Menlo" panose="020B0609030804020204" pitchFamily="49" charset="0"/>
+              </a:rPr>
+              <a:t>: </a:t>
+            </a:r>
+            <a:r>
+              <a:rPr lang="en-GB" sz="1100" dirty="0">
+                <a:solidFill>
+                  <a:srgbClr val="B5CEA8"/>
+                </a:solidFill>
+                <a:latin typeface="Menlo" panose="020B0609030804020204" pitchFamily="49" charset="0"/>
+              </a:rPr>
+              <a:t>10</a:t>
+            </a:r>
+            <a:endParaRPr lang="en-GB" sz="1100" dirty="0">
+              <a:solidFill>
+                <a:srgbClr val="D4D4D4"/>
+              </a:solidFill>
+              <a:latin typeface="Menlo" panose="020B0609030804020204" pitchFamily="49" charset="0"/>
+            </a:endParaRPr>
+          </a:p>
+          <a:p>
+            <a:endParaRPr lang="en-SE" sz="1100" dirty="0"/>
+          </a:p>
+        </p:txBody>
+      </p:sp>
+      <p:sp>
+        <p:nvSpPr>
+          <p:cNvPr id="3" name="TextBox 2">
+            <a:extLst>
+              <a:ext uri="{FF2B5EF4-FFF2-40B4-BE49-F238E27FC236}">
+                <a16:creationId xmlns:a16="http://schemas.microsoft.com/office/drawing/2014/main" id="{7B73804B-AAF5-AE44-AC3F-EC4596619D8B}"/>
+              </a:ext>
+            </a:extLst>
+          </p:cNvPr>
+          <p:cNvSpPr txBox="1"/>
+          <p:nvPr/>
+        </p:nvSpPr>
+        <p:spPr>
+          <a:xfrm>
+            <a:off x="9776955" y="5346954"/>
+            <a:ext cx="1883849" cy="261610"/>
+          </a:xfrm>
+          <a:prstGeom prst="rect">
+            <a:avLst/>
+          </a:prstGeom>
+          <a:noFill/>
+        </p:spPr>
+        <p:txBody>
+          <a:bodyPr wrap="none" rtlCol="0">
+            <a:spAutoFit/>
+          </a:bodyPr>
+          <a:lstStyle/>
+          <a:p>
+            <a:pPr algn="r"/>
+            <a:r>
+              <a:rPr lang="en-US" sz="1050" dirty="0">
+                <a:solidFill>
+                  <a:schemeClr val="bg1"/>
+                </a:solidFill>
+                <a:latin typeface="Menlo" panose="020B0609030804020204" pitchFamily="49" charset="0"/>
+                <a:ea typeface="Menlo" panose="020B0609030804020204" pitchFamily="49" charset="0"/>
+                <a:cs typeface="Menlo" panose="020B0609030804020204" pitchFamily="49" charset="0"/>
+              </a:rPr>
+              <a:t>[AWS CloudFormation]</a:t>
+            </a:r>
+          </a:p>
+        </p:txBody>
+      </p:sp>
+      <p:pic>
+        <p:nvPicPr>
+          <p:cNvPr id="1028" name="Picture 4" descr="How to use AWS Cloud​Formation to setup a static website - Coletiv Blog">
+            <a:extLst>
+              <a:ext uri="{FF2B5EF4-FFF2-40B4-BE49-F238E27FC236}">
+                <a16:creationId xmlns:a16="http://schemas.microsoft.com/office/drawing/2014/main" id="{81DFE706-281E-FB41-8B69-C59478517101}"/>
+              </a:ext>
+            </a:extLst>
+          </p:cNvPr>
+          <p:cNvPicPr>
+            <a:picLocks noChangeAspect="1" noChangeArrowheads="1"/>
+          </p:cNvPicPr>
+          <p:nvPr/>
+        </p:nvPicPr>
+        <p:blipFill>
+          <a:blip r:embed="rId2">
+            <a:extLst>
+              <a:ext uri="{28A0092B-C50C-407E-A947-70E740481C1C}">
+                <a14:useLocalDpi xmlns:a14="http://schemas.microsoft.com/office/drawing/2010/main" val="0"/>
+              </a:ext>
+            </a:extLst>
+          </a:blip>
+          <a:srcRect/>
+          <a:stretch>
+            <a:fillRect/>
+          </a:stretch>
+        </p:blipFill>
+        <p:spPr bwMode="auto">
+          <a:xfrm>
+            <a:off x="669025" y="1787970"/>
+            <a:ext cx="3077667" cy="1797907"/>
+          </a:xfrm>
+          <a:prstGeom prst="rect">
+            <a:avLst/>
+          </a:prstGeom>
+          <a:noFill/>
+          <a:ln>
+            <a:solidFill>
+              <a:schemeClr val="tx1"/>
+            </a:solidFill>
+          </a:ln>
+          <a:extLst>
+            <a:ext uri="{909E8E84-426E-40DD-AFC4-6F175D3DCCD1}">
+              <a14:hiddenFill xmlns:a14="http://schemas.microsoft.com/office/drawing/2010/main">
+                <a:solidFill>
+                  <a:srgbClr val="FFFFFF"/>
+                </a:solidFill>
+              </a14:hiddenFill>
+            </a:ext>
+          </a:extLst>
+        </p:spPr>
+      </p:pic>
+      <p:grpSp>
+        <p:nvGrpSpPr>
+          <p:cNvPr id="5" name="Group 4">
+            <a:extLst>
+              <a:ext uri="{FF2B5EF4-FFF2-40B4-BE49-F238E27FC236}">
+                <a16:creationId xmlns:a16="http://schemas.microsoft.com/office/drawing/2014/main" id="{522BB828-1A54-A747-8A1B-F2A52EE7C9B0}"/>
+              </a:ext>
+            </a:extLst>
+          </p:cNvPr>
+          <p:cNvGrpSpPr/>
+          <p:nvPr/>
+        </p:nvGrpSpPr>
+        <p:grpSpPr>
+          <a:xfrm>
+            <a:off x="669026" y="3810657"/>
+            <a:ext cx="3077668" cy="1797907"/>
+            <a:chOff x="1954236" y="3724498"/>
+            <a:chExt cx="3077668" cy="1797907"/>
+          </a:xfrm>
+        </p:grpSpPr>
+        <p:sp>
+          <p:nvSpPr>
+            <p:cNvPr id="4" name="Rectangle 3">
+              <a:extLst>
+                <a:ext uri="{FF2B5EF4-FFF2-40B4-BE49-F238E27FC236}">
+                  <a16:creationId xmlns:a16="http://schemas.microsoft.com/office/drawing/2014/main" id="{CBBE511A-61CC-5D4A-A3EC-BBE5841D47C3}"/>
+                </a:ext>
+              </a:extLst>
+            </p:cNvPr>
+            <p:cNvSpPr/>
+            <p:nvPr/>
+          </p:nvSpPr>
+          <p:spPr>
+            <a:xfrm>
+              <a:off x="1954236" y="3724498"/>
+              <a:ext cx="3077668" cy="1797907"/>
+            </a:xfrm>
+            <a:prstGeom prst="rect">
+              <a:avLst/>
+            </a:prstGeom>
+            <a:solidFill>
+              <a:srgbClr val="F6F6F6"/>
+            </a:solidFill>
+            <a:ln>
+              <a:solidFill>
+                <a:schemeClr val="tx1"/>
+              </a:solidFill>
+            </a:ln>
+          </p:spPr>
+          <p:style>
+            <a:lnRef idx="2">
+              <a:schemeClr val="accent1">
+                <a:shade val="50000"/>
+              </a:schemeClr>
+            </a:lnRef>
+            <a:fillRef idx="1">
+              <a:schemeClr val="accent1"/>
+            </a:fillRef>
+            <a:effectRef idx="0">
+              <a:schemeClr val="accent1"/>
+            </a:effectRef>
+            <a:fontRef idx="minor">
+              <a:schemeClr val="lt1"/>
+            </a:fontRef>
+          </p:style>
+          <p:txBody>
+            <a:bodyPr rtlCol="0" anchor="ctr"/>
+            <a:lstStyle/>
+            <a:p>
+              <a:pPr algn="ctr"/>
+              <a:endParaRPr lang="en-US"/>
+            </a:p>
+          </p:txBody>
+        </p:sp>
+        <p:pic>
+          <p:nvPicPr>
+            <p:cNvPr id="1030" name="Picture 6" descr="Building Infrastructure using Terraform - ALMtoolbox NewsALMtoolbox News">
+              <a:extLst>
+                <a:ext uri="{FF2B5EF4-FFF2-40B4-BE49-F238E27FC236}">
+                  <a16:creationId xmlns:a16="http://schemas.microsoft.com/office/drawing/2014/main" id="{549CF92F-F9DE-D045-A7E1-B528002411BE}"/>
+                </a:ext>
+              </a:extLst>
+            </p:cNvPr>
+            <p:cNvPicPr>
+              <a:picLocks noChangeAspect="1" noChangeArrowheads="1"/>
+            </p:cNvPicPr>
+            <p:nvPr/>
+          </p:nvPicPr>
+          <p:blipFill>
+            <a:blip r:embed="rId3">
+              <a:extLst>
+                <a:ext uri="{28A0092B-C50C-407E-A947-70E740481C1C}">
+                  <a14:useLocalDpi xmlns:a14="http://schemas.microsoft.com/office/drawing/2010/main" val="0"/>
+                </a:ext>
+              </a:extLst>
+            </a:blip>
+            <a:srcRect/>
+            <a:stretch>
+              <a:fillRect/>
+            </a:stretch>
+          </p:blipFill>
+          <p:spPr bwMode="auto">
+            <a:xfrm>
+              <a:off x="2007169" y="4174057"/>
+              <a:ext cx="2971801" cy="898788"/>
+            </a:xfrm>
+            <a:prstGeom prst="rect">
+              <a:avLst/>
+            </a:prstGeom>
+            <a:noFill/>
+            <a:extLst>
+              <a:ext uri="{909E8E84-426E-40DD-AFC4-6F175D3DCCD1}">
+                <a14:hiddenFill xmlns:a14="http://schemas.microsoft.com/office/drawing/2010/main">
+                  <a:solidFill>
+                    <a:srgbClr val="FFFFFF"/>
+                  </a:solidFill>
+                </a14:hiddenFill>
+              </a:ext>
+            </a:extLst>
+          </p:spPr>
+        </p:pic>
+      </p:grpSp>
+      <p:sp>
+        <p:nvSpPr>
+          <p:cNvPr id="6" name="Rectangle 5">
+            <a:extLst>
+              <a:ext uri="{FF2B5EF4-FFF2-40B4-BE49-F238E27FC236}">
+                <a16:creationId xmlns:a16="http://schemas.microsoft.com/office/drawing/2014/main" id="{023D773A-C819-1E42-88E2-5E33204A19E8}"/>
               </a:ext>
             </a:extLst>
           </p:cNvPr>
@@ -5646,8 +8334,8 @@
         </p:nvSpPr>
         <p:spPr>
           <a:xfrm>
-            <a:off x="0" y="3744082"/>
-            <a:ext cx="12192000" cy="3113918"/>
+            <a:off x="3593757" y="2192653"/>
+            <a:ext cx="2428102" cy="988540"/>
           </a:xfrm>
           <a:prstGeom prst="rect">
             <a:avLst/>
@@ -5677,880 +8365,36 @@
           <a:lstStyle/>
           <a:p>
             <a:pPr algn="ctr"/>
-            <a:endParaRPr lang="en-US"/>
+            <a:r>
+              <a:rPr lang="en-US" b="1" dirty="0">
+                <a:solidFill>
+                  <a:srgbClr val="002060"/>
+                </a:solidFill>
+                <a:latin typeface="Montserrat" pitchFamily="2" charset="77"/>
+              </a:rPr>
+              <a:t>AWS Native</a:t>
+            </a:r>
+          </a:p>
+          <a:p>
+            <a:pPr algn="ctr"/>
+            <a:r>
+              <a:rPr lang="en-US" b="1" dirty="0">
+                <a:solidFill>
+                  <a:srgbClr val="002060"/>
+                </a:solidFill>
+                <a:latin typeface="Montserrat" pitchFamily="2" charset="77"/>
+              </a:rPr>
+              <a:t>AWS Service</a:t>
+            </a:r>
           </a:p>
         </p:txBody>
       </p:sp>
       <p:sp>
         <p:nvSpPr>
-          <p:cNvPr id="2" name="Title 1">
+          <p:cNvPr id="18" name="Rectangle 17">
             <a:extLst>
               <a:ext uri="{FF2B5EF4-FFF2-40B4-BE49-F238E27FC236}">
-                <a16:creationId xmlns:a16="http://schemas.microsoft.com/office/drawing/2014/main" id="{006B299C-04F3-8747-A305-AAE66FFD36D4}"/>
-              </a:ext>
-            </a:extLst>
-          </p:cNvPr>
-          <p:cNvSpPr>
-            <a:spLocks noGrp="1"/>
-          </p:cNvSpPr>
-          <p:nvPr>
-            <p:ph type="title"/>
-          </p:nvPr>
-        </p:nvSpPr>
-        <p:spPr/>
-        <p:txBody>
-          <a:bodyPr>
-            <a:noAutofit/>
-          </a:bodyPr>
-          <a:lstStyle/>
-          <a:p>
-            <a:r>
-              <a:rPr lang="en-US" sz="3200" dirty="0"/>
-              <a:t>Infrastructure as Code (</a:t>
-            </a:r>
-            <a:r>
-              <a:rPr lang="en-US" sz="3200" dirty="0" err="1"/>
-              <a:t>IaC</a:t>
-            </a:r>
-            <a:r>
-              <a:rPr lang="en-US" sz="3200" dirty="0"/>
-              <a:t>) - Executive summary</a:t>
-            </a:r>
-          </a:p>
-        </p:txBody>
-      </p:sp>
-      <p:sp>
-        <p:nvSpPr>
-          <p:cNvPr id="8" name="TextBox 7">
-            <a:extLst>
-              <a:ext uri="{FF2B5EF4-FFF2-40B4-BE49-F238E27FC236}">
-                <a16:creationId xmlns:a16="http://schemas.microsoft.com/office/drawing/2014/main" id="{96833E7D-6DC1-7041-A2C7-83EB10D16A32}"/>
-              </a:ext>
-            </a:extLst>
-          </p:cNvPr>
-          <p:cNvSpPr txBox="1"/>
-          <p:nvPr/>
-        </p:nvSpPr>
-        <p:spPr>
-          <a:xfrm>
-            <a:off x="6640187" y="1666590"/>
-            <a:ext cx="5357345" cy="4154984"/>
-          </a:xfrm>
-          <a:prstGeom prst="rect">
-            <a:avLst/>
-          </a:prstGeom>
-          <a:solidFill>
-            <a:srgbClr val="000000"/>
-          </a:solidFill>
-        </p:spPr>
-        <p:txBody>
-          <a:bodyPr wrap="square" rtlCol="0">
-            <a:spAutoFit/>
-          </a:bodyPr>
-          <a:lstStyle/>
-          <a:p>
-            <a:endParaRPr lang="en-GB" sz="1200" dirty="0">
-              <a:solidFill>
-                <a:srgbClr val="569CD6"/>
-              </a:solidFill>
-              <a:latin typeface="Menlo" panose="020B0609030804020204" pitchFamily="49" charset="0"/>
-            </a:endParaRPr>
-          </a:p>
-          <a:p>
-            <a:r>
-              <a:rPr lang="en-GB" sz="1200" dirty="0">
-                <a:solidFill>
-                  <a:srgbClr val="569CD6"/>
-                </a:solidFill>
-                <a:latin typeface="Menlo" panose="020B0609030804020204" pitchFamily="49" charset="0"/>
-              </a:rPr>
-              <a:t>Resources</a:t>
-            </a:r>
-            <a:r>
-              <a:rPr lang="en-GB" sz="1200" dirty="0">
-                <a:solidFill>
-                  <a:srgbClr val="D4D4D4"/>
-                </a:solidFill>
-                <a:latin typeface="Menlo" panose="020B0609030804020204" pitchFamily="49" charset="0"/>
-              </a:rPr>
-              <a:t>:</a:t>
-            </a:r>
-          </a:p>
-          <a:p>
-            <a:r>
-              <a:rPr lang="en-GB" sz="1200" dirty="0">
-                <a:solidFill>
-                  <a:srgbClr val="569CD6"/>
-                </a:solidFill>
-                <a:latin typeface="Menlo" panose="020B0609030804020204" pitchFamily="49" charset="0"/>
-              </a:rPr>
-              <a:t>  </a:t>
-            </a:r>
-            <a:r>
-              <a:rPr lang="en-GB" sz="1200" dirty="0" err="1">
-                <a:solidFill>
-                  <a:srgbClr val="569CD6"/>
-                </a:solidFill>
-                <a:latin typeface="Menlo" panose="020B0609030804020204" pitchFamily="49" charset="0"/>
-              </a:rPr>
-              <a:t>ElasticLoadBalancer</a:t>
-            </a:r>
-            <a:r>
-              <a:rPr lang="en-GB" sz="1200" dirty="0">
-                <a:solidFill>
-                  <a:srgbClr val="D4D4D4"/>
-                </a:solidFill>
-                <a:latin typeface="Menlo" panose="020B0609030804020204" pitchFamily="49" charset="0"/>
-              </a:rPr>
-              <a:t>:</a:t>
-            </a:r>
-          </a:p>
-          <a:p>
-            <a:r>
-              <a:rPr lang="en-GB" sz="1200" dirty="0">
-                <a:solidFill>
-                  <a:srgbClr val="569CD6"/>
-                </a:solidFill>
-                <a:latin typeface="Menlo" panose="020B0609030804020204" pitchFamily="49" charset="0"/>
-              </a:rPr>
-              <a:t>    Type</a:t>
-            </a:r>
-            <a:r>
-              <a:rPr lang="en-GB" sz="1200" dirty="0">
-                <a:solidFill>
-                  <a:srgbClr val="D4D4D4"/>
-                </a:solidFill>
-                <a:latin typeface="Menlo" panose="020B0609030804020204" pitchFamily="49" charset="0"/>
-              </a:rPr>
-              <a:t>: </a:t>
-            </a:r>
-            <a:r>
-              <a:rPr lang="en-GB" sz="1200" dirty="0">
-                <a:solidFill>
-                  <a:srgbClr val="CE9178"/>
-                </a:solidFill>
-                <a:latin typeface="Menlo" panose="020B0609030804020204" pitchFamily="49" charset="0"/>
-              </a:rPr>
-              <a:t>AWS::</a:t>
-            </a:r>
-            <a:r>
-              <a:rPr lang="en-GB" sz="1200" dirty="0" err="1">
-                <a:solidFill>
-                  <a:srgbClr val="CE9178"/>
-                </a:solidFill>
-                <a:latin typeface="Menlo" panose="020B0609030804020204" pitchFamily="49" charset="0"/>
-              </a:rPr>
-              <a:t>ElasticLoadBalancing</a:t>
-            </a:r>
-            <a:r>
-              <a:rPr lang="en-GB" sz="1200" dirty="0">
-                <a:solidFill>
-                  <a:srgbClr val="CE9178"/>
-                </a:solidFill>
-                <a:latin typeface="Menlo" panose="020B0609030804020204" pitchFamily="49" charset="0"/>
-              </a:rPr>
-              <a:t>::</a:t>
-            </a:r>
-            <a:r>
-              <a:rPr lang="en-GB" sz="1200" dirty="0" err="1">
-                <a:solidFill>
-                  <a:srgbClr val="CE9178"/>
-                </a:solidFill>
-                <a:latin typeface="Menlo" panose="020B0609030804020204" pitchFamily="49" charset="0"/>
-              </a:rPr>
-              <a:t>LoadBalancer</a:t>
-            </a:r>
-            <a:endParaRPr lang="en-GB" sz="1200" dirty="0">
-              <a:solidFill>
-                <a:srgbClr val="D4D4D4"/>
-              </a:solidFill>
-              <a:latin typeface="Menlo" panose="020B0609030804020204" pitchFamily="49" charset="0"/>
-            </a:endParaRPr>
-          </a:p>
-          <a:p>
-            <a:r>
-              <a:rPr lang="en-GB" sz="1200" dirty="0">
-                <a:solidFill>
-                  <a:srgbClr val="569CD6"/>
-                </a:solidFill>
-                <a:latin typeface="Menlo" panose="020B0609030804020204" pitchFamily="49" charset="0"/>
-              </a:rPr>
-              <a:t>    Properties</a:t>
-            </a:r>
-            <a:r>
-              <a:rPr lang="en-GB" sz="1200" dirty="0">
-                <a:solidFill>
-                  <a:srgbClr val="D4D4D4"/>
-                </a:solidFill>
-                <a:latin typeface="Menlo" panose="020B0609030804020204" pitchFamily="49" charset="0"/>
-              </a:rPr>
-              <a:t>:</a:t>
-            </a:r>
-          </a:p>
-          <a:p>
-            <a:r>
-              <a:rPr lang="en-GB" sz="1200" dirty="0">
-                <a:solidFill>
-                  <a:srgbClr val="569CD6"/>
-                </a:solidFill>
-                <a:latin typeface="Menlo" panose="020B0609030804020204" pitchFamily="49" charset="0"/>
-              </a:rPr>
-              <a:t>      </a:t>
-            </a:r>
-            <a:r>
-              <a:rPr lang="en-GB" sz="1200" dirty="0" err="1">
-                <a:solidFill>
-                  <a:srgbClr val="569CD6"/>
-                </a:solidFill>
-                <a:latin typeface="Menlo" panose="020B0609030804020204" pitchFamily="49" charset="0"/>
-              </a:rPr>
-              <a:t>SecurityGroups</a:t>
-            </a:r>
-            <a:r>
-              <a:rPr lang="en-GB" sz="1200" dirty="0">
-                <a:solidFill>
-                  <a:srgbClr val="D4D4D4"/>
-                </a:solidFill>
-                <a:latin typeface="Menlo" panose="020B0609030804020204" pitchFamily="49" charset="0"/>
-              </a:rPr>
-              <a:t>:</a:t>
-            </a:r>
-          </a:p>
-          <a:p>
-            <a:r>
-              <a:rPr lang="en-GB" sz="1200" dirty="0">
-                <a:solidFill>
-                  <a:srgbClr val="D4D4D4"/>
-                </a:solidFill>
-                <a:latin typeface="Menlo" panose="020B0609030804020204" pitchFamily="49" charset="0"/>
-              </a:rPr>
-              <a:t>        - </a:t>
-            </a:r>
-            <a:r>
-              <a:rPr lang="en-GB" sz="1200" dirty="0">
-                <a:solidFill>
-                  <a:srgbClr val="569CD6"/>
-                </a:solidFill>
-                <a:latin typeface="Menlo" panose="020B0609030804020204" pitchFamily="49" charset="0"/>
-              </a:rPr>
-              <a:t>!Ref</a:t>
-            </a:r>
-            <a:r>
-              <a:rPr lang="en-GB" sz="1200" dirty="0">
-                <a:solidFill>
-                  <a:srgbClr val="D4D4D4"/>
-                </a:solidFill>
-                <a:latin typeface="Menlo" panose="020B0609030804020204" pitchFamily="49" charset="0"/>
-              </a:rPr>
-              <a:t> </a:t>
-            </a:r>
-            <a:r>
-              <a:rPr lang="en-GB" sz="1200" dirty="0" err="1">
-                <a:solidFill>
-                  <a:srgbClr val="CE9178"/>
-                </a:solidFill>
-                <a:latin typeface="Menlo" panose="020B0609030804020204" pitchFamily="49" charset="0"/>
-              </a:rPr>
-              <a:t>LoadBalancerSecurityGroup</a:t>
-            </a:r>
-            <a:endParaRPr lang="en-GB" sz="1200" dirty="0">
-              <a:solidFill>
-                <a:srgbClr val="D4D4D4"/>
-              </a:solidFill>
-              <a:latin typeface="Menlo" panose="020B0609030804020204" pitchFamily="49" charset="0"/>
-            </a:endParaRPr>
-          </a:p>
-          <a:p>
-            <a:r>
-              <a:rPr lang="en-GB" sz="1200" dirty="0">
-                <a:solidFill>
-                  <a:srgbClr val="569CD6"/>
-                </a:solidFill>
-                <a:latin typeface="Menlo" panose="020B0609030804020204" pitchFamily="49" charset="0"/>
-              </a:rPr>
-              <a:t>      Subnets</a:t>
-            </a:r>
-            <a:r>
-              <a:rPr lang="en-GB" sz="1200" dirty="0">
-                <a:solidFill>
-                  <a:srgbClr val="D4D4D4"/>
-                </a:solidFill>
-                <a:latin typeface="Menlo" panose="020B0609030804020204" pitchFamily="49" charset="0"/>
-              </a:rPr>
-              <a:t>:</a:t>
-            </a:r>
-          </a:p>
-          <a:p>
-            <a:r>
-              <a:rPr lang="en-GB" sz="1200" dirty="0">
-                <a:solidFill>
-                  <a:srgbClr val="D4D4D4"/>
-                </a:solidFill>
-                <a:latin typeface="Menlo" panose="020B0609030804020204" pitchFamily="49" charset="0"/>
-              </a:rPr>
-              <a:t>        - </a:t>
-            </a:r>
-            <a:r>
-              <a:rPr lang="en-GB" sz="1200" dirty="0">
-                <a:solidFill>
-                  <a:srgbClr val="569CD6"/>
-                </a:solidFill>
-                <a:latin typeface="Menlo" panose="020B0609030804020204" pitchFamily="49" charset="0"/>
-              </a:rPr>
-              <a:t>!</a:t>
-            </a:r>
-            <a:r>
-              <a:rPr lang="en-GB" sz="1200" dirty="0" err="1">
-                <a:solidFill>
-                  <a:srgbClr val="569CD6"/>
-                </a:solidFill>
-                <a:latin typeface="Menlo" panose="020B0609030804020204" pitchFamily="49" charset="0"/>
-              </a:rPr>
-              <a:t>ImportValue</a:t>
-            </a:r>
-            <a:r>
-              <a:rPr lang="en-GB" sz="1200" dirty="0">
-                <a:solidFill>
-                  <a:srgbClr val="569CD6"/>
-                </a:solidFill>
-                <a:latin typeface="Menlo" panose="020B0609030804020204" pitchFamily="49" charset="0"/>
-              </a:rPr>
-              <a:t>:</a:t>
-            </a:r>
-            <a:r>
-              <a:rPr lang="en-GB" sz="1200" dirty="0">
-                <a:solidFill>
-                  <a:srgbClr val="D4D4D4"/>
-                </a:solidFill>
-                <a:latin typeface="Menlo" panose="020B0609030804020204" pitchFamily="49" charset="0"/>
-              </a:rPr>
-              <a:t> </a:t>
-            </a:r>
-            <a:r>
-              <a:rPr lang="en-GB" sz="1200" dirty="0">
-                <a:solidFill>
-                  <a:srgbClr val="CE9178"/>
-                </a:solidFill>
-                <a:latin typeface="Menlo" panose="020B0609030804020204" pitchFamily="49" charset="0"/>
-              </a:rPr>
-              <a:t>PublicSubnet1A</a:t>
-            </a:r>
-            <a:endParaRPr lang="en-GB" sz="1200" dirty="0">
-              <a:solidFill>
-                <a:srgbClr val="D4D4D4"/>
-              </a:solidFill>
-              <a:latin typeface="Menlo" panose="020B0609030804020204" pitchFamily="49" charset="0"/>
-            </a:endParaRPr>
-          </a:p>
-          <a:p>
-            <a:r>
-              <a:rPr lang="en-GB" sz="1200" dirty="0">
-                <a:solidFill>
-                  <a:srgbClr val="D4D4D4"/>
-                </a:solidFill>
-                <a:latin typeface="Menlo" panose="020B0609030804020204" pitchFamily="49" charset="0"/>
-              </a:rPr>
-              <a:t>        - </a:t>
-            </a:r>
-            <a:r>
-              <a:rPr lang="en-GB" sz="1200" dirty="0">
-                <a:solidFill>
-                  <a:srgbClr val="569CD6"/>
-                </a:solidFill>
-                <a:latin typeface="Menlo" panose="020B0609030804020204" pitchFamily="49" charset="0"/>
-              </a:rPr>
-              <a:t>!</a:t>
-            </a:r>
-            <a:r>
-              <a:rPr lang="en-GB" sz="1200" dirty="0" err="1">
-                <a:solidFill>
-                  <a:srgbClr val="569CD6"/>
-                </a:solidFill>
-                <a:latin typeface="Menlo" panose="020B0609030804020204" pitchFamily="49" charset="0"/>
-              </a:rPr>
-              <a:t>ImportValue</a:t>
-            </a:r>
-            <a:r>
-              <a:rPr lang="en-GB" sz="1200" dirty="0">
-                <a:solidFill>
-                  <a:srgbClr val="569CD6"/>
-                </a:solidFill>
-                <a:latin typeface="Menlo" panose="020B0609030804020204" pitchFamily="49" charset="0"/>
-              </a:rPr>
-              <a:t>:</a:t>
-            </a:r>
-            <a:r>
-              <a:rPr lang="en-GB" sz="1200" dirty="0">
-                <a:solidFill>
-                  <a:srgbClr val="D4D4D4"/>
-                </a:solidFill>
-                <a:latin typeface="Menlo" panose="020B0609030804020204" pitchFamily="49" charset="0"/>
-              </a:rPr>
-              <a:t> </a:t>
-            </a:r>
-            <a:r>
-              <a:rPr lang="en-GB" sz="1200" dirty="0">
-                <a:solidFill>
-                  <a:srgbClr val="CE9178"/>
-                </a:solidFill>
-                <a:latin typeface="Menlo" panose="020B0609030804020204" pitchFamily="49" charset="0"/>
-              </a:rPr>
-              <a:t>PublicSubnet1B</a:t>
-            </a:r>
-            <a:endParaRPr lang="en-GB" sz="1200" dirty="0">
-              <a:solidFill>
-                <a:srgbClr val="D4D4D4"/>
-              </a:solidFill>
-              <a:latin typeface="Menlo" panose="020B0609030804020204" pitchFamily="49" charset="0"/>
-            </a:endParaRPr>
-          </a:p>
-          <a:p>
-            <a:r>
-              <a:rPr lang="en-GB" sz="1200" dirty="0">
-                <a:solidFill>
-                  <a:srgbClr val="569CD6"/>
-                </a:solidFill>
-                <a:latin typeface="Menlo" panose="020B0609030804020204" pitchFamily="49" charset="0"/>
-              </a:rPr>
-              <a:t>      Listeners</a:t>
-            </a:r>
-            <a:r>
-              <a:rPr lang="en-GB" sz="1200" dirty="0">
-                <a:solidFill>
-                  <a:srgbClr val="D4D4D4"/>
-                </a:solidFill>
-                <a:latin typeface="Menlo" panose="020B0609030804020204" pitchFamily="49" charset="0"/>
-              </a:rPr>
-              <a:t>:</a:t>
-            </a:r>
-          </a:p>
-          <a:p>
-            <a:r>
-              <a:rPr lang="en-GB" sz="1200" dirty="0">
-                <a:solidFill>
-                  <a:srgbClr val="569CD6"/>
-                </a:solidFill>
-                <a:latin typeface="Menlo" panose="020B0609030804020204" pitchFamily="49" charset="0"/>
-              </a:rPr>
-              <a:t>        </a:t>
-            </a:r>
-            <a:r>
-              <a:rPr lang="en-GB" sz="1200" dirty="0" err="1">
-                <a:solidFill>
-                  <a:srgbClr val="569CD6"/>
-                </a:solidFill>
-                <a:latin typeface="Menlo" panose="020B0609030804020204" pitchFamily="49" charset="0"/>
-              </a:rPr>
-              <a:t>LoadBalancerPort</a:t>
-            </a:r>
-            <a:r>
-              <a:rPr lang="en-GB" sz="1200" dirty="0">
-                <a:solidFill>
-                  <a:srgbClr val="D4D4D4"/>
-                </a:solidFill>
-                <a:latin typeface="Menlo" panose="020B0609030804020204" pitchFamily="49" charset="0"/>
-              </a:rPr>
-              <a:t>: </a:t>
-            </a:r>
-            <a:r>
-              <a:rPr lang="en-GB" sz="1200" dirty="0">
-                <a:solidFill>
-                  <a:srgbClr val="B5CEA8"/>
-                </a:solidFill>
-                <a:latin typeface="Menlo" panose="020B0609030804020204" pitchFamily="49" charset="0"/>
-              </a:rPr>
-              <a:t>443</a:t>
-            </a:r>
-            <a:endParaRPr lang="en-GB" sz="1200" dirty="0">
-              <a:solidFill>
-                <a:srgbClr val="D4D4D4"/>
-              </a:solidFill>
-              <a:latin typeface="Menlo" panose="020B0609030804020204" pitchFamily="49" charset="0"/>
-            </a:endParaRPr>
-          </a:p>
-          <a:p>
-            <a:r>
-              <a:rPr lang="en-GB" sz="1200" dirty="0">
-                <a:solidFill>
-                  <a:srgbClr val="569CD6"/>
-                </a:solidFill>
-                <a:latin typeface="Menlo" panose="020B0609030804020204" pitchFamily="49" charset="0"/>
-              </a:rPr>
-              <a:t>        </a:t>
-            </a:r>
-            <a:r>
-              <a:rPr lang="en-GB" sz="1200" dirty="0" err="1">
-                <a:solidFill>
-                  <a:srgbClr val="569CD6"/>
-                </a:solidFill>
-                <a:latin typeface="Menlo" panose="020B0609030804020204" pitchFamily="49" charset="0"/>
-              </a:rPr>
-              <a:t>InstancePort</a:t>
-            </a:r>
-            <a:r>
-              <a:rPr lang="en-GB" sz="1200" dirty="0">
-                <a:solidFill>
-                  <a:srgbClr val="D4D4D4"/>
-                </a:solidFill>
-                <a:latin typeface="Menlo" panose="020B0609030804020204" pitchFamily="49" charset="0"/>
-              </a:rPr>
-              <a:t>: </a:t>
-            </a:r>
-            <a:r>
-              <a:rPr lang="en-GB" sz="1200" dirty="0">
-                <a:solidFill>
-                  <a:srgbClr val="B5CEA8"/>
-                </a:solidFill>
-                <a:latin typeface="Menlo" panose="020B0609030804020204" pitchFamily="49" charset="0"/>
-              </a:rPr>
-              <a:t>8080</a:t>
-            </a:r>
-            <a:endParaRPr lang="en-GB" sz="1200" dirty="0">
-              <a:solidFill>
-                <a:srgbClr val="D4D4D4"/>
-              </a:solidFill>
-              <a:latin typeface="Menlo" panose="020B0609030804020204" pitchFamily="49" charset="0"/>
-            </a:endParaRPr>
-          </a:p>
-          <a:p>
-            <a:r>
-              <a:rPr lang="en-GB" sz="1200" dirty="0">
-                <a:solidFill>
-                  <a:srgbClr val="569CD6"/>
-                </a:solidFill>
-                <a:latin typeface="Menlo" panose="020B0609030804020204" pitchFamily="49" charset="0"/>
-              </a:rPr>
-              <a:t>        Protocol</a:t>
-            </a:r>
-            <a:r>
-              <a:rPr lang="en-GB" sz="1200" dirty="0">
-                <a:solidFill>
-                  <a:srgbClr val="D4D4D4"/>
-                </a:solidFill>
-                <a:latin typeface="Menlo" panose="020B0609030804020204" pitchFamily="49" charset="0"/>
-              </a:rPr>
-              <a:t>: </a:t>
-            </a:r>
-            <a:r>
-              <a:rPr lang="en-GB" sz="1200" dirty="0">
-                <a:solidFill>
-                  <a:srgbClr val="CE9178"/>
-                </a:solidFill>
-                <a:latin typeface="Menlo" panose="020B0609030804020204" pitchFamily="49" charset="0"/>
-              </a:rPr>
-              <a:t>HTTPS</a:t>
-            </a:r>
-            <a:endParaRPr lang="en-GB" sz="1200" dirty="0">
-              <a:solidFill>
-                <a:srgbClr val="D4D4D4"/>
-              </a:solidFill>
-              <a:latin typeface="Menlo" panose="020B0609030804020204" pitchFamily="49" charset="0"/>
-            </a:endParaRPr>
-          </a:p>
-          <a:p>
-            <a:r>
-              <a:rPr lang="en-GB" sz="1200" dirty="0">
-                <a:solidFill>
-                  <a:srgbClr val="569CD6"/>
-                </a:solidFill>
-                <a:latin typeface="Menlo" panose="020B0609030804020204" pitchFamily="49" charset="0"/>
-              </a:rPr>
-              <a:t>        </a:t>
-            </a:r>
-            <a:r>
-              <a:rPr lang="en-GB" sz="1200" dirty="0" err="1">
-                <a:solidFill>
-                  <a:srgbClr val="569CD6"/>
-                </a:solidFill>
-                <a:latin typeface="Menlo" panose="020B0609030804020204" pitchFamily="49" charset="0"/>
-              </a:rPr>
-              <a:t>SSLCertificateId</a:t>
-            </a:r>
-            <a:r>
-              <a:rPr lang="en-GB" sz="1200" dirty="0">
-                <a:solidFill>
-                  <a:srgbClr val="D4D4D4"/>
-                </a:solidFill>
-                <a:latin typeface="Menlo" panose="020B0609030804020204" pitchFamily="49" charset="0"/>
-              </a:rPr>
-              <a:t>: </a:t>
-            </a:r>
-            <a:r>
-              <a:rPr lang="en-GB" sz="1200" dirty="0">
-                <a:solidFill>
-                  <a:srgbClr val="569CD6"/>
-                </a:solidFill>
-                <a:latin typeface="Menlo" panose="020B0609030804020204" pitchFamily="49" charset="0"/>
-              </a:rPr>
-              <a:t>!</a:t>
-            </a:r>
-            <a:r>
-              <a:rPr lang="en-GB" sz="1200" dirty="0" err="1">
-                <a:solidFill>
-                  <a:srgbClr val="569CD6"/>
-                </a:solidFill>
-                <a:latin typeface="Menlo" panose="020B0609030804020204" pitchFamily="49" charset="0"/>
-              </a:rPr>
-              <a:t>ImportValue</a:t>
-            </a:r>
-            <a:r>
-              <a:rPr lang="en-GB" sz="1200" dirty="0">
-                <a:solidFill>
-                  <a:srgbClr val="D4D4D4"/>
-                </a:solidFill>
-                <a:latin typeface="Menlo" panose="020B0609030804020204" pitchFamily="49" charset="0"/>
-              </a:rPr>
-              <a:t> </a:t>
-            </a:r>
-            <a:r>
-              <a:rPr lang="en-GB" sz="1200" dirty="0" err="1">
-                <a:solidFill>
-                  <a:srgbClr val="CE9178"/>
-                </a:solidFill>
-                <a:latin typeface="Menlo" panose="020B0609030804020204" pitchFamily="49" charset="0"/>
-              </a:rPr>
-              <a:t>CertificateId</a:t>
-            </a:r>
-            <a:endParaRPr lang="en-GB" sz="1200" dirty="0">
-              <a:solidFill>
-                <a:srgbClr val="D4D4D4"/>
-              </a:solidFill>
-              <a:latin typeface="Menlo" panose="020B0609030804020204" pitchFamily="49" charset="0"/>
-            </a:endParaRPr>
-          </a:p>
-          <a:p>
-            <a:r>
-              <a:rPr lang="en-GB" sz="1200" dirty="0">
-                <a:solidFill>
-                  <a:srgbClr val="569CD6"/>
-                </a:solidFill>
-                <a:latin typeface="Menlo" panose="020B0609030804020204" pitchFamily="49" charset="0"/>
-              </a:rPr>
-              <a:t>      </a:t>
-            </a:r>
-            <a:r>
-              <a:rPr lang="en-GB" sz="1200" dirty="0" err="1">
-                <a:solidFill>
-                  <a:srgbClr val="569CD6"/>
-                </a:solidFill>
-                <a:latin typeface="Menlo" panose="020B0609030804020204" pitchFamily="49" charset="0"/>
-              </a:rPr>
-              <a:t>HealthCheck</a:t>
-            </a:r>
-            <a:r>
-              <a:rPr lang="en-GB" sz="1200" dirty="0">
-                <a:solidFill>
-                  <a:srgbClr val="D4D4D4"/>
-                </a:solidFill>
-                <a:latin typeface="Menlo" panose="020B0609030804020204" pitchFamily="49" charset="0"/>
-              </a:rPr>
-              <a:t>:</a:t>
-            </a:r>
-          </a:p>
-          <a:p>
-            <a:r>
-              <a:rPr lang="en-GB" sz="1200" dirty="0">
-                <a:solidFill>
-                  <a:srgbClr val="569CD6"/>
-                </a:solidFill>
-                <a:latin typeface="Menlo" panose="020B0609030804020204" pitchFamily="49" charset="0"/>
-              </a:rPr>
-              <a:t>        Target</a:t>
-            </a:r>
-            <a:r>
-              <a:rPr lang="en-GB" sz="1200" dirty="0">
-                <a:solidFill>
-                  <a:srgbClr val="D4D4D4"/>
-                </a:solidFill>
-                <a:latin typeface="Menlo" panose="020B0609030804020204" pitchFamily="49" charset="0"/>
-              </a:rPr>
-              <a:t>: </a:t>
-            </a:r>
-            <a:r>
-              <a:rPr lang="en-GB" sz="1200" dirty="0">
-                <a:solidFill>
-                  <a:srgbClr val="CE9178"/>
-                </a:solidFill>
-                <a:latin typeface="Menlo" panose="020B0609030804020204" pitchFamily="49" charset="0"/>
-              </a:rPr>
-              <a:t>'HTTP:80/'</a:t>
-            </a:r>
-            <a:endParaRPr lang="en-GB" sz="1200" dirty="0">
-              <a:solidFill>
-                <a:srgbClr val="D4D4D4"/>
-              </a:solidFill>
-              <a:latin typeface="Menlo" panose="020B0609030804020204" pitchFamily="49" charset="0"/>
-            </a:endParaRPr>
-          </a:p>
-          <a:p>
-            <a:r>
-              <a:rPr lang="en-GB" sz="1200" dirty="0">
-                <a:solidFill>
-                  <a:srgbClr val="569CD6"/>
-                </a:solidFill>
-                <a:latin typeface="Menlo" panose="020B0609030804020204" pitchFamily="49" charset="0"/>
-              </a:rPr>
-              <a:t>        </a:t>
-            </a:r>
-            <a:r>
-              <a:rPr lang="en-GB" sz="1200" dirty="0" err="1">
-                <a:solidFill>
-                  <a:srgbClr val="569CD6"/>
-                </a:solidFill>
-                <a:latin typeface="Menlo" panose="020B0609030804020204" pitchFamily="49" charset="0"/>
-              </a:rPr>
-              <a:t>HealtyThreshold</a:t>
-            </a:r>
-            <a:r>
-              <a:rPr lang="en-GB" sz="1200" dirty="0">
-                <a:solidFill>
-                  <a:srgbClr val="D4D4D4"/>
-                </a:solidFill>
-                <a:latin typeface="Menlo" panose="020B0609030804020204" pitchFamily="49" charset="0"/>
-              </a:rPr>
-              <a:t>: </a:t>
-            </a:r>
-            <a:r>
-              <a:rPr lang="en-GB" sz="1200" dirty="0">
-                <a:solidFill>
-                  <a:srgbClr val="B5CEA8"/>
-                </a:solidFill>
-                <a:latin typeface="Menlo" panose="020B0609030804020204" pitchFamily="49" charset="0"/>
-              </a:rPr>
-              <a:t>2</a:t>
-            </a:r>
-            <a:endParaRPr lang="en-GB" sz="1200" dirty="0">
-              <a:solidFill>
-                <a:srgbClr val="D4D4D4"/>
-              </a:solidFill>
-              <a:latin typeface="Menlo" panose="020B0609030804020204" pitchFamily="49" charset="0"/>
-            </a:endParaRPr>
-          </a:p>
-          <a:p>
-            <a:r>
-              <a:rPr lang="en-GB" sz="1200" dirty="0">
-                <a:solidFill>
-                  <a:srgbClr val="569CD6"/>
-                </a:solidFill>
-                <a:latin typeface="Menlo" panose="020B0609030804020204" pitchFamily="49" charset="0"/>
-              </a:rPr>
-              <a:t>        </a:t>
-            </a:r>
-            <a:r>
-              <a:rPr lang="en-GB" sz="1200" dirty="0" err="1">
-                <a:solidFill>
-                  <a:srgbClr val="569CD6"/>
-                </a:solidFill>
-                <a:latin typeface="Menlo" panose="020B0609030804020204" pitchFamily="49" charset="0"/>
-              </a:rPr>
-              <a:t>UnhealtyThreshold</a:t>
-            </a:r>
-            <a:r>
-              <a:rPr lang="en-GB" sz="1200" dirty="0">
-                <a:solidFill>
-                  <a:srgbClr val="D4D4D4"/>
-                </a:solidFill>
-                <a:latin typeface="Menlo" panose="020B0609030804020204" pitchFamily="49" charset="0"/>
-              </a:rPr>
-              <a:t>: </a:t>
-            </a:r>
-            <a:r>
-              <a:rPr lang="en-GB" sz="1200" dirty="0">
-                <a:solidFill>
-                  <a:srgbClr val="B5CEA8"/>
-                </a:solidFill>
-                <a:latin typeface="Menlo" panose="020B0609030804020204" pitchFamily="49" charset="0"/>
-              </a:rPr>
-              <a:t>3</a:t>
-            </a:r>
-            <a:endParaRPr lang="en-GB" sz="1200" dirty="0">
-              <a:solidFill>
-                <a:srgbClr val="D4D4D4"/>
-              </a:solidFill>
-              <a:latin typeface="Menlo" panose="020B0609030804020204" pitchFamily="49" charset="0"/>
-            </a:endParaRPr>
-          </a:p>
-          <a:p>
-            <a:r>
-              <a:rPr lang="en-GB" sz="1200" dirty="0">
-                <a:solidFill>
-                  <a:srgbClr val="569CD6"/>
-                </a:solidFill>
-                <a:latin typeface="Menlo" panose="020B0609030804020204" pitchFamily="49" charset="0"/>
-              </a:rPr>
-              <a:t>        Interval</a:t>
-            </a:r>
-            <a:r>
-              <a:rPr lang="en-GB" sz="1200" dirty="0">
-                <a:solidFill>
-                  <a:srgbClr val="D4D4D4"/>
-                </a:solidFill>
-                <a:latin typeface="Menlo" panose="020B0609030804020204" pitchFamily="49" charset="0"/>
-              </a:rPr>
-              <a:t>: </a:t>
-            </a:r>
-            <a:r>
-              <a:rPr lang="en-GB" sz="1200" dirty="0">
-                <a:solidFill>
-                  <a:srgbClr val="B5CEA8"/>
-                </a:solidFill>
-                <a:latin typeface="Menlo" panose="020B0609030804020204" pitchFamily="49" charset="0"/>
-              </a:rPr>
-              <a:t>20</a:t>
-            </a:r>
-            <a:endParaRPr lang="en-GB" sz="1200" dirty="0">
-              <a:solidFill>
-                <a:srgbClr val="D4D4D4"/>
-              </a:solidFill>
-              <a:latin typeface="Menlo" panose="020B0609030804020204" pitchFamily="49" charset="0"/>
-            </a:endParaRPr>
-          </a:p>
-          <a:p>
-            <a:r>
-              <a:rPr lang="en-GB" sz="1200" dirty="0">
-                <a:solidFill>
-                  <a:srgbClr val="569CD6"/>
-                </a:solidFill>
-                <a:latin typeface="Menlo" panose="020B0609030804020204" pitchFamily="49" charset="0"/>
-              </a:rPr>
-              <a:t>        Timeout</a:t>
-            </a:r>
-            <a:r>
-              <a:rPr lang="en-GB" sz="1200" dirty="0">
-                <a:solidFill>
-                  <a:srgbClr val="D4D4D4"/>
-                </a:solidFill>
-                <a:latin typeface="Menlo" panose="020B0609030804020204" pitchFamily="49" charset="0"/>
-              </a:rPr>
-              <a:t>: </a:t>
-            </a:r>
-            <a:r>
-              <a:rPr lang="en-GB" sz="1200" dirty="0">
-                <a:solidFill>
-                  <a:srgbClr val="B5CEA8"/>
-                </a:solidFill>
-                <a:latin typeface="Menlo" panose="020B0609030804020204" pitchFamily="49" charset="0"/>
-              </a:rPr>
-              <a:t>10</a:t>
-            </a:r>
-            <a:endParaRPr lang="en-GB" sz="1200" dirty="0">
-              <a:solidFill>
-                <a:srgbClr val="D4D4D4"/>
-              </a:solidFill>
-              <a:latin typeface="Menlo" panose="020B0609030804020204" pitchFamily="49" charset="0"/>
-            </a:endParaRPr>
-          </a:p>
-          <a:p>
-            <a:endParaRPr lang="en-SE" sz="1200" dirty="0"/>
-          </a:p>
-        </p:txBody>
-      </p:sp>
-      <p:sp>
-        <p:nvSpPr>
-          <p:cNvPr id="9" name="Right Arrow 8">
-            <a:extLst>
-              <a:ext uri="{FF2B5EF4-FFF2-40B4-BE49-F238E27FC236}">
-                <a16:creationId xmlns:a16="http://schemas.microsoft.com/office/drawing/2014/main" id="{D03949E8-1D79-E64B-84AD-E720B6CA741E}"/>
+                <a16:creationId xmlns:a16="http://schemas.microsoft.com/office/drawing/2014/main" id="{4A8B7833-3ADF-2047-BE40-B28E09674CE5}"/>
               </a:ext>
             </a:extLst>
           </p:cNvPr>
@@ -6559,12 +8403,15 @@
         </p:nvSpPr>
         <p:spPr>
           <a:xfrm>
-            <a:off x="5186974" y="3429000"/>
-            <a:ext cx="1178011" cy="650789"/>
+            <a:off x="3593757" y="4263709"/>
+            <a:ext cx="2428102" cy="988540"/>
           </a:xfrm>
-          <a:prstGeom prst="rightArrow">
+          <a:prstGeom prst="rect">
             <a:avLst/>
           </a:prstGeom>
+          <a:solidFill>
+            <a:schemeClr val="accent6"/>
+          </a:solidFill>
         </p:spPr>
         <p:style>
           <a:lnRef idx="2">
@@ -6587,44 +8434,34 @@
           <a:lstStyle/>
           <a:p>
             <a:pPr algn="ctr"/>
-            <a:endParaRPr lang="en-US"/>
+            <a:r>
+              <a:rPr lang="en-US" b="1" dirty="0">
+                <a:solidFill>
+                  <a:srgbClr val="002060"/>
+                </a:solidFill>
+                <a:latin typeface="Montserrat" pitchFamily="2" charset="77"/>
+              </a:rPr>
+              <a:t>Cloud agnostic</a:t>
+            </a:r>
+          </a:p>
+          <a:p>
+            <a:pPr algn="ctr"/>
+            <a:r>
+              <a:rPr lang="en-US" b="1" dirty="0">
+                <a:solidFill>
+                  <a:srgbClr val="002060"/>
+                </a:solidFill>
+                <a:latin typeface="Montserrat" pitchFamily="2" charset="77"/>
+              </a:rPr>
+              <a:t>Open Source</a:t>
+            </a:r>
           </a:p>
         </p:txBody>
       </p:sp>
-      <p:pic>
-        <p:nvPicPr>
-          <p:cNvPr id="11" name="Picture 10">
-            <a:extLst>
-              <a:ext uri="{FF2B5EF4-FFF2-40B4-BE49-F238E27FC236}">
-                <a16:creationId xmlns:a16="http://schemas.microsoft.com/office/drawing/2014/main" id="{99ECBC49-C434-AB48-936F-957E9780854B}"/>
-              </a:ext>
-            </a:extLst>
-          </p:cNvPr>
-          <p:cNvPicPr>
-            <a:picLocks noChangeAspect="1"/>
-          </p:cNvPicPr>
-          <p:nvPr/>
-        </p:nvPicPr>
-        <p:blipFill>
-          <a:blip r:embed="rId2"/>
-          <a:stretch>
-            <a:fillRect/>
-          </a:stretch>
-        </p:blipFill>
-        <p:spPr>
-          <a:xfrm>
-            <a:off x="210694" y="2197396"/>
-            <a:ext cx="4701079" cy="3447715"/>
-          </a:xfrm>
-          <a:prstGeom prst="rect">
-            <a:avLst/>
-          </a:prstGeom>
-        </p:spPr>
-      </p:pic>
     </p:spTree>
     <p:extLst>
       <p:ext uri="{BB962C8B-B14F-4D97-AF65-F5344CB8AC3E}">
-        <p14:creationId xmlns:p14="http://schemas.microsoft.com/office/powerpoint/2010/main" val="1999794091"/>
+        <p14:creationId xmlns:p14="http://schemas.microsoft.com/office/powerpoint/2010/main" val="2640133020"/>
       </p:ext>
     </p:extLst>
   </p:cSld>
@@ -6634,7 +8471,7 @@
 </p:sld>
 </file>
 
-<file path=ppt/slides/slide4.xml><?xml version="1.0" encoding="utf-8"?>
+<file path=ppt/slides/slide5.xml><?xml version="1.0" encoding="utf-8"?>
 <p:sld xmlns:a="http://schemas.openxmlformats.org/drawingml/2006/main" xmlns:r="http://schemas.openxmlformats.org/officeDocument/2006/relationships" xmlns:p="http://schemas.openxmlformats.org/presentationml/2006/main">
   <p:cSld>
     <p:spTree>
@@ -6699,12 +8536,30 @@
         </p:nvSpPr>
         <p:spPr/>
         <p:txBody>
-          <a:bodyPr/>
+          <a:bodyPr>
+            <a:normAutofit lnSpcReduction="10000"/>
+          </a:bodyPr>
           <a:lstStyle/>
           <a:p>
             <a:r>
               <a:rPr lang="en-US" dirty="0"/>
-              <a:t>Have version control as source of truth for infrastructure</a:t>
+              <a:t>Have </a:t>
+            </a:r>
+            <a:r>
+              <a:rPr lang="en-US" b="1" dirty="0">
+                <a:highlight>
+                  <a:srgbClr val="00FF00"/>
+                </a:highlight>
+              </a:rPr>
+              <a:t>version control</a:t>
+            </a:r>
+            <a:r>
+              <a:rPr lang="en-US" b="1" dirty="0"/>
+              <a:t> </a:t>
+            </a:r>
+            <a:r>
+              <a:rPr lang="en-US" dirty="0"/>
+              <a:t>as source of truth for infrastructure</a:t>
             </a:r>
           </a:p>
           <a:p>
@@ -6713,16 +8568,101 @@
           <a:p>
             <a:r>
               <a:rPr lang="en-US" dirty="0"/>
-              <a:t>Developers can manage infrastructure</a:t>
-            </a:r>
-          </a:p>
-          <a:p>
+              <a:t>Define infrastructure in </a:t>
+            </a:r>
+            <a:r>
+              <a:rPr lang="en-US" b="1" dirty="0">
+                <a:highlight>
+                  <a:srgbClr val="00FF00"/>
+                </a:highlight>
+              </a:rPr>
+              <a:t>desired state</a:t>
+            </a:r>
+            <a:r>
+              <a:rPr lang="en-US" b="1" dirty="0"/>
+              <a:t> </a:t>
+            </a:r>
+            <a:r>
+              <a:rPr lang="en-US" dirty="0"/>
+              <a:t>reduce complexity</a:t>
+            </a:r>
+          </a:p>
+          <a:p>
+            <a:pPr marL="0" indent="0">
+              <a:buNone/>
+            </a:pPr>
             <a:endParaRPr lang="en-US" dirty="0"/>
           </a:p>
           <a:p>
             <a:r>
+              <a:rPr lang="en-US" b="1" dirty="0">
+                <a:highlight>
+                  <a:srgbClr val="00FF00"/>
+                </a:highlight>
+              </a:rPr>
+              <a:t>Developers</a:t>
+            </a:r>
+            <a:r>
               <a:rPr lang="en-US" dirty="0"/>
-              <a:t>Reduce risk for manual misconfigurations</a:t>
+              <a:t> can manage infrastructure</a:t>
+            </a:r>
+          </a:p>
+          <a:p>
+            <a:endParaRPr lang="en-US" dirty="0"/>
+          </a:p>
+          <a:p>
+            <a:r>
+              <a:rPr lang="en-US" b="1" dirty="0">
+                <a:highlight>
+                  <a:srgbClr val="00FF00"/>
+                </a:highlight>
+              </a:rPr>
+              <a:t>Reduce</a:t>
+            </a:r>
+            <a:r>
+              <a:rPr lang="en-US" dirty="0">
+                <a:highlight>
+                  <a:srgbClr val="00FF00"/>
+                </a:highlight>
+              </a:rPr>
+              <a:t> </a:t>
+            </a:r>
+            <a:r>
+              <a:rPr lang="en-US" b="1" dirty="0">
+                <a:highlight>
+                  <a:srgbClr val="00FF00"/>
+                </a:highlight>
+              </a:rPr>
+              <a:t>risk</a:t>
+            </a:r>
+            <a:r>
+              <a:rPr lang="en-US" dirty="0">
+                <a:highlight>
+                  <a:srgbClr val="00FF00"/>
+                </a:highlight>
+              </a:rPr>
+              <a:t> </a:t>
+            </a:r>
+            <a:r>
+              <a:rPr lang="en-US" dirty="0"/>
+              <a:t>for manual misconfigurations</a:t>
+            </a:r>
+          </a:p>
+          <a:p>
+            <a:endParaRPr lang="en-US" dirty="0"/>
+          </a:p>
+          <a:p>
+            <a:r>
+              <a:rPr lang="en-US" b="1" dirty="0">
+                <a:highlight>
+                  <a:srgbClr val="00FF00"/>
+                </a:highlight>
+              </a:rPr>
+              <a:t>Speed</a:t>
+            </a:r>
+            <a:r>
+              <a:rPr lang="en-US" dirty="0"/>
+              <a:t> the provisioning of small or complex architectures</a:t>
             </a:r>
             <a:br>
               <a:rPr lang="en-US" dirty="0"/>
@@ -6750,7 +8690,7 @@
 </p:sld>
 </file>
 
-<file path=ppt/slides/slide5.xml><?xml version="1.0" encoding="utf-8"?>
+<file path=ppt/slides/slide6.xml><?xml version="1.0" encoding="utf-8"?>
 <p:sld xmlns:a="http://schemas.openxmlformats.org/drawingml/2006/main" xmlns:r="http://schemas.openxmlformats.org/officeDocument/2006/relationships" xmlns:p="http://schemas.openxmlformats.org/presentationml/2006/main">
   <p:cSld>
     <p:bg>
@@ -7196,7 +9136,7 @@
 </p:sld>
 </file>
 
-<file path=ppt/slides/slide6.xml><?xml version="1.0" encoding="utf-8"?>
+<file path=ppt/slides/slide7.xml><?xml version="1.0" encoding="utf-8"?>
 <p:sld xmlns:a="http://schemas.openxmlformats.org/drawingml/2006/main" xmlns:r="http://schemas.openxmlformats.org/officeDocument/2006/relationships" xmlns:p="http://schemas.openxmlformats.org/presentationml/2006/main">
   <p:cSld>
     <p:bg>

</xml_diff>

<commit_message>
More updates in presentation material
</commit_message>
<xml_diff>
--- a/05-infrastructure-as-code/05-infrastructure-as-code.pptx
+++ b/05-infrastructure-as-code/05-infrastructure-as-code.pptx
@@ -4651,15 +4651,7 @@
           <a:p>
             <a:r>
               <a:rPr lang="en-US" sz="3200" dirty="0"/>
-              <a:t>Infrastructure as Code (</a:t>
-            </a:r>
-            <a:r>
-              <a:rPr lang="en-US" sz="3200" dirty="0" err="1"/>
-              <a:t>IaC</a:t>
-            </a:r>
-            <a:r>
-              <a:rPr lang="en-US" sz="3200" dirty="0"/>
-              <a:t>) - Executive summary</a:t>
+              <a:t>Infrastructure as Code (IaC) - Executive summary</a:t>
             </a:r>
           </a:p>
         </p:txBody>
@@ -5819,6 +5811,221 @@
               </a:rPr>
               <a:t>[AWS CloudFormation]</a:t>
             </a:r>
+          </a:p>
+        </p:txBody>
+      </p:sp>
+      <p:sp>
+        <p:nvSpPr>
+          <p:cNvPr id="4" name="Can 3">
+            <a:extLst>
+              <a:ext uri="{FF2B5EF4-FFF2-40B4-BE49-F238E27FC236}">
+                <a16:creationId xmlns:a16="http://schemas.microsoft.com/office/drawing/2014/main" id="{4CE6ADF7-080D-2A4A-B19D-086B39250E5E}"/>
+              </a:ext>
+            </a:extLst>
+          </p:cNvPr>
+          <p:cNvSpPr/>
+          <p:nvPr/>
+        </p:nvSpPr>
+        <p:spPr>
+          <a:xfrm>
+            <a:off x="7380265" y="5477906"/>
+            <a:ext cx="2396690" cy="1219506"/>
+          </a:xfrm>
+          <a:prstGeom prst="can">
+            <a:avLst/>
+          </a:prstGeom>
+          <a:solidFill>
+            <a:schemeClr val="bg1">
+              <a:lumMod val="95000"/>
+            </a:schemeClr>
+          </a:solidFill>
+          <a:ln>
+            <a:solidFill>
+              <a:schemeClr val="tx1"/>
+            </a:solidFill>
+          </a:ln>
+        </p:spPr>
+        <p:style>
+          <a:lnRef idx="2">
+            <a:schemeClr val="accent1">
+              <a:shade val="50000"/>
+            </a:schemeClr>
+          </a:lnRef>
+          <a:fillRef idx="1">
+            <a:schemeClr val="accent1"/>
+          </a:fillRef>
+          <a:effectRef idx="0">
+            <a:schemeClr val="accent1"/>
+          </a:effectRef>
+          <a:fontRef idx="minor">
+            <a:schemeClr val="lt1"/>
+          </a:fontRef>
+        </p:style>
+        <p:txBody>
+          <a:bodyPr rtlCol="0" anchor="ctr"/>
+          <a:lstStyle/>
+          <a:p>
+            <a:pPr algn="ctr"/>
+            <a:endParaRPr lang="en-US"/>
+          </a:p>
+        </p:txBody>
+      </p:sp>
+      <p:pic>
+        <p:nvPicPr>
+          <p:cNvPr id="3076" name="Picture 4" descr="GitHub - germancutraro/Git-Command-Guide: A git command guide">
+            <a:extLst>
+              <a:ext uri="{FF2B5EF4-FFF2-40B4-BE49-F238E27FC236}">
+                <a16:creationId xmlns:a16="http://schemas.microsoft.com/office/drawing/2014/main" id="{A0C8F715-5C2C-8044-AA55-B6A41806FE48}"/>
+              </a:ext>
+            </a:extLst>
+          </p:cNvPr>
+          <p:cNvPicPr>
+            <a:picLocks noChangeAspect="1" noChangeArrowheads="1"/>
+          </p:cNvPicPr>
+          <p:nvPr/>
+        </p:nvPicPr>
+        <p:blipFill>
+          <a:blip r:embed="rId5">
+            <a:extLst>
+              <a:ext uri="{28A0092B-C50C-407E-A947-70E740481C1C}">
+                <a14:useLocalDpi xmlns:a14="http://schemas.microsoft.com/office/drawing/2010/main" val="0"/>
+              </a:ext>
+            </a:extLst>
+          </a:blip>
+          <a:srcRect/>
+          <a:stretch>
+            <a:fillRect/>
+          </a:stretch>
+        </p:blipFill>
+        <p:spPr bwMode="auto">
+          <a:xfrm>
+            <a:off x="7449329" y="5850854"/>
+            <a:ext cx="712894" cy="297633"/>
+          </a:xfrm>
+          <a:prstGeom prst="rect">
+            <a:avLst/>
+          </a:prstGeom>
+          <a:noFill/>
+          <a:extLst>
+            <a:ext uri="{909E8E84-426E-40DD-AFC4-6F175D3DCCD1}">
+              <a14:hiddenFill xmlns:a14="http://schemas.microsoft.com/office/drawing/2010/main">
+                <a:solidFill>
+                  <a:srgbClr val="FFFFFF"/>
+                </a:solidFill>
+              </a14:hiddenFill>
+            </a:ext>
+          </a:extLst>
+        </p:spPr>
+      </p:pic>
+      <p:sp>
+        <p:nvSpPr>
+          <p:cNvPr id="5" name="TextBox 4">
+            <a:extLst>
+              <a:ext uri="{FF2B5EF4-FFF2-40B4-BE49-F238E27FC236}">
+                <a16:creationId xmlns:a16="http://schemas.microsoft.com/office/drawing/2014/main" id="{A4A8ED9F-DE60-1747-8790-0395AACD0F6E}"/>
+              </a:ext>
+            </a:extLst>
+          </p:cNvPr>
+          <p:cNvSpPr txBox="1"/>
+          <p:nvPr/>
+        </p:nvSpPr>
+        <p:spPr>
+          <a:xfrm flipH="1">
+            <a:off x="8223266" y="5868465"/>
+            <a:ext cx="1663742" cy="861774"/>
+          </a:xfrm>
+          <a:prstGeom prst="rect">
+            <a:avLst/>
+          </a:prstGeom>
+          <a:noFill/>
+        </p:spPr>
+        <p:txBody>
+          <a:bodyPr wrap="square" rtlCol="0">
+            <a:spAutoFit/>
+          </a:bodyPr>
+          <a:lstStyle/>
+          <a:p>
+            <a:r>
+              <a:rPr lang="en-US" sz="1600" dirty="0"/>
+              <a:t>Code</a:t>
+            </a:r>
+          </a:p>
+          <a:p>
+            <a:r>
+              <a:rPr lang="en-US" sz="1600" dirty="0"/>
+              <a:t>Tests</a:t>
+            </a:r>
+          </a:p>
+          <a:p>
+            <a:r>
+              <a:rPr lang="en-US" sz="1600" b="1" dirty="0"/>
+              <a:t>Infrastructure</a:t>
+            </a:r>
+          </a:p>
+        </p:txBody>
+      </p:sp>
+      <p:sp>
+        <p:nvSpPr>
+          <p:cNvPr id="6" name="Bent Arrow 5">
+            <a:extLst>
+              <a:ext uri="{FF2B5EF4-FFF2-40B4-BE49-F238E27FC236}">
+                <a16:creationId xmlns:a16="http://schemas.microsoft.com/office/drawing/2014/main" id="{F8F47224-5A1F-1F42-B3D4-46BD60B91005}"/>
+              </a:ext>
+            </a:extLst>
+          </p:cNvPr>
+          <p:cNvSpPr/>
+          <p:nvPr/>
+        </p:nvSpPr>
+        <p:spPr>
+          <a:xfrm flipH="1" flipV="1">
+            <a:off x="9574695" y="5603294"/>
+            <a:ext cx="1155823" cy="1088554"/>
+          </a:xfrm>
+          <a:prstGeom prst="bentArrow">
+            <a:avLst>
+              <a:gd name="adj1" fmla="val 8907"/>
+              <a:gd name="adj2" fmla="val 16256"/>
+              <a:gd name="adj3" fmla="val 25000"/>
+              <a:gd name="adj4" fmla="val 53743"/>
+            </a:avLst>
+          </a:prstGeom>
+          <a:solidFill>
+            <a:schemeClr val="bg1">
+              <a:lumMod val="75000"/>
+            </a:schemeClr>
+          </a:solidFill>
+          <a:ln>
+            <a:solidFill>
+              <a:schemeClr val="tx1"/>
+            </a:solidFill>
+          </a:ln>
+        </p:spPr>
+        <p:style>
+          <a:lnRef idx="2">
+            <a:schemeClr val="accent1">
+              <a:shade val="50000"/>
+            </a:schemeClr>
+          </a:lnRef>
+          <a:fillRef idx="1">
+            <a:schemeClr val="accent1"/>
+          </a:fillRef>
+          <a:effectRef idx="0">
+            <a:schemeClr val="accent1"/>
+          </a:effectRef>
+          <a:fontRef idx="minor">
+            <a:schemeClr val="lt1"/>
+          </a:fontRef>
+        </p:style>
+        <p:txBody>
+          <a:bodyPr rtlCol="0" anchor="ctr"/>
+          <a:lstStyle/>
+          <a:p>
+            <a:pPr algn="ctr"/>
+            <a:endParaRPr lang="en-US">
+              <a:solidFill>
+                <a:schemeClr val="tx1"/>
+              </a:solidFill>
+            </a:endParaRPr>
           </a:p>
         </p:txBody>
       </p:sp>
@@ -5911,15 +6118,7 @@
           <a:p>
             <a:r>
               <a:rPr lang="en-US" sz="3200" dirty="0"/>
-              <a:t>Infrastructure as Code (</a:t>
-            </a:r>
-            <a:r>
-              <a:rPr lang="en-US" sz="3200" dirty="0" err="1"/>
-              <a:t>IaC</a:t>
-            </a:r>
-            <a:r>
-              <a:rPr lang="en-US" sz="3200" dirty="0"/>
-              <a:t>) - Tools</a:t>
+              <a:t>Infrastructure as Code (IaC) - Tools</a:t>
             </a:r>
           </a:p>
         </p:txBody>
@@ -7264,15 +7463,7 @@
           <a:p>
             <a:r>
               <a:rPr lang="en-US" sz="3200" dirty="0"/>
-              <a:t>Infrastructure as Code (</a:t>
-            </a:r>
-            <a:r>
-              <a:rPr lang="en-US" sz="3200" dirty="0" err="1"/>
-              <a:t>IaC</a:t>
-            </a:r>
-            <a:r>
-              <a:rPr lang="en-US" sz="3200" dirty="0"/>
-              <a:t>) - Tools</a:t>
+              <a:t>Infrastructure as Code (IaC) - Tools</a:t>
             </a:r>
           </a:p>
         </p:txBody>
@@ -8375,18 +8566,6 @@
               <a:t>AWS Native</a:t>
             </a:r>
           </a:p>
-          <a:p>
-            <a:pPr algn="ctr"/>
-            <a:r>
-              <a:rPr lang="en-US" b="1" dirty="0">
-                <a:solidFill>
-                  <a:srgbClr val="002060"/>
-                </a:solidFill>
-                <a:latin typeface="Montserrat" pitchFamily="2" charset="77"/>
-              </a:rPr>
-              <a:t>AWS Service</a:t>
-            </a:r>
-          </a:p>
         </p:txBody>
       </p:sp>
       <p:sp>
@@ -8636,16 +8815,8 @@
               <a:t>risk</a:t>
             </a:r>
             <a:r>
-              <a:rPr lang="en-US" dirty="0">
-                <a:highlight>
-                  <a:srgbClr val="00FF00"/>
-                </a:highlight>
-              </a:rPr>
-              <a:t> </a:t>
-            </a:r>
-            <a:r>
               <a:rPr lang="en-US" dirty="0"/>
-              <a:t>for manual misconfigurations</a:t>
+              <a:t> for manual misconfigurations</a:t>
             </a:r>
           </a:p>
           <a:p>
@@ -8909,7 +9080,7 @@
         <p:spPr>
           <a:xfrm>
             <a:off x="1573253" y="1729863"/>
-            <a:ext cx="8917378" cy="3108543"/>
+            <a:ext cx="8917378" cy="3539430"/>
           </a:xfrm>
           <a:prstGeom prst="rect">
             <a:avLst/>
@@ -9119,6 +9290,34 @@
                 <a:latin typeface="Gotham Medium" panose="02000604030000020004" pitchFamily="2" charset="0"/>
               </a:rPr>
               <a:t>Update KMS key with CloudFormation</a:t>
+            </a:r>
+          </a:p>
+          <a:p>
+            <a:pPr marL="457200" marR="0" lvl="0" indent="-457200" algn="l" defTabSz="914400" rtl="0" eaLnBrk="1" fontAlgn="auto" latinLnBrk="0" hangingPunct="1">
+              <a:lnSpc>
+                <a:spcPct val="100000"/>
+              </a:lnSpc>
+              <a:spcBef>
+                <a:spcPts val="0"/>
+              </a:spcBef>
+              <a:spcAft>
+                <a:spcPts val="0"/>
+              </a:spcAft>
+              <a:buClrTx/>
+              <a:buSzTx/>
+              <a:buFont typeface="Arial" panose="020B0604020202020204" pitchFamily="34" charset="0"/>
+              <a:buChar char="•"/>
+              <a:tabLst/>
+              <a:defRPr/>
+            </a:pPr>
+            <a:r>
+              <a:rPr lang="en-US" sz="2800" dirty="0">
+                <a:solidFill>
+                  <a:srgbClr val="002060"/>
+                </a:solidFill>
+                <a:latin typeface="Gotham Medium" panose="02000604030000020004" pitchFamily="2" charset="0"/>
+              </a:rPr>
+              <a:t>Delete CloudFormation stack</a:t>
             </a:r>
           </a:p>
         </p:txBody>

</xml_diff>